<commit_message>
Adding quite a few things
</commit_message>
<xml_diff>
--- a/Tutorial_9/Prelecture 9 - MLM script and slides - extra video on LME syntax.pptx
+++ b/Tutorial_9/Prelecture 9 - MLM script and slides - extra video on LME syntax.pptx
@@ -5,10 +5,10 @@
     <p:sldMasterId id="2147483757" r:id="rId1"/>
   </p:sldMasterIdLst>
   <p:notesMasterIdLst>
-    <p:notesMasterId r:id="rId17"/>
+    <p:notesMasterId r:id="rId11"/>
   </p:notesMasterIdLst>
   <p:handoutMasterIdLst>
-    <p:handoutMasterId r:id="rId18"/>
+    <p:handoutMasterId r:id="rId12"/>
   </p:handoutMasterIdLst>
   <p:sldIdLst>
     <p:sldId id="256" r:id="rId2"/>
@@ -19,13 +19,7 @@
     <p:sldId id="944" r:id="rId7"/>
     <p:sldId id="945" r:id="rId8"/>
     <p:sldId id="941" r:id="rId9"/>
-    <p:sldId id="942" r:id="rId10"/>
-    <p:sldId id="933" r:id="rId11"/>
-    <p:sldId id="934" r:id="rId12"/>
-    <p:sldId id="935" r:id="rId13"/>
-    <p:sldId id="936" r:id="rId14"/>
-    <p:sldId id="937" r:id="rId15"/>
-    <p:sldId id="938" r:id="rId16"/>
+    <p:sldId id="938" r:id="rId10"/>
   </p:sldIdLst>
   <p:sldSz cx="9144000" cy="6858000" type="screen4x3"/>
   <p:notesSz cx="10234613" cy="7099300"/>
@@ -750,834 +744,6 @@
 </p:notes>
 </file>
 
-<file path=ppt/notesSlides/notesSlide10.xml><?xml version="1.0" encoding="utf-8"?>
-<p:notes xmlns:a="http://schemas.openxmlformats.org/drawingml/2006/main" xmlns:r="http://schemas.openxmlformats.org/officeDocument/2006/relationships" xmlns:p="http://schemas.openxmlformats.org/presentationml/2006/main">
-  <p:cSld>
-    <p:spTree>
-      <p:nvGrpSpPr>
-        <p:cNvPr id="1" name=""/>
-        <p:cNvGrpSpPr/>
-        <p:nvPr/>
-      </p:nvGrpSpPr>
-      <p:grpSpPr>
-        <a:xfrm>
-          <a:off x="0" y="0"/>
-          <a:ext cx="0" cy="0"/>
-          <a:chOff x="0" y="0"/>
-          <a:chExt cx="0" cy="0"/>
-        </a:xfrm>
-      </p:grpSpPr>
-      <p:sp>
-        <p:nvSpPr>
-          <p:cNvPr id="2" name="Slide Image Placeholder 1"/>
-          <p:cNvSpPr>
-            <a:spLocks noGrp="1" noRot="1" noChangeAspect="1"/>
-          </p:cNvSpPr>
-          <p:nvPr>
-            <p:ph type="sldImg"/>
-          </p:nvPr>
-        </p:nvSpPr>
-        <p:spPr/>
-      </p:sp>
-      <p:sp>
-        <p:nvSpPr>
-          <p:cNvPr id="3" name="Notes Placeholder 2"/>
-          <p:cNvSpPr>
-            <a:spLocks noGrp="1"/>
-          </p:cNvSpPr>
-          <p:nvPr>
-            <p:ph type="body" idx="1"/>
-          </p:nvPr>
-        </p:nvSpPr>
-        <p:spPr/>
-        <p:txBody>
-          <a:bodyPr/>
-          <a:lstStyle/>
-          <a:p>
-            <a:pPr marL="0" marR="0" lvl="0" indent="0" algn="l" defTabSz="914400" rtl="0" eaLnBrk="1" fontAlgn="auto" latinLnBrk="0" hangingPunct="1">
-              <a:lnSpc>
-                <a:spcPct val="100000"/>
-              </a:lnSpc>
-              <a:spcBef>
-                <a:spcPts val="0"/>
-              </a:spcBef>
-              <a:spcAft>
-                <a:spcPts val="0"/>
-              </a:spcAft>
-              <a:buClrTx/>
-              <a:buSzTx/>
-              <a:buFontTx/>
-              <a:buNone/>
-              <a:tabLst/>
-              <a:defRPr/>
-            </a:pPr>
-            <a:r>
-              <a:rPr lang="en-AU" dirty="0"/>
-              <a:t>Let’s make the math into something slightly more comprehendible </a:t>
-            </a:r>
-            <a:br>
-              <a:rPr lang="en-AU" dirty="0"/>
-            </a:br>
-            <a:endParaRPr lang="en-AU" dirty="0"/>
-          </a:p>
-          <a:p>
-            <a:pPr marL="0" marR="0" lvl="0" indent="0" algn="l" defTabSz="914400" rtl="0" eaLnBrk="1" fontAlgn="auto" latinLnBrk="0" hangingPunct="1">
-              <a:lnSpc>
-                <a:spcPct val="100000"/>
-              </a:lnSpc>
-              <a:spcBef>
-                <a:spcPts val="0"/>
-              </a:spcBef>
-              <a:spcAft>
-                <a:spcPts val="0"/>
-              </a:spcAft>
-              <a:buClrTx/>
-              <a:buSzTx/>
-              <a:buFontTx/>
-              <a:buNone/>
-              <a:tabLst/>
-              <a:defRPr/>
-            </a:pPr>
-            <a:r>
-              <a:rPr lang="en-AU" dirty="0"/>
-              <a:t>This means that person I in group j’s score is equal to and overall intercept, gamma00, plus a regression slope, gamma 10, times their SES score, </a:t>
-            </a:r>
-            <a:br>
-              <a:rPr lang="en-AU" dirty="0"/>
-            </a:br>
-            <a:r>
-              <a:rPr lang="en-AU" dirty="0"/>
-              <a:t>plus U1j times their SES score, meaning a random effect for group times their SES score – the U1j value is a random effect, meaning that we assume that each group has a different value for u – </a:t>
-            </a:r>
-            <a:br>
-              <a:rPr lang="en-AU" dirty="0"/>
-            </a:br>
-            <a:br>
-              <a:rPr lang="en-AU" dirty="0"/>
-            </a:br>
-            <a:r>
-              <a:rPr lang="en-AU" dirty="0"/>
-              <a:t>plus U0j which lets the intercepts differ by group but does not impact the slopes, </a:t>
-            </a:r>
-          </a:p>
-          <a:p>
-            <a:pPr marL="0" marR="0" lvl="0" indent="0" algn="l" defTabSz="914400" rtl="0" eaLnBrk="1" fontAlgn="auto" latinLnBrk="0" hangingPunct="1">
-              <a:lnSpc>
-                <a:spcPct val="100000"/>
-              </a:lnSpc>
-              <a:spcBef>
-                <a:spcPts val="0"/>
-              </a:spcBef>
-              <a:spcAft>
-                <a:spcPts val="0"/>
-              </a:spcAft>
-              <a:buClrTx/>
-              <a:buSzTx/>
-              <a:buFontTx/>
-              <a:buNone/>
-              <a:tabLst/>
-              <a:defRPr/>
-            </a:pPr>
-            <a:endParaRPr lang="en-AU" dirty="0"/>
-          </a:p>
-          <a:p>
-            <a:pPr marL="0" marR="0" lvl="0" indent="0" algn="l" defTabSz="914400" rtl="0" eaLnBrk="1" fontAlgn="auto" latinLnBrk="0" hangingPunct="1">
-              <a:lnSpc>
-                <a:spcPct val="100000"/>
-              </a:lnSpc>
-              <a:spcBef>
-                <a:spcPts val="0"/>
-              </a:spcBef>
-              <a:spcAft>
-                <a:spcPts val="0"/>
-              </a:spcAft>
-              <a:buClrTx/>
-              <a:buSzTx/>
-              <a:buFontTx/>
-              <a:buNone/>
-              <a:tabLst/>
-              <a:defRPr/>
-            </a:pPr>
-            <a:r>
-              <a:rPr lang="en-AU" dirty="0"/>
-              <a:t>plus an error term for each person</a:t>
-            </a:r>
-          </a:p>
-        </p:txBody>
-      </p:sp>
-      <p:sp>
-        <p:nvSpPr>
-          <p:cNvPr id="4" name="Slide Number Placeholder 3"/>
-          <p:cNvSpPr>
-            <a:spLocks noGrp="1"/>
-          </p:cNvSpPr>
-          <p:nvPr>
-            <p:ph type="sldNum" sz="quarter" idx="5"/>
-          </p:nvPr>
-        </p:nvSpPr>
-        <p:spPr/>
-        <p:txBody>
-          <a:bodyPr/>
-          <a:lstStyle/>
-          <a:p>
-            <a:fld id="{FE312555-0023-4720-BAB8-5C236ECFE222}" type="slidenum">
-              <a:rPr lang="en-AU" smtClean="0"/>
-              <a:pPr/>
-              <a:t>10</a:t>
-            </a:fld>
-            <a:endParaRPr lang="en-AU"/>
-          </a:p>
-        </p:txBody>
-      </p:sp>
-    </p:spTree>
-    <p:extLst>
-      <p:ext uri="{BB962C8B-B14F-4D97-AF65-F5344CB8AC3E}">
-        <p14:creationId xmlns:p14="http://schemas.microsoft.com/office/powerpoint/2010/main" val="1613202869"/>
-      </p:ext>
-    </p:extLst>
-  </p:cSld>
-  <p:clrMapOvr>
-    <a:masterClrMapping/>
-  </p:clrMapOvr>
-</p:notes>
-</file>
-
-<file path=ppt/notesSlides/notesSlide11.xml><?xml version="1.0" encoding="utf-8"?>
-<p:notes xmlns:a="http://schemas.openxmlformats.org/drawingml/2006/main" xmlns:r="http://schemas.openxmlformats.org/officeDocument/2006/relationships" xmlns:p="http://schemas.openxmlformats.org/presentationml/2006/main">
-  <p:cSld>
-    <p:spTree>
-      <p:nvGrpSpPr>
-        <p:cNvPr id="1" name=""/>
-        <p:cNvGrpSpPr/>
-        <p:nvPr/>
-      </p:nvGrpSpPr>
-      <p:grpSpPr>
-        <a:xfrm>
-          <a:off x="0" y="0"/>
-          <a:ext cx="0" cy="0"/>
-          <a:chOff x="0" y="0"/>
-          <a:chExt cx="0" cy="0"/>
-        </a:xfrm>
-      </p:grpSpPr>
-      <p:sp>
-        <p:nvSpPr>
-          <p:cNvPr id="2" name="Slide Image Placeholder 1"/>
-          <p:cNvSpPr>
-            <a:spLocks noGrp="1" noRot="1" noChangeAspect="1"/>
-          </p:cNvSpPr>
-          <p:nvPr>
-            <p:ph type="sldImg"/>
-          </p:nvPr>
-        </p:nvSpPr>
-        <p:spPr/>
-      </p:sp>
-      <p:sp>
-        <p:nvSpPr>
-          <p:cNvPr id="3" name="Notes Placeholder 2"/>
-          <p:cNvSpPr>
-            <a:spLocks noGrp="1"/>
-          </p:cNvSpPr>
-          <p:nvPr>
-            <p:ph type="body" idx="1"/>
-          </p:nvPr>
-        </p:nvSpPr>
-        <p:spPr/>
-        <p:txBody>
-          <a:bodyPr/>
-          <a:lstStyle/>
-          <a:p>
-            <a:pPr marL="0" marR="0" lvl="0" indent="0" algn="l" defTabSz="914400" rtl="0" eaLnBrk="1" fontAlgn="auto" latinLnBrk="0" hangingPunct="1">
-              <a:lnSpc>
-                <a:spcPct val="100000"/>
-              </a:lnSpc>
-              <a:spcBef>
-                <a:spcPts val="0"/>
-              </a:spcBef>
-              <a:spcAft>
-                <a:spcPts val="0"/>
-              </a:spcAft>
-              <a:buClrTx/>
-              <a:buSzTx/>
-              <a:buFontTx/>
-              <a:buNone/>
-              <a:tabLst/>
-              <a:defRPr/>
-            </a:pPr>
-            <a:r>
-              <a:rPr lang="en-AU" dirty="0"/>
-              <a:t>Lets get our model estimates our. We get values for the fixed effects, but do not get values for the random effects (as they are assumed to differ by group). Instead we will get estimates of how much each of those u’s varies. </a:t>
-            </a:r>
-            <a:br>
-              <a:rPr lang="en-AU" dirty="0"/>
-            </a:br>
-            <a:br>
-              <a:rPr lang="en-AU" dirty="0"/>
-            </a:br>
-            <a:r>
-              <a:rPr lang="en-AU" dirty="0"/>
-              <a:t>This means that we can say that person I in group j’s math score is equal to</a:t>
-            </a:r>
-            <a:br>
-              <a:rPr lang="en-AU" dirty="0"/>
-            </a:br>
-            <a:r>
-              <a:rPr lang="en-AU" dirty="0"/>
-              <a:t>50, the overall intercept, plus 7 times their </a:t>
-            </a:r>
-            <a:r>
-              <a:rPr lang="en-AU" dirty="0" err="1"/>
-              <a:t>ses</a:t>
-            </a:r>
-            <a:r>
-              <a:rPr lang="en-AU" dirty="0"/>
-              <a:t> score, </a:t>
-            </a:r>
-            <a:br>
-              <a:rPr lang="en-AU" dirty="0"/>
-            </a:br>
-            <a:r>
-              <a:rPr lang="en-AU" dirty="0"/>
-              <a:t>Plus a random effect times their SES score – again, this allows the relationship between SES and math scores to change by group – the random slopes of it all</a:t>
-            </a:r>
-            <a:br>
-              <a:rPr lang="en-AU" dirty="0"/>
-            </a:br>
-            <a:br>
-              <a:rPr lang="en-AU" dirty="0"/>
-            </a:br>
-            <a:r>
-              <a:rPr lang="en-AU" dirty="0"/>
-              <a:t>Plus a random effect for each group – this means that we can let the purple group here’s intercept be different from the red group’s for example. </a:t>
-            </a:r>
-          </a:p>
-        </p:txBody>
-      </p:sp>
-      <p:sp>
-        <p:nvSpPr>
-          <p:cNvPr id="4" name="Slide Number Placeholder 3"/>
-          <p:cNvSpPr>
-            <a:spLocks noGrp="1"/>
-          </p:cNvSpPr>
-          <p:nvPr>
-            <p:ph type="sldNum" sz="quarter" idx="5"/>
-          </p:nvPr>
-        </p:nvSpPr>
-        <p:spPr/>
-        <p:txBody>
-          <a:bodyPr/>
-          <a:lstStyle/>
-          <a:p>
-            <a:fld id="{FE312555-0023-4720-BAB8-5C236ECFE222}" type="slidenum">
-              <a:rPr lang="en-AU" smtClean="0"/>
-              <a:pPr/>
-              <a:t>11</a:t>
-            </a:fld>
-            <a:endParaRPr lang="en-AU"/>
-          </a:p>
-        </p:txBody>
-      </p:sp>
-    </p:spTree>
-    <p:extLst>
-      <p:ext uri="{BB962C8B-B14F-4D97-AF65-F5344CB8AC3E}">
-        <p14:creationId xmlns:p14="http://schemas.microsoft.com/office/powerpoint/2010/main" val="3925481958"/>
-      </p:ext>
-    </p:extLst>
-  </p:cSld>
-  <p:clrMapOvr>
-    <a:masterClrMapping/>
-  </p:clrMapOvr>
-</p:notes>
-</file>
-
-<file path=ppt/notesSlides/notesSlide12.xml><?xml version="1.0" encoding="utf-8"?>
-<p:notes xmlns:a="http://schemas.openxmlformats.org/drawingml/2006/main" xmlns:r="http://schemas.openxmlformats.org/officeDocument/2006/relationships" xmlns:p="http://schemas.openxmlformats.org/presentationml/2006/main">
-  <p:cSld>
-    <p:spTree>
-      <p:nvGrpSpPr>
-        <p:cNvPr id="1" name=""/>
-        <p:cNvGrpSpPr/>
-        <p:nvPr/>
-      </p:nvGrpSpPr>
-      <p:grpSpPr>
-        <a:xfrm>
-          <a:off x="0" y="0"/>
-          <a:ext cx="0" cy="0"/>
-          <a:chOff x="0" y="0"/>
-          <a:chExt cx="0" cy="0"/>
-        </a:xfrm>
-      </p:grpSpPr>
-      <p:sp>
-        <p:nvSpPr>
-          <p:cNvPr id="2" name="Slide Image Placeholder 1"/>
-          <p:cNvSpPr>
-            <a:spLocks noGrp="1" noRot="1" noChangeAspect="1"/>
-          </p:cNvSpPr>
-          <p:nvPr>
-            <p:ph type="sldImg"/>
-          </p:nvPr>
-        </p:nvSpPr>
-        <p:spPr/>
-      </p:sp>
-      <p:sp>
-        <p:nvSpPr>
-          <p:cNvPr id="3" name="Notes Placeholder 2"/>
-          <p:cNvSpPr>
-            <a:spLocks noGrp="1"/>
-          </p:cNvSpPr>
-          <p:nvPr>
-            <p:ph type="body" idx="1"/>
-          </p:nvPr>
-        </p:nvSpPr>
-        <p:spPr/>
-        <p:txBody>
-          <a:bodyPr/>
-          <a:lstStyle/>
-          <a:p>
-            <a:pPr marL="0" marR="0" lvl="0" indent="0" algn="l" defTabSz="914400" rtl="0" eaLnBrk="1" fontAlgn="auto" latinLnBrk="0" hangingPunct="1">
-              <a:lnSpc>
-                <a:spcPct val="100000"/>
-              </a:lnSpc>
-              <a:spcBef>
-                <a:spcPts val="0"/>
-              </a:spcBef>
-              <a:spcAft>
-                <a:spcPts val="0"/>
-              </a:spcAft>
-              <a:buClrTx/>
-              <a:buSzTx/>
-              <a:buFontTx/>
-              <a:buNone/>
-              <a:tabLst/>
-              <a:defRPr/>
-            </a:pPr>
-            <a:r>
-              <a:rPr lang="en-AU" dirty="0"/>
-              <a:t>In random effects ANOVAs we’re only interested in whether the overall scores differ by group – Notice that there is nothing on the y axis, there’s no regression slope, just gamma 00 an overall intercept, and a random effect / a random intercept for group. </a:t>
-            </a:r>
-          </a:p>
-        </p:txBody>
-      </p:sp>
-      <p:sp>
-        <p:nvSpPr>
-          <p:cNvPr id="4" name="Slide Number Placeholder 3"/>
-          <p:cNvSpPr>
-            <a:spLocks noGrp="1"/>
-          </p:cNvSpPr>
-          <p:nvPr>
-            <p:ph type="sldNum" sz="quarter" idx="5"/>
-          </p:nvPr>
-        </p:nvSpPr>
-        <p:spPr/>
-        <p:txBody>
-          <a:bodyPr/>
-          <a:lstStyle/>
-          <a:p>
-            <a:fld id="{FE312555-0023-4720-BAB8-5C236ECFE222}" type="slidenum">
-              <a:rPr lang="en-AU" smtClean="0"/>
-              <a:pPr/>
-              <a:t>12</a:t>
-            </a:fld>
-            <a:endParaRPr lang="en-AU"/>
-          </a:p>
-        </p:txBody>
-      </p:sp>
-    </p:spTree>
-    <p:extLst>
-      <p:ext uri="{BB962C8B-B14F-4D97-AF65-F5344CB8AC3E}">
-        <p14:creationId xmlns:p14="http://schemas.microsoft.com/office/powerpoint/2010/main" val="160587165"/>
-      </p:ext>
-    </p:extLst>
-  </p:cSld>
-  <p:clrMapOvr>
-    <a:masterClrMapping/>
-  </p:clrMapOvr>
-</p:notes>
-</file>
-
-<file path=ppt/notesSlides/notesSlide13.xml><?xml version="1.0" encoding="utf-8"?>
-<p:notes xmlns:a="http://schemas.openxmlformats.org/drawingml/2006/main" xmlns:r="http://schemas.openxmlformats.org/officeDocument/2006/relationships" xmlns:p="http://schemas.openxmlformats.org/presentationml/2006/main">
-  <p:cSld>
-    <p:spTree>
-      <p:nvGrpSpPr>
-        <p:cNvPr id="1" name=""/>
-        <p:cNvGrpSpPr/>
-        <p:nvPr/>
-      </p:nvGrpSpPr>
-      <p:grpSpPr>
-        <a:xfrm>
-          <a:off x="0" y="0"/>
-          <a:ext cx="0" cy="0"/>
-          <a:chOff x="0" y="0"/>
-          <a:chExt cx="0" cy="0"/>
-        </a:xfrm>
-      </p:grpSpPr>
-      <p:sp>
-        <p:nvSpPr>
-          <p:cNvPr id="2" name="Slide Image Placeholder 1"/>
-          <p:cNvSpPr>
-            <a:spLocks noGrp="1" noRot="1" noChangeAspect="1"/>
-          </p:cNvSpPr>
-          <p:nvPr>
-            <p:ph type="sldImg"/>
-          </p:nvPr>
-        </p:nvSpPr>
-        <p:spPr/>
-      </p:sp>
-      <p:sp>
-        <p:nvSpPr>
-          <p:cNvPr id="3" name="Notes Placeholder 2"/>
-          <p:cNvSpPr>
-            <a:spLocks noGrp="1"/>
-          </p:cNvSpPr>
-          <p:nvPr>
-            <p:ph type="body" idx="1"/>
-          </p:nvPr>
-        </p:nvSpPr>
-        <p:spPr/>
-        <p:txBody>
-          <a:bodyPr/>
-          <a:lstStyle/>
-          <a:p>
-            <a:pPr marL="0" marR="0" lvl="0" indent="0" algn="l" defTabSz="914400" rtl="0" eaLnBrk="1" fontAlgn="auto" latinLnBrk="0" hangingPunct="1">
-              <a:lnSpc>
-                <a:spcPct val="100000"/>
-              </a:lnSpc>
-              <a:spcBef>
-                <a:spcPts val="0"/>
-              </a:spcBef>
-              <a:spcAft>
-                <a:spcPts val="0"/>
-              </a:spcAft>
-              <a:buClrTx/>
-              <a:buSzTx/>
-              <a:buFontTx/>
-              <a:buNone/>
-              <a:tabLst/>
-              <a:defRPr/>
-            </a:pPr>
-            <a:r>
-              <a:rPr lang="en-AU" dirty="0"/>
-              <a:t>A random intercepts models assumes the slope is the same for everyone, but lets the intercepts differ by group. </a:t>
-            </a:r>
-            <a:br>
-              <a:rPr lang="en-AU" dirty="0"/>
-            </a:br>
-            <a:r>
-              <a:rPr lang="en-AU" dirty="0"/>
-              <a:t>We can see this is math score for person I in group j = gamma 00 (an intercept for everyone) + gamma 10 times a person’s score on </a:t>
-            </a:r>
-            <a:r>
-              <a:rPr lang="en-AU" dirty="0" err="1"/>
-              <a:t>ses</a:t>
-            </a:r>
-            <a:r>
-              <a:rPr lang="en-AU" dirty="0"/>
-              <a:t> (a regression slope for person) + a random effect for each group  + a residual for each person </a:t>
-            </a:r>
-            <a:br>
-              <a:rPr lang="en-AU" dirty="0"/>
-            </a:br>
-            <a:br>
-              <a:rPr lang="en-AU" dirty="0"/>
-            </a:br>
-            <a:r>
-              <a:rPr lang="en-AU" dirty="0"/>
-              <a:t>The only new part in the random slopes model is that we have the regression slope for the relationship between SES and math scores </a:t>
-            </a:r>
-          </a:p>
-        </p:txBody>
-      </p:sp>
-      <p:sp>
-        <p:nvSpPr>
-          <p:cNvPr id="4" name="Slide Number Placeholder 3"/>
-          <p:cNvSpPr>
-            <a:spLocks noGrp="1"/>
-          </p:cNvSpPr>
-          <p:nvPr>
-            <p:ph type="sldNum" sz="quarter" idx="5"/>
-          </p:nvPr>
-        </p:nvSpPr>
-        <p:spPr/>
-        <p:txBody>
-          <a:bodyPr/>
-          <a:lstStyle/>
-          <a:p>
-            <a:fld id="{FE312555-0023-4720-BAB8-5C236ECFE222}" type="slidenum">
-              <a:rPr lang="en-AU" smtClean="0"/>
-              <a:pPr/>
-              <a:t>13</a:t>
-            </a:fld>
-            <a:endParaRPr lang="en-AU"/>
-          </a:p>
-        </p:txBody>
-      </p:sp>
-    </p:spTree>
-    <p:extLst>
-      <p:ext uri="{BB962C8B-B14F-4D97-AF65-F5344CB8AC3E}">
-        <p14:creationId xmlns:p14="http://schemas.microsoft.com/office/powerpoint/2010/main" val="1248926110"/>
-      </p:ext>
-    </p:extLst>
-  </p:cSld>
-  <p:clrMapOvr>
-    <a:masterClrMapping/>
-  </p:clrMapOvr>
-</p:notes>
-</file>
-
-<file path=ppt/notesSlides/notesSlide14.xml><?xml version="1.0" encoding="utf-8"?>
-<p:notes xmlns:a="http://schemas.openxmlformats.org/drawingml/2006/main" xmlns:r="http://schemas.openxmlformats.org/officeDocument/2006/relationships" xmlns:p="http://schemas.openxmlformats.org/presentationml/2006/main">
-  <p:cSld>
-    <p:spTree>
-      <p:nvGrpSpPr>
-        <p:cNvPr id="1" name=""/>
-        <p:cNvGrpSpPr/>
-        <p:nvPr/>
-      </p:nvGrpSpPr>
-      <p:grpSpPr>
-        <a:xfrm>
-          <a:off x="0" y="0"/>
-          <a:ext cx="0" cy="0"/>
-          <a:chOff x="0" y="0"/>
-          <a:chExt cx="0" cy="0"/>
-        </a:xfrm>
-      </p:grpSpPr>
-      <p:sp>
-        <p:nvSpPr>
-          <p:cNvPr id="2" name="Slide Image Placeholder 1"/>
-          <p:cNvSpPr>
-            <a:spLocks noGrp="1" noRot="1" noChangeAspect="1"/>
-          </p:cNvSpPr>
-          <p:nvPr>
-            <p:ph type="sldImg"/>
-          </p:nvPr>
-        </p:nvSpPr>
-        <p:spPr/>
-      </p:sp>
-      <p:sp>
-        <p:nvSpPr>
-          <p:cNvPr id="3" name="Notes Placeholder 2"/>
-          <p:cNvSpPr>
-            <a:spLocks noGrp="1"/>
-          </p:cNvSpPr>
-          <p:nvPr>
-            <p:ph type="body" idx="1"/>
-          </p:nvPr>
-        </p:nvSpPr>
-        <p:spPr/>
-        <p:txBody>
-          <a:bodyPr/>
-          <a:lstStyle/>
-          <a:p>
-            <a:pPr marL="0" marR="0" lvl="0" indent="0" algn="l" defTabSz="914400" rtl="0" eaLnBrk="1" fontAlgn="auto" latinLnBrk="0" hangingPunct="1">
-              <a:lnSpc>
-                <a:spcPct val="100000"/>
-              </a:lnSpc>
-              <a:spcBef>
-                <a:spcPts val="0"/>
-              </a:spcBef>
-              <a:spcAft>
-                <a:spcPts val="0"/>
-              </a:spcAft>
-              <a:buClrTx/>
-              <a:buSzTx/>
-              <a:buFontTx/>
-              <a:buNone/>
-              <a:tabLst/>
-              <a:defRPr/>
-            </a:pPr>
-            <a:r>
-              <a:rPr lang="en-AU" dirty="0"/>
-              <a:t>And finally, a random slopes model allows for different intercepts and different slopes – we can see this as person I in group j’s math score = gamma 00 (and intercept for everyone) + gamma 10 times a person’s score on </a:t>
-            </a:r>
-            <a:r>
-              <a:rPr lang="en-AU" dirty="0" err="1"/>
-              <a:t>ses</a:t>
-            </a:r>
-            <a:r>
-              <a:rPr lang="en-AU" dirty="0"/>
-              <a:t> (which is a regression slope that applies to everyone) + a random effect for group times SES, which allows for the relationship between SES and math scores to change by group + plus a random effect for each group (letting group intercepts change) + a residual for each person </a:t>
-            </a:r>
-            <a:br>
-              <a:rPr lang="en-AU" dirty="0"/>
-            </a:br>
-            <a:br>
-              <a:rPr lang="en-AU" dirty="0"/>
-            </a:br>
-            <a:r>
-              <a:rPr lang="en-AU" dirty="0"/>
-              <a:t>The only new part for the random slopes model is u</a:t>
-            </a:r>
-            <a:r>
-              <a:rPr lang="en-AU" baseline="-25000" dirty="0"/>
-              <a:t>1j</a:t>
-            </a:r>
-            <a:r>
-              <a:rPr lang="en-AU" dirty="0"/>
-              <a:t>x</a:t>
-            </a:r>
-            <a:r>
-              <a:rPr lang="en-AU" i="1" baseline="-25000" dirty="0"/>
-              <a:t>ij</a:t>
-            </a:r>
-            <a:r>
-              <a:rPr lang="en-AU" dirty="0"/>
-              <a:t> – the random effects times the person level IV, in our case SES, which lets the slopes vary by group! </a:t>
-            </a:r>
-            <a:br>
-              <a:rPr lang="en-AU" dirty="0"/>
-            </a:br>
-            <a:br>
-              <a:rPr lang="en-AU" dirty="0"/>
-            </a:br>
-            <a:r>
-              <a:rPr lang="en-AU" dirty="0"/>
-              <a:t>In week 10’s lecture we’ll even go beyond this</a:t>
-            </a:r>
-          </a:p>
-        </p:txBody>
-      </p:sp>
-      <p:sp>
-        <p:nvSpPr>
-          <p:cNvPr id="4" name="Slide Number Placeholder 3"/>
-          <p:cNvSpPr>
-            <a:spLocks noGrp="1"/>
-          </p:cNvSpPr>
-          <p:nvPr>
-            <p:ph type="sldNum" sz="quarter" idx="5"/>
-          </p:nvPr>
-        </p:nvSpPr>
-        <p:spPr/>
-        <p:txBody>
-          <a:bodyPr/>
-          <a:lstStyle/>
-          <a:p>
-            <a:fld id="{FE312555-0023-4720-BAB8-5C236ECFE222}" type="slidenum">
-              <a:rPr lang="en-AU" smtClean="0"/>
-              <a:pPr/>
-              <a:t>14</a:t>
-            </a:fld>
-            <a:endParaRPr lang="en-AU"/>
-          </a:p>
-        </p:txBody>
-      </p:sp>
-    </p:spTree>
-    <p:extLst>
-      <p:ext uri="{BB962C8B-B14F-4D97-AF65-F5344CB8AC3E}">
-        <p14:creationId xmlns:p14="http://schemas.microsoft.com/office/powerpoint/2010/main" val="142070197"/>
-      </p:ext>
-    </p:extLst>
-  </p:cSld>
-  <p:clrMapOvr>
-    <a:masterClrMapping/>
-  </p:clrMapOvr>
-</p:notes>
-</file>
-
-<file path=ppt/notesSlides/notesSlide15.xml><?xml version="1.0" encoding="utf-8"?>
-<p:notes xmlns:a="http://schemas.openxmlformats.org/drawingml/2006/main" xmlns:r="http://schemas.openxmlformats.org/officeDocument/2006/relationships" xmlns:p="http://schemas.openxmlformats.org/presentationml/2006/main">
-  <p:cSld>
-    <p:spTree>
-      <p:nvGrpSpPr>
-        <p:cNvPr id="1" name=""/>
-        <p:cNvGrpSpPr/>
-        <p:nvPr/>
-      </p:nvGrpSpPr>
-      <p:grpSpPr>
-        <a:xfrm>
-          <a:off x="0" y="0"/>
-          <a:ext cx="0" cy="0"/>
-          <a:chOff x="0" y="0"/>
-          <a:chExt cx="0" cy="0"/>
-        </a:xfrm>
-      </p:grpSpPr>
-      <p:sp>
-        <p:nvSpPr>
-          <p:cNvPr id="2" name="Slide Image Placeholder 1"/>
-          <p:cNvSpPr>
-            <a:spLocks noGrp="1" noRot="1" noChangeAspect="1"/>
-          </p:cNvSpPr>
-          <p:nvPr>
-            <p:ph type="sldImg"/>
-          </p:nvPr>
-        </p:nvSpPr>
-        <p:spPr/>
-      </p:sp>
-      <p:sp>
-        <p:nvSpPr>
-          <p:cNvPr id="3" name="Notes Placeholder 2"/>
-          <p:cNvSpPr>
-            <a:spLocks noGrp="1"/>
-          </p:cNvSpPr>
-          <p:nvPr>
-            <p:ph type="body" idx="1"/>
-          </p:nvPr>
-        </p:nvSpPr>
-        <p:spPr/>
-        <p:txBody>
-          <a:bodyPr/>
-          <a:lstStyle/>
-          <a:p>
-            <a:pPr marL="0" marR="0" lvl="0" indent="0" algn="l" defTabSz="914400" rtl="0" eaLnBrk="1" fontAlgn="auto" latinLnBrk="0" hangingPunct="1">
-              <a:lnSpc>
-                <a:spcPct val="100000"/>
-              </a:lnSpc>
-              <a:spcBef>
-                <a:spcPts val="0"/>
-              </a:spcBef>
-              <a:spcAft>
-                <a:spcPts val="0"/>
-              </a:spcAft>
-              <a:buClrTx/>
-              <a:buSzTx/>
-              <a:buFontTx/>
-              <a:buNone/>
-              <a:tabLst/>
-              <a:defRPr/>
-            </a:pPr>
-            <a:r>
-              <a:rPr lang="en-AU" dirty="0"/>
-              <a:t>If we use traditional regression we are almost certainly violating one of the major assumptions of regression – that variables are independently and identically distributed – the nested sampling means that individuals from the same school are not independent of one another. The schools probably have some impact on the Math scores of the kids, and there are also almost certainly differences between schools in the average level of SES. </a:t>
-            </a:r>
-          </a:p>
-        </p:txBody>
-      </p:sp>
-      <p:sp>
-        <p:nvSpPr>
-          <p:cNvPr id="4" name="Slide Number Placeholder 3"/>
-          <p:cNvSpPr>
-            <a:spLocks noGrp="1"/>
-          </p:cNvSpPr>
-          <p:nvPr>
-            <p:ph type="sldNum" sz="quarter" idx="5"/>
-          </p:nvPr>
-        </p:nvSpPr>
-        <p:spPr/>
-        <p:txBody>
-          <a:bodyPr/>
-          <a:lstStyle/>
-          <a:p>
-            <a:fld id="{FE312555-0023-4720-BAB8-5C236ECFE222}" type="slidenum">
-              <a:rPr lang="en-AU" smtClean="0"/>
-              <a:pPr/>
-              <a:t>15</a:t>
-            </a:fld>
-            <a:endParaRPr lang="en-AU"/>
-          </a:p>
-        </p:txBody>
-      </p:sp>
-    </p:spTree>
-    <p:extLst>
-      <p:ext uri="{BB962C8B-B14F-4D97-AF65-F5344CB8AC3E}">
-        <p14:creationId xmlns:p14="http://schemas.microsoft.com/office/powerpoint/2010/main" val="1211526030"/>
-      </p:ext>
-    </p:extLst>
-  </p:cSld>
-  <p:clrMapOvr>
-    <a:masterClrMapping/>
-  </p:clrMapOvr>
-</p:notes>
-</file>
-
 <file path=ppt/notesSlides/notesSlide2.xml><?xml version="1.0" encoding="utf-8"?>
 <p:notes xmlns:a="http://schemas.openxmlformats.org/drawingml/2006/main" xmlns:r="http://schemas.openxmlformats.org/officeDocument/2006/relationships" xmlns:p="http://schemas.openxmlformats.org/presentationml/2006/main">
   <p:cSld>
@@ -2384,7 +1550,15 @@
             </a:br>
             <a:r>
               <a:rPr lang="en-AU" dirty="0"/>
-              <a:t>.22 is pretty high, so the grouping structure is important indeed. </a:t>
+              <a:t>.22 is pretty high, so the grouping structure is important indeed. Although we should probably be doing this on non-data driven grounds based on how the data was generated, this gives us more even more </a:t>
+            </a:r>
+            <a:r>
+              <a:rPr lang="en-AU" dirty="0" err="1"/>
+              <a:t>certaintly</a:t>
+            </a:r>
+            <a:r>
+              <a:rPr lang="en-AU" dirty="0"/>
+              <a:t> that we should account for the grouping in running our analysis</a:t>
             </a:r>
             <a:br>
               <a:rPr lang="en-AU" dirty="0"/>
@@ -2668,7 +1842,7 @@
     </p:spTree>
     <p:extLst>
       <p:ext uri="{BB962C8B-B14F-4D97-AF65-F5344CB8AC3E}">
-        <p14:creationId xmlns:p14="http://schemas.microsoft.com/office/powerpoint/2010/main" val="2828805343"/>
+        <p14:creationId xmlns:p14="http://schemas.microsoft.com/office/powerpoint/2010/main" val="1211526030"/>
       </p:ext>
     </p:extLst>
   </p:cSld>
@@ -5956,2945 +5130,6 @@
 </p:sld>
 </file>
 
-<file path=ppt/slides/slide10.xml><?xml version="1.0" encoding="utf-8"?>
-<p:sld xmlns:a="http://schemas.openxmlformats.org/drawingml/2006/main" xmlns:r="http://schemas.openxmlformats.org/officeDocument/2006/relationships" xmlns:p="http://schemas.openxmlformats.org/presentationml/2006/main">
-  <p:cSld>
-    <p:spTree>
-      <p:nvGrpSpPr>
-        <p:cNvPr id="1" name=""/>
-        <p:cNvGrpSpPr/>
-        <p:nvPr/>
-      </p:nvGrpSpPr>
-      <p:grpSpPr>
-        <a:xfrm>
-          <a:off x="0" y="0"/>
-          <a:ext cx="0" cy="0"/>
-          <a:chOff x="0" y="0"/>
-          <a:chExt cx="0" cy="0"/>
-        </a:xfrm>
-      </p:grpSpPr>
-      <p:sp>
-        <p:nvSpPr>
-          <p:cNvPr id="4" name="Title 3"/>
-          <p:cNvSpPr>
-            <a:spLocks noGrp="1"/>
-          </p:cNvSpPr>
-          <p:nvPr>
-            <p:ph type="title"/>
-          </p:nvPr>
-        </p:nvSpPr>
-        <p:spPr/>
-        <p:txBody>
-          <a:bodyPr/>
-          <a:lstStyle/>
-          <a:p>
-            <a:r>
-              <a:rPr lang="en-AU" dirty="0"/>
-              <a:t>Multilevel models</a:t>
-            </a:r>
-          </a:p>
-        </p:txBody>
-      </p:sp>
-      <p:sp>
-        <p:nvSpPr>
-          <p:cNvPr id="2" name="Slide Number Placeholder 1"/>
-          <p:cNvSpPr>
-            <a:spLocks noGrp="1"/>
-          </p:cNvSpPr>
-          <p:nvPr>
-            <p:ph type="sldNum" sz="quarter" idx="12"/>
-          </p:nvPr>
-        </p:nvSpPr>
-        <p:spPr/>
-        <p:txBody>
-          <a:bodyPr/>
-          <a:lstStyle/>
-          <a:p>
-            <a:fld id="{B6F15528-21DE-4FAA-801E-634DDDAF4B2B}" type="slidenum">
-              <a:rPr lang="en-US" smtClean="0"/>
-              <a:pPr/>
-              <a:t>10</a:t>
-            </a:fld>
-            <a:endParaRPr lang="en-US"/>
-          </a:p>
-        </p:txBody>
-      </p:sp>
-      <p:sp>
-        <p:nvSpPr>
-          <p:cNvPr id="3" name="Rectangle 2">
-            <a:extLst>
-              <a:ext uri="{FF2B5EF4-FFF2-40B4-BE49-F238E27FC236}">
-                <a16:creationId xmlns:a16="http://schemas.microsoft.com/office/drawing/2014/main" id="{11E978A6-6544-4ADB-B5F0-E7DF10F74946}"/>
-              </a:ext>
-            </a:extLst>
-          </p:cNvPr>
-          <p:cNvSpPr/>
-          <p:nvPr/>
-        </p:nvSpPr>
-        <p:spPr>
-          <a:xfrm>
-            <a:off x="5943600" y="1187450"/>
-            <a:ext cx="1295400" cy="3689350"/>
-          </a:xfrm>
-          <a:prstGeom prst="rect">
-            <a:avLst/>
-          </a:prstGeom>
-          <a:solidFill>
-            <a:schemeClr val="bg1"/>
-          </a:solidFill>
-          <a:ln>
-            <a:solidFill>
-              <a:schemeClr val="bg1"/>
-            </a:solidFill>
-          </a:ln>
-        </p:spPr>
-        <p:style>
-          <a:lnRef idx="2">
-            <a:schemeClr val="accent1">
-              <a:shade val="50000"/>
-            </a:schemeClr>
-          </a:lnRef>
-          <a:fillRef idx="1">
-            <a:schemeClr val="accent1"/>
-          </a:fillRef>
-          <a:effectRef idx="0">
-            <a:schemeClr val="accent1"/>
-          </a:effectRef>
-          <a:fontRef idx="minor">
-            <a:schemeClr val="lt1"/>
-          </a:fontRef>
-        </p:style>
-        <p:txBody>
-          <a:bodyPr rtlCol="0" anchor="ctr"/>
-          <a:lstStyle/>
-          <a:p>
-            <a:pPr algn="ctr"/>
-            <a:endParaRPr lang="en-AU"/>
-          </a:p>
-        </p:txBody>
-      </p:sp>
-      <p:sp>
-        <p:nvSpPr>
-          <p:cNvPr id="6" name="Content Placeholder 2">
-            <a:extLst>
-              <a:ext uri="{FF2B5EF4-FFF2-40B4-BE49-F238E27FC236}">
-                <a16:creationId xmlns:a16="http://schemas.microsoft.com/office/drawing/2014/main" id="{6F49E5F7-CE16-4DD9-8A74-BD3C8EA91A20}"/>
-              </a:ext>
-            </a:extLst>
-          </p:cNvPr>
-          <p:cNvSpPr txBox="1">
-            <a:spLocks/>
-          </p:cNvSpPr>
-          <p:nvPr/>
-        </p:nvSpPr>
-        <p:spPr>
-          <a:xfrm>
-            <a:off x="1143000" y="5371735"/>
-            <a:ext cx="6934200" cy="533399"/>
-          </a:xfrm>
-          <a:prstGeom prst="rect">
-            <a:avLst/>
-          </a:prstGeom>
-        </p:spPr>
-        <p:style>
-          <a:lnRef idx="0">
-            <a:schemeClr val="accent4"/>
-          </a:lnRef>
-          <a:fillRef idx="3">
-            <a:schemeClr val="accent4"/>
-          </a:fillRef>
-          <a:effectRef idx="3">
-            <a:schemeClr val="accent4"/>
-          </a:effectRef>
-          <a:fontRef idx="minor">
-            <a:schemeClr val="lt1"/>
-          </a:fontRef>
-        </p:style>
-        <p:txBody>
-          <a:bodyPr vert="horz" lIns="91440" tIns="45720" rIns="91440" bIns="45720" rtlCol="0">
-            <a:normAutofit/>
-          </a:bodyPr>
-          <a:lstStyle>
-            <a:lvl1pPr marL="342900" indent="-342900" algn="l" defTabSz="914400" rtl="0" eaLnBrk="1" latinLnBrk="0" hangingPunct="1">
-              <a:spcBef>
-                <a:spcPct val="20000"/>
-              </a:spcBef>
-              <a:buFont typeface="Arial" pitchFamily="34" charset="0"/>
-              <a:buChar char="•"/>
-              <a:defRPr sz="2800" kern="1200">
-                <a:solidFill>
-                  <a:schemeClr val="lt1"/>
-                </a:solidFill>
-                <a:latin typeface="+mn-lt"/>
-                <a:ea typeface="+mn-ea"/>
-                <a:cs typeface="+mn-cs"/>
-              </a:defRPr>
-            </a:lvl1pPr>
-            <a:lvl2pPr marL="742950" indent="-285750" algn="l" defTabSz="914400" rtl="0" eaLnBrk="1" latinLnBrk="0" hangingPunct="1">
-              <a:spcBef>
-                <a:spcPct val="20000"/>
-              </a:spcBef>
-              <a:buFont typeface="Arial" pitchFamily="34" charset="0"/>
-              <a:buChar char="–"/>
-              <a:defRPr sz="2400" kern="1200">
-                <a:solidFill>
-                  <a:schemeClr val="lt1"/>
-                </a:solidFill>
-                <a:latin typeface="+mn-lt"/>
-                <a:ea typeface="+mn-ea"/>
-                <a:cs typeface="+mn-cs"/>
-              </a:defRPr>
-            </a:lvl2pPr>
-            <a:lvl3pPr marL="1143000" indent="-228600" algn="l" defTabSz="914400" rtl="0" eaLnBrk="1" latinLnBrk="0" hangingPunct="1">
-              <a:spcBef>
-                <a:spcPct val="20000"/>
-              </a:spcBef>
-              <a:buFont typeface="Arial" pitchFamily="34" charset="0"/>
-              <a:buChar char="•"/>
-              <a:defRPr sz="2400" kern="1200">
-                <a:solidFill>
-                  <a:schemeClr val="lt1"/>
-                </a:solidFill>
-                <a:latin typeface="+mn-lt"/>
-                <a:ea typeface="+mn-ea"/>
-                <a:cs typeface="+mn-cs"/>
-              </a:defRPr>
-            </a:lvl3pPr>
-            <a:lvl4pPr marL="1600200" indent="-228600" algn="l" defTabSz="914400" rtl="0" eaLnBrk="1" latinLnBrk="0" hangingPunct="1">
-              <a:spcBef>
-                <a:spcPct val="20000"/>
-              </a:spcBef>
-              <a:buFont typeface="Arial" pitchFamily="34" charset="0"/>
-              <a:buChar char="–"/>
-              <a:defRPr sz="2000" kern="1200">
-                <a:solidFill>
-                  <a:schemeClr val="lt1"/>
-                </a:solidFill>
-                <a:latin typeface="+mn-lt"/>
-                <a:ea typeface="+mn-ea"/>
-                <a:cs typeface="+mn-cs"/>
-              </a:defRPr>
-            </a:lvl4pPr>
-            <a:lvl5pPr marL="2057400" indent="-228600" algn="l" defTabSz="914400" rtl="0" eaLnBrk="1" latinLnBrk="0" hangingPunct="1">
-              <a:spcBef>
-                <a:spcPct val="20000"/>
-              </a:spcBef>
-              <a:buFont typeface="Arial" pitchFamily="34" charset="0"/>
-              <a:buChar char="»"/>
-              <a:defRPr sz="2000" kern="1200">
-                <a:solidFill>
-                  <a:schemeClr val="lt1"/>
-                </a:solidFill>
-                <a:latin typeface="+mn-lt"/>
-                <a:ea typeface="+mn-ea"/>
-                <a:cs typeface="+mn-cs"/>
-              </a:defRPr>
-            </a:lvl5pPr>
-            <a:lvl6pPr marL="2514600" indent="-228600" algn="l" defTabSz="914400" rtl="0" eaLnBrk="1" latinLnBrk="0" hangingPunct="1">
-              <a:spcBef>
-                <a:spcPct val="20000"/>
-              </a:spcBef>
-              <a:buFont typeface="Arial" pitchFamily="34" charset="0"/>
-              <a:buChar char="•"/>
-              <a:defRPr sz="2000" kern="1200">
-                <a:solidFill>
-                  <a:schemeClr val="lt1"/>
-                </a:solidFill>
-                <a:latin typeface="+mn-lt"/>
-                <a:ea typeface="+mn-ea"/>
-                <a:cs typeface="+mn-cs"/>
-              </a:defRPr>
-            </a:lvl6pPr>
-            <a:lvl7pPr marL="2971800" indent="-228600" algn="l" defTabSz="914400" rtl="0" eaLnBrk="1" latinLnBrk="0" hangingPunct="1">
-              <a:spcBef>
-                <a:spcPct val="20000"/>
-              </a:spcBef>
-              <a:buFont typeface="Arial" pitchFamily="34" charset="0"/>
-              <a:buChar char="•"/>
-              <a:defRPr sz="2000" kern="1200">
-                <a:solidFill>
-                  <a:schemeClr val="lt1"/>
-                </a:solidFill>
-                <a:latin typeface="+mn-lt"/>
-                <a:ea typeface="+mn-ea"/>
-                <a:cs typeface="+mn-cs"/>
-              </a:defRPr>
-            </a:lvl7pPr>
-            <a:lvl8pPr marL="3429000" indent="-228600" algn="l" defTabSz="914400" rtl="0" eaLnBrk="1" latinLnBrk="0" hangingPunct="1">
-              <a:spcBef>
-                <a:spcPct val="20000"/>
-              </a:spcBef>
-              <a:buFont typeface="Arial" pitchFamily="34" charset="0"/>
-              <a:buChar char="•"/>
-              <a:defRPr sz="2000" kern="1200">
-                <a:solidFill>
-                  <a:schemeClr val="lt1"/>
-                </a:solidFill>
-                <a:latin typeface="+mn-lt"/>
-                <a:ea typeface="+mn-ea"/>
-                <a:cs typeface="+mn-cs"/>
-              </a:defRPr>
-            </a:lvl8pPr>
-            <a:lvl9pPr marL="3886200" indent="-228600" algn="l" defTabSz="914400" rtl="0" eaLnBrk="1" latinLnBrk="0" hangingPunct="1">
-              <a:spcBef>
-                <a:spcPct val="20000"/>
-              </a:spcBef>
-              <a:buFont typeface="Arial" pitchFamily="34" charset="0"/>
-              <a:buChar char="•"/>
-              <a:defRPr sz="2000" kern="1200">
-                <a:solidFill>
-                  <a:schemeClr val="lt1"/>
-                </a:solidFill>
-                <a:latin typeface="+mn-lt"/>
-                <a:ea typeface="+mn-ea"/>
-                <a:cs typeface="+mn-cs"/>
-              </a:defRPr>
-            </a:lvl9pPr>
-          </a:lstStyle>
-          <a:p>
-            <a:pPr marL="0" indent="0" algn="ctr">
-              <a:buNone/>
-            </a:pPr>
-            <a:r>
-              <a:rPr lang="en-AU" i="1" dirty="0" err="1"/>
-              <a:t>math</a:t>
-            </a:r>
-            <a:r>
-              <a:rPr lang="en-AU" i="1" baseline="-25000" dirty="0" err="1"/>
-              <a:t>ij</a:t>
-            </a:r>
-            <a:r>
-              <a:rPr lang="en-AU" dirty="0"/>
-              <a:t> = </a:t>
-            </a:r>
-            <a:r>
-              <a:rPr lang="el-GR" dirty="0"/>
-              <a:t>γ</a:t>
-            </a:r>
-            <a:r>
-              <a:rPr lang="en-AU" baseline="-25000" dirty="0"/>
-              <a:t>00</a:t>
-            </a:r>
-            <a:r>
-              <a:rPr lang="en-AU" dirty="0"/>
-              <a:t> + </a:t>
-            </a:r>
-            <a:r>
-              <a:rPr lang="el-GR" dirty="0"/>
-              <a:t>γ</a:t>
-            </a:r>
-            <a:r>
-              <a:rPr lang="en-AU" baseline="-25000" dirty="0"/>
-              <a:t>10</a:t>
-            </a:r>
-            <a:r>
-              <a:rPr lang="en-AU" dirty="0"/>
-              <a:t>ses</a:t>
-            </a:r>
-            <a:r>
-              <a:rPr lang="en-AU" i="1" baseline="-25000" dirty="0"/>
-              <a:t>ij</a:t>
-            </a:r>
-            <a:r>
-              <a:rPr lang="en-AU" dirty="0"/>
-              <a:t> + u</a:t>
-            </a:r>
-            <a:r>
-              <a:rPr lang="en-AU" baseline="-25000" dirty="0"/>
-              <a:t>1j</a:t>
-            </a:r>
-            <a:r>
-              <a:rPr lang="en-AU" dirty="0"/>
-              <a:t>ses</a:t>
-            </a:r>
-            <a:r>
-              <a:rPr lang="en-AU" i="1" baseline="-25000" dirty="0"/>
-              <a:t>ij</a:t>
-            </a:r>
-            <a:r>
-              <a:rPr lang="en-AU" dirty="0"/>
-              <a:t> + u</a:t>
-            </a:r>
-            <a:r>
-              <a:rPr lang="en-AU" baseline="-25000" dirty="0"/>
-              <a:t>0j </a:t>
-            </a:r>
-            <a:r>
-              <a:rPr lang="en-AU" dirty="0"/>
-              <a:t>+ </a:t>
-            </a:r>
-            <a:r>
-              <a:rPr lang="en-AU" i="1" dirty="0" err="1"/>
-              <a:t>ε</a:t>
-            </a:r>
-            <a:r>
-              <a:rPr lang="en-AU" i="1" baseline="-25000" dirty="0" err="1"/>
-              <a:t>ij</a:t>
-            </a:r>
-            <a:endParaRPr lang="en-AU" dirty="0"/>
-          </a:p>
-        </p:txBody>
-      </p:sp>
-      <p:pic>
-        <p:nvPicPr>
-          <p:cNvPr id="5" name="Picture 4">
-            <a:extLst>
-              <a:ext uri="{FF2B5EF4-FFF2-40B4-BE49-F238E27FC236}">
-                <a16:creationId xmlns:a16="http://schemas.microsoft.com/office/drawing/2014/main" id="{46B68FA8-F684-4592-99D6-5C23CDE344DF}"/>
-              </a:ext>
-            </a:extLst>
-          </p:cNvPr>
-          <p:cNvPicPr>
-            <a:picLocks noChangeAspect="1"/>
-          </p:cNvPicPr>
-          <p:nvPr/>
-        </p:nvPicPr>
-        <p:blipFill>
-          <a:blip r:embed="rId3"/>
-          <a:stretch>
-            <a:fillRect/>
-          </a:stretch>
-        </p:blipFill>
-        <p:spPr>
-          <a:xfrm>
-            <a:off x="1510095" y="1552809"/>
-            <a:ext cx="6123809" cy="3752381"/>
-          </a:xfrm>
-          <a:prstGeom prst="rect">
-            <a:avLst/>
-          </a:prstGeom>
-        </p:spPr>
-      </p:pic>
-    </p:spTree>
-    <p:extLst>
-      <p:ext uri="{BB962C8B-B14F-4D97-AF65-F5344CB8AC3E}">
-        <p14:creationId xmlns:p14="http://schemas.microsoft.com/office/powerpoint/2010/main" val="1942340641"/>
-      </p:ext>
-    </p:extLst>
-  </p:cSld>
-  <p:clrMapOvr>
-    <a:masterClrMapping/>
-  </p:clrMapOvr>
-</p:sld>
-</file>
-
-<file path=ppt/slides/slide11.xml><?xml version="1.0" encoding="utf-8"?>
-<p:sld xmlns:a="http://schemas.openxmlformats.org/drawingml/2006/main" xmlns:r="http://schemas.openxmlformats.org/officeDocument/2006/relationships" xmlns:p="http://schemas.openxmlformats.org/presentationml/2006/main">
-  <p:cSld>
-    <p:spTree>
-      <p:nvGrpSpPr>
-        <p:cNvPr id="1" name=""/>
-        <p:cNvGrpSpPr/>
-        <p:nvPr/>
-      </p:nvGrpSpPr>
-      <p:grpSpPr>
-        <a:xfrm>
-          <a:off x="0" y="0"/>
-          <a:ext cx="0" cy="0"/>
-          <a:chOff x="0" y="0"/>
-          <a:chExt cx="0" cy="0"/>
-        </a:xfrm>
-      </p:grpSpPr>
-      <p:sp>
-        <p:nvSpPr>
-          <p:cNvPr id="4" name="Title 3"/>
-          <p:cNvSpPr>
-            <a:spLocks noGrp="1"/>
-          </p:cNvSpPr>
-          <p:nvPr>
-            <p:ph type="title"/>
-          </p:nvPr>
-        </p:nvSpPr>
-        <p:spPr/>
-        <p:txBody>
-          <a:bodyPr/>
-          <a:lstStyle/>
-          <a:p>
-            <a:r>
-              <a:rPr lang="en-AU" dirty="0"/>
-              <a:t>Regression models for each school</a:t>
-            </a:r>
-          </a:p>
-        </p:txBody>
-      </p:sp>
-      <p:sp>
-        <p:nvSpPr>
-          <p:cNvPr id="2" name="Slide Number Placeholder 1"/>
-          <p:cNvSpPr>
-            <a:spLocks noGrp="1"/>
-          </p:cNvSpPr>
-          <p:nvPr>
-            <p:ph type="sldNum" sz="quarter" idx="12"/>
-          </p:nvPr>
-        </p:nvSpPr>
-        <p:spPr/>
-        <p:txBody>
-          <a:bodyPr/>
-          <a:lstStyle/>
-          <a:p>
-            <a:fld id="{B6F15528-21DE-4FAA-801E-634DDDAF4B2B}" type="slidenum">
-              <a:rPr lang="en-US" smtClean="0"/>
-              <a:pPr/>
-              <a:t>11</a:t>
-            </a:fld>
-            <a:endParaRPr lang="en-US"/>
-          </a:p>
-        </p:txBody>
-      </p:sp>
-      <p:sp>
-        <p:nvSpPr>
-          <p:cNvPr id="3" name="Rectangle 2">
-            <a:extLst>
-              <a:ext uri="{FF2B5EF4-FFF2-40B4-BE49-F238E27FC236}">
-                <a16:creationId xmlns:a16="http://schemas.microsoft.com/office/drawing/2014/main" id="{11E978A6-6544-4ADB-B5F0-E7DF10F74946}"/>
-              </a:ext>
-            </a:extLst>
-          </p:cNvPr>
-          <p:cNvSpPr/>
-          <p:nvPr/>
-        </p:nvSpPr>
-        <p:spPr>
-          <a:xfrm>
-            <a:off x="5943600" y="1187450"/>
-            <a:ext cx="1295400" cy="3689350"/>
-          </a:xfrm>
-          <a:prstGeom prst="rect">
-            <a:avLst/>
-          </a:prstGeom>
-          <a:solidFill>
-            <a:schemeClr val="bg1"/>
-          </a:solidFill>
-          <a:ln>
-            <a:solidFill>
-              <a:schemeClr val="bg1"/>
-            </a:solidFill>
-          </a:ln>
-        </p:spPr>
-        <p:style>
-          <a:lnRef idx="2">
-            <a:schemeClr val="accent1">
-              <a:shade val="50000"/>
-            </a:schemeClr>
-          </a:lnRef>
-          <a:fillRef idx="1">
-            <a:schemeClr val="accent1"/>
-          </a:fillRef>
-          <a:effectRef idx="0">
-            <a:schemeClr val="accent1"/>
-          </a:effectRef>
-          <a:fontRef idx="minor">
-            <a:schemeClr val="lt1"/>
-          </a:fontRef>
-        </p:style>
-        <p:txBody>
-          <a:bodyPr rtlCol="0" anchor="ctr"/>
-          <a:lstStyle/>
-          <a:p>
-            <a:pPr algn="ctr"/>
-            <a:endParaRPr lang="en-AU"/>
-          </a:p>
-        </p:txBody>
-      </p:sp>
-      <p:sp>
-        <p:nvSpPr>
-          <p:cNvPr id="6" name="Content Placeholder 2">
-            <a:extLst>
-              <a:ext uri="{FF2B5EF4-FFF2-40B4-BE49-F238E27FC236}">
-                <a16:creationId xmlns:a16="http://schemas.microsoft.com/office/drawing/2014/main" id="{6F49E5F7-CE16-4DD9-8A74-BD3C8EA91A20}"/>
-              </a:ext>
-            </a:extLst>
-          </p:cNvPr>
-          <p:cNvSpPr txBox="1">
-            <a:spLocks/>
-          </p:cNvSpPr>
-          <p:nvPr/>
-        </p:nvSpPr>
-        <p:spPr>
-          <a:xfrm>
-            <a:off x="1143000" y="5371735"/>
-            <a:ext cx="6934200" cy="533399"/>
-          </a:xfrm>
-          <a:prstGeom prst="rect">
-            <a:avLst/>
-          </a:prstGeom>
-        </p:spPr>
-        <p:style>
-          <a:lnRef idx="0">
-            <a:schemeClr val="accent4"/>
-          </a:lnRef>
-          <a:fillRef idx="3">
-            <a:schemeClr val="accent4"/>
-          </a:fillRef>
-          <a:effectRef idx="3">
-            <a:schemeClr val="accent4"/>
-          </a:effectRef>
-          <a:fontRef idx="minor">
-            <a:schemeClr val="lt1"/>
-          </a:fontRef>
-        </p:style>
-        <p:txBody>
-          <a:bodyPr vert="horz" lIns="91440" tIns="45720" rIns="91440" bIns="45720" rtlCol="0">
-            <a:normAutofit/>
-          </a:bodyPr>
-          <a:lstStyle>
-            <a:lvl1pPr marL="342900" indent="-342900" algn="l" defTabSz="914400" rtl="0" eaLnBrk="1" latinLnBrk="0" hangingPunct="1">
-              <a:spcBef>
-                <a:spcPct val="20000"/>
-              </a:spcBef>
-              <a:buFont typeface="Arial" pitchFamily="34" charset="0"/>
-              <a:buChar char="•"/>
-              <a:defRPr sz="2800" kern="1200">
-                <a:solidFill>
-                  <a:schemeClr val="lt1"/>
-                </a:solidFill>
-                <a:latin typeface="+mn-lt"/>
-                <a:ea typeface="+mn-ea"/>
-                <a:cs typeface="+mn-cs"/>
-              </a:defRPr>
-            </a:lvl1pPr>
-            <a:lvl2pPr marL="742950" indent="-285750" algn="l" defTabSz="914400" rtl="0" eaLnBrk="1" latinLnBrk="0" hangingPunct="1">
-              <a:spcBef>
-                <a:spcPct val="20000"/>
-              </a:spcBef>
-              <a:buFont typeface="Arial" pitchFamily="34" charset="0"/>
-              <a:buChar char="–"/>
-              <a:defRPr sz="2400" kern="1200">
-                <a:solidFill>
-                  <a:schemeClr val="lt1"/>
-                </a:solidFill>
-                <a:latin typeface="+mn-lt"/>
-                <a:ea typeface="+mn-ea"/>
-                <a:cs typeface="+mn-cs"/>
-              </a:defRPr>
-            </a:lvl2pPr>
-            <a:lvl3pPr marL="1143000" indent="-228600" algn="l" defTabSz="914400" rtl="0" eaLnBrk="1" latinLnBrk="0" hangingPunct="1">
-              <a:spcBef>
-                <a:spcPct val="20000"/>
-              </a:spcBef>
-              <a:buFont typeface="Arial" pitchFamily="34" charset="0"/>
-              <a:buChar char="•"/>
-              <a:defRPr sz="2400" kern="1200">
-                <a:solidFill>
-                  <a:schemeClr val="lt1"/>
-                </a:solidFill>
-                <a:latin typeface="+mn-lt"/>
-                <a:ea typeface="+mn-ea"/>
-                <a:cs typeface="+mn-cs"/>
-              </a:defRPr>
-            </a:lvl3pPr>
-            <a:lvl4pPr marL="1600200" indent="-228600" algn="l" defTabSz="914400" rtl="0" eaLnBrk="1" latinLnBrk="0" hangingPunct="1">
-              <a:spcBef>
-                <a:spcPct val="20000"/>
-              </a:spcBef>
-              <a:buFont typeface="Arial" pitchFamily="34" charset="0"/>
-              <a:buChar char="–"/>
-              <a:defRPr sz="2000" kern="1200">
-                <a:solidFill>
-                  <a:schemeClr val="lt1"/>
-                </a:solidFill>
-                <a:latin typeface="+mn-lt"/>
-                <a:ea typeface="+mn-ea"/>
-                <a:cs typeface="+mn-cs"/>
-              </a:defRPr>
-            </a:lvl4pPr>
-            <a:lvl5pPr marL="2057400" indent="-228600" algn="l" defTabSz="914400" rtl="0" eaLnBrk="1" latinLnBrk="0" hangingPunct="1">
-              <a:spcBef>
-                <a:spcPct val="20000"/>
-              </a:spcBef>
-              <a:buFont typeface="Arial" pitchFamily="34" charset="0"/>
-              <a:buChar char="»"/>
-              <a:defRPr sz="2000" kern="1200">
-                <a:solidFill>
-                  <a:schemeClr val="lt1"/>
-                </a:solidFill>
-                <a:latin typeface="+mn-lt"/>
-                <a:ea typeface="+mn-ea"/>
-                <a:cs typeface="+mn-cs"/>
-              </a:defRPr>
-            </a:lvl5pPr>
-            <a:lvl6pPr marL="2514600" indent="-228600" algn="l" defTabSz="914400" rtl="0" eaLnBrk="1" latinLnBrk="0" hangingPunct="1">
-              <a:spcBef>
-                <a:spcPct val="20000"/>
-              </a:spcBef>
-              <a:buFont typeface="Arial" pitchFamily="34" charset="0"/>
-              <a:buChar char="•"/>
-              <a:defRPr sz="2000" kern="1200">
-                <a:solidFill>
-                  <a:schemeClr val="lt1"/>
-                </a:solidFill>
-                <a:latin typeface="+mn-lt"/>
-                <a:ea typeface="+mn-ea"/>
-                <a:cs typeface="+mn-cs"/>
-              </a:defRPr>
-            </a:lvl6pPr>
-            <a:lvl7pPr marL="2971800" indent="-228600" algn="l" defTabSz="914400" rtl="0" eaLnBrk="1" latinLnBrk="0" hangingPunct="1">
-              <a:spcBef>
-                <a:spcPct val="20000"/>
-              </a:spcBef>
-              <a:buFont typeface="Arial" pitchFamily="34" charset="0"/>
-              <a:buChar char="•"/>
-              <a:defRPr sz="2000" kern="1200">
-                <a:solidFill>
-                  <a:schemeClr val="lt1"/>
-                </a:solidFill>
-                <a:latin typeface="+mn-lt"/>
-                <a:ea typeface="+mn-ea"/>
-                <a:cs typeface="+mn-cs"/>
-              </a:defRPr>
-            </a:lvl7pPr>
-            <a:lvl8pPr marL="3429000" indent="-228600" algn="l" defTabSz="914400" rtl="0" eaLnBrk="1" latinLnBrk="0" hangingPunct="1">
-              <a:spcBef>
-                <a:spcPct val="20000"/>
-              </a:spcBef>
-              <a:buFont typeface="Arial" pitchFamily="34" charset="0"/>
-              <a:buChar char="•"/>
-              <a:defRPr sz="2000" kern="1200">
-                <a:solidFill>
-                  <a:schemeClr val="lt1"/>
-                </a:solidFill>
-                <a:latin typeface="+mn-lt"/>
-                <a:ea typeface="+mn-ea"/>
-                <a:cs typeface="+mn-cs"/>
-              </a:defRPr>
-            </a:lvl8pPr>
-            <a:lvl9pPr marL="3886200" indent="-228600" algn="l" defTabSz="914400" rtl="0" eaLnBrk="1" latinLnBrk="0" hangingPunct="1">
-              <a:spcBef>
-                <a:spcPct val="20000"/>
-              </a:spcBef>
-              <a:buFont typeface="Arial" pitchFamily="34" charset="0"/>
-              <a:buChar char="•"/>
-              <a:defRPr sz="2000" kern="1200">
-                <a:solidFill>
-                  <a:schemeClr val="lt1"/>
-                </a:solidFill>
-                <a:latin typeface="+mn-lt"/>
-                <a:ea typeface="+mn-ea"/>
-                <a:cs typeface="+mn-cs"/>
-              </a:defRPr>
-            </a:lvl9pPr>
-          </a:lstStyle>
-          <a:p>
-            <a:pPr marL="0" indent="0" algn="ctr">
-              <a:buNone/>
-            </a:pPr>
-            <a:r>
-              <a:rPr lang="en-AU" i="1" dirty="0" err="1"/>
-              <a:t>math</a:t>
-            </a:r>
-            <a:r>
-              <a:rPr lang="en-AU" i="1" baseline="-25000" dirty="0" err="1"/>
-              <a:t>ij</a:t>
-            </a:r>
-            <a:r>
-              <a:rPr lang="en-AU" dirty="0"/>
-              <a:t> = </a:t>
-            </a:r>
-            <a:r>
-              <a:rPr lang="el-GR" dirty="0"/>
-              <a:t>γ</a:t>
-            </a:r>
-            <a:r>
-              <a:rPr lang="en-AU" baseline="-25000" dirty="0"/>
-              <a:t>00</a:t>
-            </a:r>
-            <a:r>
-              <a:rPr lang="en-AU" dirty="0"/>
-              <a:t> + </a:t>
-            </a:r>
-            <a:r>
-              <a:rPr lang="el-GR" dirty="0"/>
-              <a:t>γ</a:t>
-            </a:r>
-            <a:r>
-              <a:rPr lang="en-AU" baseline="-25000" dirty="0"/>
-              <a:t>10</a:t>
-            </a:r>
-            <a:r>
-              <a:rPr lang="en-AU" dirty="0"/>
-              <a:t>ses</a:t>
-            </a:r>
-            <a:r>
-              <a:rPr lang="en-AU" i="1" baseline="-25000" dirty="0"/>
-              <a:t>ij</a:t>
-            </a:r>
-            <a:r>
-              <a:rPr lang="en-AU" dirty="0"/>
-              <a:t> + u</a:t>
-            </a:r>
-            <a:r>
-              <a:rPr lang="en-AU" baseline="-25000" dirty="0"/>
-              <a:t>1j</a:t>
-            </a:r>
-            <a:r>
-              <a:rPr lang="en-AU" dirty="0"/>
-              <a:t>x</a:t>
-            </a:r>
-            <a:r>
-              <a:rPr lang="en-AU" i="1" baseline="-25000" dirty="0"/>
-              <a:t> </a:t>
-            </a:r>
-            <a:r>
-              <a:rPr lang="en-AU" i="1" baseline="-25000" dirty="0" err="1"/>
-              <a:t>ij</a:t>
-            </a:r>
-            <a:r>
-              <a:rPr lang="en-AU" dirty="0"/>
-              <a:t> </a:t>
-            </a:r>
-            <a:r>
-              <a:rPr lang="en-AU" baseline="-25000" dirty="0"/>
-              <a:t> </a:t>
-            </a:r>
-            <a:r>
-              <a:rPr lang="en-AU" dirty="0"/>
-              <a:t> + u</a:t>
-            </a:r>
-            <a:r>
-              <a:rPr lang="en-AU" baseline="-25000" dirty="0"/>
-              <a:t>0j </a:t>
-            </a:r>
-            <a:r>
-              <a:rPr lang="en-AU" dirty="0"/>
-              <a:t>+ </a:t>
-            </a:r>
-            <a:r>
-              <a:rPr lang="en-AU" i="1" dirty="0" err="1"/>
-              <a:t>ε</a:t>
-            </a:r>
-            <a:r>
-              <a:rPr lang="en-AU" i="1" baseline="-25000" dirty="0" err="1"/>
-              <a:t>ij</a:t>
-            </a:r>
-            <a:endParaRPr lang="en-AU" dirty="0"/>
-          </a:p>
-        </p:txBody>
-      </p:sp>
-      <p:sp>
-        <p:nvSpPr>
-          <p:cNvPr id="7" name="Content Placeholder 2">
-            <a:extLst>
-              <a:ext uri="{FF2B5EF4-FFF2-40B4-BE49-F238E27FC236}">
-                <a16:creationId xmlns:a16="http://schemas.microsoft.com/office/drawing/2014/main" id="{7D9A1B5C-A32A-437C-90B3-46FEEF57CF26}"/>
-              </a:ext>
-            </a:extLst>
-          </p:cNvPr>
-          <p:cNvSpPr txBox="1">
-            <a:spLocks/>
-          </p:cNvSpPr>
-          <p:nvPr/>
-        </p:nvSpPr>
-        <p:spPr>
-          <a:xfrm>
-            <a:off x="1143000" y="5371734"/>
-            <a:ext cx="6934200" cy="533399"/>
-          </a:xfrm>
-          <a:prstGeom prst="rect">
-            <a:avLst/>
-          </a:prstGeom>
-        </p:spPr>
-        <p:style>
-          <a:lnRef idx="0">
-            <a:schemeClr val="accent4"/>
-          </a:lnRef>
-          <a:fillRef idx="3">
-            <a:schemeClr val="accent4"/>
-          </a:fillRef>
-          <a:effectRef idx="3">
-            <a:schemeClr val="accent4"/>
-          </a:effectRef>
-          <a:fontRef idx="minor">
-            <a:schemeClr val="lt1"/>
-          </a:fontRef>
-        </p:style>
-        <p:txBody>
-          <a:bodyPr vert="horz" lIns="91440" tIns="45720" rIns="91440" bIns="45720" rtlCol="0">
-            <a:normAutofit/>
-          </a:bodyPr>
-          <a:lstStyle>
-            <a:lvl1pPr marL="342900" indent="-342900" algn="l" defTabSz="914400" rtl="0" eaLnBrk="1" latinLnBrk="0" hangingPunct="1">
-              <a:spcBef>
-                <a:spcPct val="20000"/>
-              </a:spcBef>
-              <a:buFont typeface="Arial" pitchFamily="34" charset="0"/>
-              <a:buChar char="•"/>
-              <a:defRPr sz="2800" kern="1200">
-                <a:solidFill>
-                  <a:schemeClr val="lt1"/>
-                </a:solidFill>
-                <a:latin typeface="+mn-lt"/>
-                <a:ea typeface="+mn-ea"/>
-                <a:cs typeface="+mn-cs"/>
-              </a:defRPr>
-            </a:lvl1pPr>
-            <a:lvl2pPr marL="742950" indent="-285750" algn="l" defTabSz="914400" rtl="0" eaLnBrk="1" latinLnBrk="0" hangingPunct="1">
-              <a:spcBef>
-                <a:spcPct val="20000"/>
-              </a:spcBef>
-              <a:buFont typeface="Arial" pitchFamily="34" charset="0"/>
-              <a:buChar char="–"/>
-              <a:defRPr sz="2400" kern="1200">
-                <a:solidFill>
-                  <a:schemeClr val="lt1"/>
-                </a:solidFill>
-                <a:latin typeface="+mn-lt"/>
-                <a:ea typeface="+mn-ea"/>
-                <a:cs typeface="+mn-cs"/>
-              </a:defRPr>
-            </a:lvl2pPr>
-            <a:lvl3pPr marL="1143000" indent="-228600" algn="l" defTabSz="914400" rtl="0" eaLnBrk="1" latinLnBrk="0" hangingPunct="1">
-              <a:spcBef>
-                <a:spcPct val="20000"/>
-              </a:spcBef>
-              <a:buFont typeface="Arial" pitchFamily="34" charset="0"/>
-              <a:buChar char="•"/>
-              <a:defRPr sz="2400" kern="1200">
-                <a:solidFill>
-                  <a:schemeClr val="lt1"/>
-                </a:solidFill>
-                <a:latin typeface="+mn-lt"/>
-                <a:ea typeface="+mn-ea"/>
-                <a:cs typeface="+mn-cs"/>
-              </a:defRPr>
-            </a:lvl3pPr>
-            <a:lvl4pPr marL="1600200" indent="-228600" algn="l" defTabSz="914400" rtl="0" eaLnBrk="1" latinLnBrk="0" hangingPunct="1">
-              <a:spcBef>
-                <a:spcPct val="20000"/>
-              </a:spcBef>
-              <a:buFont typeface="Arial" pitchFamily="34" charset="0"/>
-              <a:buChar char="–"/>
-              <a:defRPr sz="2000" kern="1200">
-                <a:solidFill>
-                  <a:schemeClr val="lt1"/>
-                </a:solidFill>
-                <a:latin typeface="+mn-lt"/>
-                <a:ea typeface="+mn-ea"/>
-                <a:cs typeface="+mn-cs"/>
-              </a:defRPr>
-            </a:lvl4pPr>
-            <a:lvl5pPr marL="2057400" indent="-228600" algn="l" defTabSz="914400" rtl="0" eaLnBrk="1" latinLnBrk="0" hangingPunct="1">
-              <a:spcBef>
-                <a:spcPct val="20000"/>
-              </a:spcBef>
-              <a:buFont typeface="Arial" pitchFamily="34" charset="0"/>
-              <a:buChar char="»"/>
-              <a:defRPr sz="2000" kern="1200">
-                <a:solidFill>
-                  <a:schemeClr val="lt1"/>
-                </a:solidFill>
-                <a:latin typeface="+mn-lt"/>
-                <a:ea typeface="+mn-ea"/>
-                <a:cs typeface="+mn-cs"/>
-              </a:defRPr>
-            </a:lvl5pPr>
-            <a:lvl6pPr marL="2514600" indent="-228600" algn="l" defTabSz="914400" rtl="0" eaLnBrk="1" latinLnBrk="0" hangingPunct="1">
-              <a:spcBef>
-                <a:spcPct val="20000"/>
-              </a:spcBef>
-              <a:buFont typeface="Arial" pitchFamily="34" charset="0"/>
-              <a:buChar char="•"/>
-              <a:defRPr sz="2000" kern="1200">
-                <a:solidFill>
-                  <a:schemeClr val="lt1"/>
-                </a:solidFill>
-                <a:latin typeface="+mn-lt"/>
-                <a:ea typeface="+mn-ea"/>
-                <a:cs typeface="+mn-cs"/>
-              </a:defRPr>
-            </a:lvl6pPr>
-            <a:lvl7pPr marL="2971800" indent="-228600" algn="l" defTabSz="914400" rtl="0" eaLnBrk="1" latinLnBrk="0" hangingPunct="1">
-              <a:spcBef>
-                <a:spcPct val="20000"/>
-              </a:spcBef>
-              <a:buFont typeface="Arial" pitchFamily="34" charset="0"/>
-              <a:buChar char="•"/>
-              <a:defRPr sz="2000" kern="1200">
-                <a:solidFill>
-                  <a:schemeClr val="lt1"/>
-                </a:solidFill>
-                <a:latin typeface="+mn-lt"/>
-                <a:ea typeface="+mn-ea"/>
-                <a:cs typeface="+mn-cs"/>
-              </a:defRPr>
-            </a:lvl7pPr>
-            <a:lvl8pPr marL="3429000" indent="-228600" algn="l" defTabSz="914400" rtl="0" eaLnBrk="1" latinLnBrk="0" hangingPunct="1">
-              <a:spcBef>
-                <a:spcPct val="20000"/>
-              </a:spcBef>
-              <a:buFont typeface="Arial" pitchFamily="34" charset="0"/>
-              <a:buChar char="•"/>
-              <a:defRPr sz="2000" kern="1200">
-                <a:solidFill>
-                  <a:schemeClr val="lt1"/>
-                </a:solidFill>
-                <a:latin typeface="+mn-lt"/>
-                <a:ea typeface="+mn-ea"/>
-                <a:cs typeface="+mn-cs"/>
-              </a:defRPr>
-            </a:lvl8pPr>
-            <a:lvl9pPr marL="3886200" indent="-228600" algn="l" defTabSz="914400" rtl="0" eaLnBrk="1" latinLnBrk="0" hangingPunct="1">
-              <a:spcBef>
-                <a:spcPct val="20000"/>
-              </a:spcBef>
-              <a:buFont typeface="Arial" pitchFamily="34" charset="0"/>
-              <a:buChar char="•"/>
-              <a:defRPr sz="2000" kern="1200">
-                <a:solidFill>
-                  <a:schemeClr val="lt1"/>
-                </a:solidFill>
-                <a:latin typeface="+mn-lt"/>
-                <a:ea typeface="+mn-ea"/>
-                <a:cs typeface="+mn-cs"/>
-              </a:defRPr>
-            </a:lvl9pPr>
-          </a:lstStyle>
-          <a:p>
-            <a:pPr marL="0" indent="0" algn="ctr">
-              <a:buNone/>
-            </a:pPr>
-            <a:r>
-              <a:rPr lang="en-AU" i="1" dirty="0" err="1"/>
-              <a:t>math</a:t>
-            </a:r>
-            <a:r>
-              <a:rPr lang="en-AU" i="1" baseline="-25000" dirty="0" err="1"/>
-              <a:t>ij</a:t>
-            </a:r>
-            <a:r>
-              <a:rPr lang="en-AU" dirty="0"/>
-              <a:t> = 50 + 7 × </a:t>
-            </a:r>
-            <a:r>
-              <a:rPr lang="en-AU" dirty="0" err="1"/>
-              <a:t>ses</a:t>
-            </a:r>
-            <a:r>
-              <a:rPr lang="en-AU" i="1" baseline="-25000" dirty="0" err="1"/>
-              <a:t>ij</a:t>
-            </a:r>
-            <a:r>
-              <a:rPr lang="en-AU" dirty="0"/>
-              <a:t> + u</a:t>
-            </a:r>
-            <a:r>
-              <a:rPr lang="en-AU" baseline="-25000" dirty="0"/>
-              <a:t>1j</a:t>
-            </a:r>
-            <a:r>
-              <a:rPr lang="en-AU" dirty="0"/>
-              <a:t>ses</a:t>
-            </a:r>
-            <a:r>
-              <a:rPr lang="en-AU" i="1" baseline="-25000" dirty="0"/>
-              <a:t>ij</a:t>
-            </a:r>
-            <a:r>
-              <a:rPr lang="en-AU" dirty="0"/>
-              <a:t> </a:t>
-            </a:r>
-            <a:r>
-              <a:rPr lang="en-AU" baseline="-25000" dirty="0"/>
-              <a:t> </a:t>
-            </a:r>
-            <a:r>
-              <a:rPr lang="en-AU" dirty="0"/>
-              <a:t> + u</a:t>
-            </a:r>
-            <a:r>
-              <a:rPr lang="en-AU" baseline="-25000" dirty="0"/>
-              <a:t>0j </a:t>
-            </a:r>
-            <a:r>
-              <a:rPr lang="en-AU" dirty="0"/>
-              <a:t>+ </a:t>
-            </a:r>
-            <a:r>
-              <a:rPr lang="en-AU" i="1" dirty="0" err="1"/>
-              <a:t>ε</a:t>
-            </a:r>
-            <a:r>
-              <a:rPr lang="en-AU" i="1" baseline="-25000" dirty="0" err="1"/>
-              <a:t>ij</a:t>
-            </a:r>
-            <a:endParaRPr lang="en-AU" dirty="0"/>
-          </a:p>
-        </p:txBody>
-      </p:sp>
-      <p:pic>
-        <p:nvPicPr>
-          <p:cNvPr id="5" name="Picture 4">
-            <a:extLst>
-              <a:ext uri="{FF2B5EF4-FFF2-40B4-BE49-F238E27FC236}">
-                <a16:creationId xmlns:a16="http://schemas.microsoft.com/office/drawing/2014/main" id="{10A1A70E-5BA0-45A1-8FF6-BBEB371E966F}"/>
-              </a:ext>
-            </a:extLst>
-          </p:cNvPr>
-          <p:cNvPicPr>
-            <a:picLocks noChangeAspect="1"/>
-          </p:cNvPicPr>
-          <p:nvPr/>
-        </p:nvPicPr>
-        <p:blipFill>
-          <a:blip r:embed="rId3"/>
-          <a:stretch>
-            <a:fillRect/>
-          </a:stretch>
-        </p:blipFill>
-        <p:spPr>
-          <a:xfrm>
-            <a:off x="1510095" y="1552809"/>
-            <a:ext cx="6123809" cy="3752381"/>
-          </a:xfrm>
-          <a:prstGeom prst="rect">
-            <a:avLst/>
-          </a:prstGeom>
-        </p:spPr>
-      </p:pic>
-    </p:spTree>
-    <p:extLst>
-      <p:ext uri="{BB962C8B-B14F-4D97-AF65-F5344CB8AC3E}">
-        <p14:creationId xmlns:p14="http://schemas.microsoft.com/office/powerpoint/2010/main" val="610956641"/>
-      </p:ext>
-    </p:extLst>
-  </p:cSld>
-  <p:clrMapOvr>
-    <a:masterClrMapping/>
-  </p:clrMapOvr>
-</p:sld>
-</file>
-
-<file path=ppt/slides/slide12.xml><?xml version="1.0" encoding="utf-8"?>
-<p:sld xmlns:a="http://schemas.openxmlformats.org/drawingml/2006/main" xmlns:r="http://schemas.openxmlformats.org/officeDocument/2006/relationships" xmlns:p="http://schemas.openxmlformats.org/presentationml/2006/main">
-  <p:cSld>
-    <p:spTree>
-      <p:nvGrpSpPr>
-        <p:cNvPr id="1" name=""/>
-        <p:cNvGrpSpPr/>
-        <p:nvPr/>
-      </p:nvGrpSpPr>
-      <p:grpSpPr>
-        <a:xfrm>
-          <a:off x="0" y="0"/>
-          <a:ext cx="0" cy="0"/>
-          <a:chOff x="0" y="0"/>
-          <a:chExt cx="0" cy="0"/>
-        </a:xfrm>
-      </p:grpSpPr>
-      <p:sp>
-        <p:nvSpPr>
-          <p:cNvPr id="2" name="Title 1"/>
-          <p:cNvSpPr>
-            <a:spLocks noGrp="1"/>
-          </p:cNvSpPr>
-          <p:nvPr>
-            <p:ph type="title"/>
-          </p:nvPr>
-        </p:nvSpPr>
-        <p:spPr/>
-        <p:txBody>
-          <a:bodyPr>
-            <a:normAutofit/>
-          </a:bodyPr>
-          <a:lstStyle/>
-          <a:p>
-            <a:r>
-              <a:rPr lang="en-AU" dirty="0"/>
-              <a:t>Random effects ANOVA</a:t>
-            </a:r>
-          </a:p>
-        </p:txBody>
-      </p:sp>
-      <p:sp>
-        <p:nvSpPr>
-          <p:cNvPr id="5" name="Content Placeholder 2"/>
-          <p:cNvSpPr txBox="1">
-            <a:spLocks/>
-          </p:cNvSpPr>
-          <p:nvPr/>
-        </p:nvSpPr>
-        <p:spPr>
-          <a:xfrm>
-            <a:off x="457200" y="5654677"/>
-            <a:ext cx="8229600" cy="533399"/>
-          </a:xfrm>
-          <a:prstGeom prst="rect">
-            <a:avLst/>
-          </a:prstGeom>
-        </p:spPr>
-        <p:style>
-          <a:lnRef idx="0">
-            <a:schemeClr val="accent4"/>
-          </a:lnRef>
-          <a:fillRef idx="3">
-            <a:schemeClr val="accent4"/>
-          </a:fillRef>
-          <a:effectRef idx="3">
-            <a:schemeClr val="accent4"/>
-          </a:effectRef>
-          <a:fontRef idx="minor">
-            <a:schemeClr val="lt1"/>
-          </a:fontRef>
-        </p:style>
-        <p:txBody>
-          <a:bodyPr vert="horz" lIns="91440" tIns="45720" rIns="91440" bIns="45720" rtlCol="0">
-            <a:normAutofit/>
-          </a:bodyPr>
-          <a:lstStyle>
-            <a:lvl1pPr marL="342900" indent="-342900" algn="l" defTabSz="914400" rtl="0" eaLnBrk="1" latinLnBrk="0" hangingPunct="1">
-              <a:spcBef>
-                <a:spcPct val="20000"/>
-              </a:spcBef>
-              <a:buFont typeface="Arial" pitchFamily="34" charset="0"/>
-              <a:buChar char="•"/>
-              <a:defRPr sz="2800" kern="1200">
-                <a:solidFill>
-                  <a:schemeClr val="lt1"/>
-                </a:solidFill>
-                <a:latin typeface="+mn-lt"/>
-                <a:ea typeface="+mn-ea"/>
-                <a:cs typeface="+mn-cs"/>
-              </a:defRPr>
-            </a:lvl1pPr>
-            <a:lvl2pPr marL="742950" indent="-285750" algn="l" defTabSz="914400" rtl="0" eaLnBrk="1" latinLnBrk="0" hangingPunct="1">
-              <a:spcBef>
-                <a:spcPct val="20000"/>
-              </a:spcBef>
-              <a:buFont typeface="Arial" pitchFamily="34" charset="0"/>
-              <a:buChar char="–"/>
-              <a:defRPr sz="2400" kern="1200">
-                <a:solidFill>
-                  <a:schemeClr val="lt1"/>
-                </a:solidFill>
-                <a:latin typeface="+mn-lt"/>
-                <a:ea typeface="+mn-ea"/>
-                <a:cs typeface="+mn-cs"/>
-              </a:defRPr>
-            </a:lvl2pPr>
-            <a:lvl3pPr marL="1143000" indent="-228600" algn="l" defTabSz="914400" rtl="0" eaLnBrk="1" latinLnBrk="0" hangingPunct="1">
-              <a:spcBef>
-                <a:spcPct val="20000"/>
-              </a:spcBef>
-              <a:buFont typeface="Arial" pitchFamily="34" charset="0"/>
-              <a:buChar char="•"/>
-              <a:defRPr sz="2400" kern="1200">
-                <a:solidFill>
-                  <a:schemeClr val="lt1"/>
-                </a:solidFill>
-                <a:latin typeface="+mn-lt"/>
-                <a:ea typeface="+mn-ea"/>
-                <a:cs typeface="+mn-cs"/>
-              </a:defRPr>
-            </a:lvl3pPr>
-            <a:lvl4pPr marL="1600200" indent="-228600" algn="l" defTabSz="914400" rtl="0" eaLnBrk="1" latinLnBrk="0" hangingPunct="1">
-              <a:spcBef>
-                <a:spcPct val="20000"/>
-              </a:spcBef>
-              <a:buFont typeface="Arial" pitchFamily="34" charset="0"/>
-              <a:buChar char="–"/>
-              <a:defRPr sz="2000" kern="1200">
-                <a:solidFill>
-                  <a:schemeClr val="lt1"/>
-                </a:solidFill>
-                <a:latin typeface="+mn-lt"/>
-                <a:ea typeface="+mn-ea"/>
-                <a:cs typeface="+mn-cs"/>
-              </a:defRPr>
-            </a:lvl4pPr>
-            <a:lvl5pPr marL="2057400" indent="-228600" algn="l" defTabSz="914400" rtl="0" eaLnBrk="1" latinLnBrk="0" hangingPunct="1">
-              <a:spcBef>
-                <a:spcPct val="20000"/>
-              </a:spcBef>
-              <a:buFont typeface="Arial" pitchFamily="34" charset="0"/>
-              <a:buChar char="»"/>
-              <a:defRPr sz="2000" kern="1200">
-                <a:solidFill>
-                  <a:schemeClr val="lt1"/>
-                </a:solidFill>
-                <a:latin typeface="+mn-lt"/>
-                <a:ea typeface="+mn-ea"/>
-                <a:cs typeface="+mn-cs"/>
-              </a:defRPr>
-            </a:lvl5pPr>
-            <a:lvl6pPr marL="2514600" indent="-228600" algn="l" defTabSz="914400" rtl="0" eaLnBrk="1" latinLnBrk="0" hangingPunct="1">
-              <a:spcBef>
-                <a:spcPct val="20000"/>
-              </a:spcBef>
-              <a:buFont typeface="Arial" pitchFamily="34" charset="0"/>
-              <a:buChar char="•"/>
-              <a:defRPr sz="2000" kern="1200">
-                <a:solidFill>
-                  <a:schemeClr val="lt1"/>
-                </a:solidFill>
-                <a:latin typeface="+mn-lt"/>
-                <a:ea typeface="+mn-ea"/>
-                <a:cs typeface="+mn-cs"/>
-              </a:defRPr>
-            </a:lvl6pPr>
-            <a:lvl7pPr marL="2971800" indent="-228600" algn="l" defTabSz="914400" rtl="0" eaLnBrk="1" latinLnBrk="0" hangingPunct="1">
-              <a:spcBef>
-                <a:spcPct val="20000"/>
-              </a:spcBef>
-              <a:buFont typeface="Arial" pitchFamily="34" charset="0"/>
-              <a:buChar char="•"/>
-              <a:defRPr sz="2000" kern="1200">
-                <a:solidFill>
-                  <a:schemeClr val="lt1"/>
-                </a:solidFill>
-                <a:latin typeface="+mn-lt"/>
-                <a:ea typeface="+mn-ea"/>
-                <a:cs typeface="+mn-cs"/>
-              </a:defRPr>
-            </a:lvl7pPr>
-            <a:lvl8pPr marL="3429000" indent="-228600" algn="l" defTabSz="914400" rtl="0" eaLnBrk="1" latinLnBrk="0" hangingPunct="1">
-              <a:spcBef>
-                <a:spcPct val="20000"/>
-              </a:spcBef>
-              <a:buFont typeface="Arial" pitchFamily="34" charset="0"/>
-              <a:buChar char="•"/>
-              <a:defRPr sz="2000" kern="1200">
-                <a:solidFill>
-                  <a:schemeClr val="lt1"/>
-                </a:solidFill>
-                <a:latin typeface="+mn-lt"/>
-                <a:ea typeface="+mn-ea"/>
-                <a:cs typeface="+mn-cs"/>
-              </a:defRPr>
-            </a:lvl8pPr>
-            <a:lvl9pPr marL="3886200" indent="-228600" algn="l" defTabSz="914400" rtl="0" eaLnBrk="1" latinLnBrk="0" hangingPunct="1">
-              <a:spcBef>
-                <a:spcPct val="20000"/>
-              </a:spcBef>
-              <a:buFont typeface="Arial" pitchFamily="34" charset="0"/>
-              <a:buChar char="•"/>
-              <a:defRPr sz="2000" kern="1200">
-                <a:solidFill>
-                  <a:schemeClr val="lt1"/>
-                </a:solidFill>
-                <a:latin typeface="+mn-lt"/>
-                <a:ea typeface="+mn-ea"/>
-                <a:cs typeface="+mn-cs"/>
-              </a:defRPr>
-            </a:lvl9pPr>
-          </a:lstStyle>
-          <a:p>
-            <a:pPr marL="0" indent="0" algn="ctr">
-              <a:buNone/>
-            </a:pPr>
-            <a:r>
-              <a:rPr lang="en-AU" i="1" dirty="0" err="1"/>
-              <a:t>Y</a:t>
-            </a:r>
-            <a:r>
-              <a:rPr lang="en-AU" i="1" baseline="-25000" dirty="0" err="1"/>
-              <a:t>ij</a:t>
-            </a:r>
-            <a:r>
-              <a:rPr lang="en-AU" dirty="0"/>
-              <a:t> = </a:t>
-            </a:r>
-            <a:r>
-              <a:rPr lang="el-GR" dirty="0"/>
-              <a:t>γ</a:t>
-            </a:r>
-            <a:r>
-              <a:rPr lang="en-AU" baseline="-25000" dirty="0"/>
-              <a:t>00</a:t>
-            </a:r>
-            <a:r>
-              <a:rPr lang="en-AU" dirty="0"/>
-              <a:t> + u</a:t>
-            </a:r>
-            <a:r>
-              <a:rPr lang="en-AU" baseline="-25000" dirty="0"/>
-              <a:t>0j </a:t>
-            </a:r>
-            <a:r>
-              <a:rPr lang="en-AU" dirty="0"/>
-              <a:t>+ </a:t>
-            </a:r>
-            <a:r>
-              <a:rPr lang="en-AU" i="1" dirty="0" err="1"/>
-              <a:t>ε</a:t>
-            </a:r>
-            <a:r>
-              <a:rPr lang="en-AU" i="1" baseline="-25000" dirty="0" err="1"/>
-              <a:t>ij</a:t>
-            </a:r>
-            <a:endParaRPr lang="en-AU" dirty="0"/>
-          </a:p>
-        </p:txBody>
-      </p:sp>
-      <p:sp>
-        <p:nvSpPr>
-          <p:cNvPr id="4" name="Slide Number Placeholder 3"/>
-          <p:cNvSpPr>
-            <a:spLocks noGrp="1"/>
-          </p:cNvSpPr>
-          <p:nvPr>
-            <p:ph type="sldNum" sz="quarter" idx="12"/>
-          </p:nvPr>
-        </p:nvSpPr>
-        <p:spPr/>
-        <p:txBody>
-          <a:bodyPr/>
-          <a:lstStyle/>
-          <a:p>
-            <a:fld id="{B6F15528-21DE-4FAA-801E-634DDDAF4B2B}" type="slidenum">
-              <a:rPr lang="en-US" smtClean="0"/>
-              <a:pPr/>
-              <a:t>12</a:t>
-            </a:fld>
-            <a:endParaRPr lang="en-US"/>
-          </a:p>
-        </p:txBody>
-      </p:sp>
-      <p:pic>
-        <p:nvPicPr>
-          <p:cNvPr id="6" name="Picture 5">
-            <a:extLst>
-              <a:ext uri="{FF2B5EF4-FFF2-40B4-BE49-F238E27FC236}">
-                <a16:creationId xmlns:a16="http://schemas.microsoft.com/office/drawing/2014/main" id="{013ED30A-5955-42E6-B24E-F54CA90A9127}"/>
-              </a:ext>
-            </a:extLst>
-          </p:cNvPr>
-          <p:cNvPicPr>
-            <a:picLocks noChangeAspect="1"/>
-          </p:cNvPicPr>
-          <p:nvPr/>
-        </p:nvPicPr>
-        <p:blipFill>
-          <a:blip r:embed="rId3"/>
-          <a:stretch>
-            <a:fillRect/>
-          </a:stretch>
-        </p:blipFill>
-        <p:spPr>
-          <a:xfrm>
-            <a:off x="1510095" y="1552809"/>
-            <a:ext cx="6123809" cy="3752381"/>
-          </a:xfrm>
-          <a:prstGeom prst="rect">
-            <a:avLst/>
-          </a:prstGeom>
-        </p:spPr>
-      </p:pic>
-    </p:spTree>
-    <p:extLst>
-      <p:ext uri="{BB962C8B-B14F-4D97-AF65-F5344CB8AC3E}">
-        <p14:creationId xmlns:p14="http://schemas.microsoft.com/office/powerpoint/2010/main" val="1195364263"/>
-      </p:ext>
-    </p:extLst>
-  </p:cSld>
-  <p:clrMapOvr>
-    <a:masterClrMapping/>
-  </p:clrMapOvr>
-</p:sld>
-</file>
-
-<file path=ppt/slides/slide13.xml><?xml version="1.0" encoding="utf-8"?>
-<p:sld xmlns:a="http://schemas.openxmlformats.org/drawingml/2006/main" xmlns:r="http://schemas.openxmlformats.org/officeDocument/2006/relationships" xmlns:p="http://schemas.openxmlformats.org/presentationml/2006/main">
-  <p:cSld>
-    <p:spTree>
-      <p:nvGrpSpPr>
-        <p:cNvPr id="1" name=""/>
-        <p:cNvGrpSpPr/>
-        <p:nvPr/>
-      </p:nvGrpSpPr>
-      <p:grpSpPr>
-        <a:xfrm>
-          <a:off x="0" y="0"/>
-          <a:ext cx="0" cy="0"/>
-          <a:chOff x="0" y="0"/>
-          <a:chExt cx="0" cy="0"/>
-        </a:xfrm>
-      </p:grpSpPr>
-      <p:sp>
-        <p:nvSpPr>
-          <p:cNvPr id="2" name="Title 1"/>
-          <p:cNvSpPr>
-            <a:spLocks noGrp="1"/>
-          </p:cNvSpPr>
-          <p:nvPr>
-            <p:ph type="title"/>
-          </p:nvPr>
-        </p:nvSpPr>
-        <p:spPr/>
-        <p:txBody>
-          <a:bodyPr>
-            <a:normAutofit/>
-          </a:bodyPr>
-          <a:lstStyle/>
-          <a:p>
-            <a:r>
-              <a:rPr lang="en-AU" dirty="0"/>
-              <a:t>Random intercepts model</a:t>
-            </a:r>
-          </a:p>
-        </p:txBody>
-      </p:sp>
-      <p:sp>
-        <p:nvSpPr>
-          <p:cNvPr id="5" name="Content Placeholder 2"/>
-          <p:cNvSpPr txBox="1">
-            <a:spLocks/>
-          </p:cNvSpPr>
-          <p:nvPr/>
-        </p:nvSpPr>
-        <p:spPr>
-          <a:xfrm>
-            <a:off x="457200" y="5638800"/>
-            <a:ext cx="8229600" cy="533399"/>
-          </a:xfrm>
-          <a:prstGeom prst="rect">
-            <a:avLst/>
-          </a:prstGeom>
-        </p:spPr>
-        <p:style>
-          <a:lnRef idx="0">
-            <a:schemeClr val="accent4"/>
-          </a:lnRef>
-          <a:fillRef idx="3">
-            <a:schemeClr val="accent4"/>
-          </a:fillRef>
-          <a:effectRef idx="3">
-            <a:schemeClr val="accent4"/>
-          </a:effectRef>
-          <a:fontRef idx="minor">
-            <a:schemeClr val="lt1"/>
-          </a:fontRef>
-        </p:style>
-        <p:txBody>
-          <a:bodyPr vert="horz" lIns="91440" tIns="45720" rIns="91440" bIns="45720" rtlCol="0">
-            <a:normAutofit/>
-          </a:bodyPr>
-          <a:lstStyle>
-            <a:lvl1pPr marL="342900" indent="-342900" algn="l" defTabSz="914400" rtl="0" eaLnBrk="1" latinLnBrk="0" hangingPunct="1">
-              <a:spcBef>
-                <a:spcPct val="20000"/>
-              </a:spcBef>
-              <a:buFont typeface="Arial" pitchFamily="34" charset="0"/>
-              <a:buChar char="•"/>
-              <a:defRPr sz="2800" kern="1200">
-                <a:solidFill>
-                  <a:schemeClr val="lt1"/>
-                </a:solidFill>
-                <a:latin typeface="+mn-lt"/>
-                <a:ea typeface="+mn-ea"/>
-                <a:cs typeface="+mn-cs"/>
-              </a:defRPr>
-            </a:lvl1pPr>
-            <a:lvl2pPr marL="742950" indent="-285750" algn="l" defTabSz="914400" rtl="0" eaLnBrk="1" latinLnBrk="0" hangingPunct="1">
-              <a:spcBef>
-                <a:spcPct val="20000"/>
-              </a:spcBef>
-              <a:buFont typeface="Arial" pitchFamily="34" charset="0"/>
-              <a:buChar char="–"/>
-              <a:defRPr sz="2400" kern="1200">
-                <a:solidFill>
-                  <a:schemeClr val="lt1"/>
-                </a:solidFill>
-                <a:latin typeface="+mn-lt"/>
-                <a:ea typeface="+mn-ea"/>
-                <a:cs typeface="+mn-cs"/>
-              </a:defRPr>
-            </a:lvl2pPr>
-            <a:lvl3pPr marL="1143000" indent="-228600" algn="l" defTabSz="914400" rtl="0" eaLnBrk="1" latinLnBrk="0" hangingPunct="1">
-              <a:spcBef>
-                <a:spcPct val="20000"/>
-              </a:spcBef>
-              <a:buFont typeface="Arial" pitchFamily="34" charset="0"/>
-              <a:buChar char="•"/>
-              <a:defRPr sz="2400" kern="1200">
-                <a:solidFill>
-                  <a:schemeClr val="lt1"/>
-                </a:solidFill>
-                <a:latin typeface="+mn-lt"/>
-                <a:ea typeface="+mn-ea"/>
-                <a:cs typeface="+mn-cs"/>
-              </a:defRPr>
-            </a:lvl3pPr>
-            <a:lvl4pPr marL="1600200" indent="-228600" algn="l" defTabSz="914400" rtl="0" eaLnBrk="1" latinLnBrk="0" hangingPunct="1">
-              <a:spcBef>
-                <a:spcPct val="20000"/>
-              </a:spcBef>
-              <a:buFont typeface="Arial" pitchFamily="34" charset="0"/>
-              <a:buChar char="–"/>
-              <a:defRPr sz="2000" kern="1200">
-                <a:solidFill>
-                  <a:schemeClr val="lt1"/>
-                </a:solidFill>
-                <a:latin typeface="+mn-lt"/>
-                <a:ea typeface="+mn-ea"/>
-                <a:cs typeface="+mn-cs"/>
-              </a:defRPr>
-            </a:lvl4pPr>
-            <a:lvl5pPr marL="2057400" indent="-228600" algn="l" defTabSz="914400" rtl="0" eaLnBrk="1" latinLnBrk="0" hangingPunct="1">
-              <a:spcBef>
-                <a:spcPct val="20000"/>
-              </a:spcBef>
-              <a:buFont typeface="Arial" pitchFamily="34" charset="0"/>
-              <a:buChar char="»"/>
-              <a:defRPr sz="2000" kern="1200">
-                <a:solidFill>
-                  <a:schemeClr val="lt1"/>
-                </a:solidFill>
-                <a:latin typeface="+mn-lt"/>
-                <a:ea typeface="+mn-ea"/>
-                <a:cs typeface="+mn-cs"/>
-              </a:defRPr>
-            </a:lvl5pPr>
-            <a:lvl6pPr marL="2514600" indent="-228600" algn="l" defTabSz="914400" rtl="0" eaLnBrk="1" latinLnBrk="0" hangingPunct="1">
-              <a:spcBef>
-                <a:spcPct val="20000"/>
-              </a:spcBef>
-              <a:buFont typeface="Arial" pitchFamily="34" charset="0"/>
-              <a:buChar char="•"/>
-              <a:defRPr sz="2000" kern="1200">
-                <a:solidFill>
-                  <a:schemeClr val="lt1"/>
-                </a:solidFill>
-                <a:latin typeface="+mn-lt"/>
-                <a:ea typeface="+mn-ea"/>
-                <a:cs typeface="+mn-cs"/>
-              </a:defRPr>
-            </a:lvl6pPr>
-            <a:lvl7pPr marL="2971800" indent="-228600" algn="l" defTabSz="914400" rtl="0" eaLnBrk="1" latinLnBrk="0" hangingPunct="1">
-              <a:spcBef>
-                <a:spcPct val="20000"/>
-              </a:spcBef>
-              <a:buFont typeface="Arial" pitchFamily="34" charset="0"/>
-              <a:buChar char="•"/>
-              <a:defRPr sz="2000" kern="1200">
-                <a:solidFill>
-                  <a:schemeClr val="lt1"/>
-                </a:solidFill>
-                <a:latin typeface="+mn-lt"/>
-                <a:ea typeface="+mn-ea"/>
-                <a:cs typeface="+mn-cs"/>
-              </a:defRPr>
-            </a:lvl7pPr>
-            <a:lvl8pPr marL="3429000" indent="-228600" algn="l" defTabSz="914400" rtl="0" eaLnBrk="1" latinLnBrk="0" hangingPunct="1">
-              <a:spcBef>
-                <a:spcPct val="20000"/>
-              </a:spcBef>
-              <a:buFont typeface="Arial" pitchFamily="34" charset="0"/>
-              <a:buChar char="•"/>
-              <a:defRPr sz="2000" kern="1200">
-                <a:solidFill>
-                  <a:schemeClr val="lt1"/>
-                </a:solidFill>
-                <a:latin typeface="+mn-lt"/>
-                <a:ea typeface="+mn-ea"/>
-                <a:cs typeface="+mn-cs"/>
-              </a:defRPr>
-            </a:lvl8pPr>
-            <a:lvl9pPr marL="3886200" indent="-228600" algn="l" defTabSz="914400" rtl="0" eaLnBrk="1" latinLnBrk="0" hangingPunct="1">
-              <a:spcBef>
-                <a:spcPct val="20000"/>
-              </a:spcBef>
-              <a:buFont typeface="Arial" pitchFamily="34" charset="0"/>
-              <a:buChar char="•"/>
-              <a:defRPr sz="2000" kern="1200">
-                <a:solidFill>
-                  <a:schemeClr val="lt1"/>
-                </a:solidFill>
-                <a:latin typeface="+mn-lt"/>
-                <a:ea typeface="+mn-ea"/>
-                <a:cs typeface="+mn-cs"/>
-              </a:defRPr>
-            </a:lvl9pPr>
-          </a:lstStyle>
-          <a:p>
-            <a:pPr marL="0" indent="0" algn="ctr">
-              <a:buNone/>
-            </a:pPr>
-            <a:r>
-              <a:rPr lang="en-AU" i="1" dirty="0"/>
-              <a:t>   </a:t>
-            </a:r>
-            <a:r>
-              <a:rPr lang="en-AU" i="1" dirty="0" err="1"/>
-              <a:t>Y</a:t>
-            </a:r>
-            <a:r>
-              <a:rPr lang="en-AU" i="1" baseline="-25000" dirty="0" err="1"/>
-              <a:t>ij</a:t>
-            </a:r>
-            <a:r>
-              <a:rPr lang="en-AU" dirty="0"/>
-              <a:t> = </a:t>
-            </a:r>
-            <a:r>
-              <a:rPr lang="el-GR" dirty="0"/>
-              <a:t>γ</a:t>
-            </a:r>
-            <a:r>
-              <a:rPr lang="en-AU" baseline="-25000" dirty="0"/>
-              <a:t>00</a:t>
-            </a:r>
-            <a:r>
-              <a:rPr lang="en-AU" dirty="0"/>
-              <a:t> </a:t>
-            </a:r>
-            <a:r>
-              <a:rPr lang="en-AU" dirty="0">
-                <a:solidFill>
-                  <a:schemeClr val="accent6"/>
-                </a:solidFill>
-              </a:rPr>
-              <a:t>+ </a:t>
-            </a:r>
-            <a:r>
-              <a:rPr lang="el-GR" dirty="0">
-                <a:solidFill>
-                  <a:schemeClr val="accent6"/>
-                </a:solidFill>
-              </a:rPr>
-              <a:t>γ</a:t>
-            </a:r>
-            <a:r>
-              <a:rPr lang="en-AU" baseline="-25000" dirty="0">
-                <a:solidFill>
-                  <a:schemeClr val="accent6"/>
-                </a:solidFill>
-              </a:rPr>
-              <a:t>10</a:t>
-            </a:r>
-            <a:r>
-              <a:rPr lang="en-AU" dirty="0">
-                <a:solidFill>
-                  <a:schemeClr val="accent6"/>
-                </a:solidFill>
-              </a:rPr>
-              <a:t>x</a:t>
-            </a:r>
-            <a:r>
-              <a:rPr lang="en-AU" i="1" baseline="-25000" dirty="0">
-                <a:solidFill>
-                  <a:schemeClr val="accent6"/>
-                </a:solidFill>
-              </a:rPr>
-              <a:t>ij</a:t>
-            </a:r>
-            <a:r>
-              <a:rPr lang="en-AU" dirty="0">
-                <a:solidFill>
-                  <a:schemeClr val="accent6"/>
-                </a:solidFill>
-              </a:rPr>
-              <a:t> </a:t>
-            </a:r>
-            <a:r>
-              <a:rPr lang="en-AU" dirty="0"/>
-              <a:t>+ u</a:t>
-            </a:r>
-            <a:r>
-              <a:rPr lang="en-AU" baseline="-25000" dirty="0"/>
-              <a:t>0j </a:t>
-            </a:r>
-            <a:r>
-              <a:rPr lang="en-AU" dirty="0"/>
-              <a:t>+ </a:t>
-            </a:r>
-            <a:r>
-              <a:rPr lang="en-AU" i="1" dirty="0" err="1"/>
-              <a:t>ε</a:t>
-            </a:r>
-            <a:r>
-              <a:rPr lang="en-AU" i="1" baseline="-25000" dirty="0" err="1"/>
-              <a:t>ij</a:t>
-            </a:r>
-            <a:endParaRPr lang="en-AU" dirty="0"/>
-          </a:p>
-        </p:txBody>
-      </p:sp>
-      <p:sp>
-        <p:nvSpPr>
-          <p:cNvPr id="4" name="Slide Number Placeholder 3"/>
-          <p:cNvSpPr>
-            <a:spLocks noGrp="1"/>
-          </p:cNvSpPr>
-          <p:nvPr>
-            <p:ph type="sldNum" sz="quarter" idx="12"/>
-          </p:nvPr>
-        </p:nvSpPr>
-        <p:spPr/>
-        <p:txBody>
-          <a:bodyPr/>
-          <a:lstStyle/>
-          <a:p>
-            <a:fld id="{B6F15528-21DE-4FAA-801E-634DDDAF4B2B}" type="slidenum">
-              <a:rPr lang="en-US" smtClean="0"/>
-              <a:pPr/>
-              <a:t>13</a:t>
-            </a:fld>
-            <a:endParaRPr lang="en-US"/>
-          </a:p>
-        </p:txBody>
-      </p:sp>
-      <p:pic>
-        <p:nvPicPr>
-          <p:cNvPr id="6" name="Picture 5">
-            <a:extLst>
-              <a:ext uri="{FF2B5EF4-FFF2-40B4-BE49-F238E27FC236}">
-                <a16:creationId xmlns:a16="http://schemas.microsoft.com/office/drawing/2014/main" id="{2B92984E-E557-4A79-82B2-D8275988315A}"/>
-              </a:ext>
-            </a:extLst>
-          </p:cNvPr>
-          <p:cNvPicPr>
-            <a:picLocks noChangeAspect="1"/>
-          </p:cNvPicPr>
-          <p:nvPr/>
-        </p:nvPicPr>
-        <p:blipFill>
-          <a:blip r:embed="rId3"/>
-          <a:stretch>
-            <a:fillRect/>
-          </a:stretch>
-        </p:blipFill>
-        <p:spPr>
-          <a:xfrm>
-            <a:off x="1510095" y="1552809"/>
-            <a:ext cx="6123809" cy="3752381"/>
-          </a:xfrm>
-          <a:prstGeom prst="rect">
-            <a:avLst/>
-          </a:prstGeom>
-        </p:spPr>
-      </p:pic>
-    </p:spTree>
-    <p:extLst>
-      <p:ext uri="{BB962C8B-B14F-4D97-AF65-F5344CB8AC3E}">
-        <p14:creationId xmlns:p14="http://schemas.microsoft.com/office/powerpoint/2010/main" val="3643789344"/>
-      </p:ext>
-    </p:extLst>
-  </p:cSld>
-  <p:clrMapOvr>
-    <a:masterClrMapping/>
-  </p:clrMapOvr>
-</p:sld>
-</file>
-
-<file path=ppt/slides/slide14.xml><?xml version="1.0" encoding="utf-8"?>
-<p:sld xmlns:a="http://schemas.openxmlformats.org/drawingml/2006/main" xmlns:r="http://schemas.openxmlformats.org/officeDocument/2006/relationships" xmlns:p="http://schemas.openxmlformats.org/presentationml/2006/main">
-  <p:cSld>
-    <p:spTree>
-      <p:nvGrpSpPr>
-        <p:cNvPr id="1" name=""/>
-        <p:cNvGrpSpPr/>
-        <p:nvPr/>
-      </p:nvGrpSpPr>
-      <p:grpSpPr>
-        <a:xfrm>
-          <a:off x="0" y="0"/>
-          <a:ext cx="0" cy="0"/>
-          <a:chOff x="0" y="0"/>
-          <a:chExt cx="0" cy="0"/>
-        </a:xfrm>
-      </p:grpSpPr>
-      <p:sp>
-        <p:nvSpPr>
-          <p:cNvPr id="2" name="Title 1"/>
-          <p:cNvSpPr>
-            <a:spLocks noGrp="1"/>
-          </p:cNvSpPr>
-          <p:nvPr>
-            <p:ph type="title"/>
-          </p:nvPr>
-        </p:nvSpPr>
-        <p:spPr/>
-        <p:txBody>
-          <a:bodyPr>
-            <a:normAutofit/>
-          </a:bodyPr>
-          <a:lstStyle/>
-          <a:p>
-            <a:r>
-              <a:rPr lang="en-AU" dirty="0"/>
-              <a:t>Random slopes and intercepts model</a:t>
-            </a:r>
-          </a:p>
-        </p:txBody>
-      </p:sp>
-      <p:sp>
-        <p:nvSpPr>
-          <p:cNvPr id="5" name="Content Placeholder 2"/>
-          <p:cNvSpPr txBox="1">
-            <a:spLocks/>
-          </p:cNvSpPr>
-          <p:nvPr/>
-        </p:nvSpPr>
-        <p:spPr>
-          <a:xfrm>
-            <a:off x="457200" y="5638801"/>
-            <a:ext cx="8229600" cy="533399"/>
-          </a:xfrm>
-          <a:prstGeom prst="rect">
-            <a:avLst/>
-          </a:prstGeom>
-        </p:spPr>
-        <p:style>
-          <a:lnRef idx="0">
-            <a:schemeClr val="accent4"/>
-          </a:lnRef>
-          <a:fillRef idx="3">
-            <a:schemeClr val="accent4"/>
-          </a:fillRef>
-          <a:effectRef idx="3">
-            <a:schemeClr val="accent4"/>
-          </a:effectRef>
-          <a:fontRef idx="minor">
-            <a:schemeClr val="lt1"/>
-          </a:fontRef>
-        </p:style>
-        <p:txBody>
-          <a:bodyPr vert="horz" lIns="91440" tIns="45720" rIns="91440" bIns="45720" rtlCol="0">
-            <a:normAutofit/>
-          </a:bodyPr>
-          <a:lstStyle>
-            <a:lvl1pPr marL="342900" indent="-342900" algn="l" defTabSz="914400" rtl="0" eaLnBrk="1" latinLnBrk="0" hangingPunct="1">
-              <a:spcBef>
-                <a:spcPct val="20000"/>
-              </a:spcBef>
-              <a:buFont typeface="Arial" pitchFamily="34" charset="0"/>
-              <a:buChar char="•"/>
-              <a:defRPr sz="2800" kern="1200">
-                <a:solidFill>
-                  <a:schemeClr val="lt1"/>
-                </a:solidFill>
-                <a:latin typeface="+mn-lt"/>
-                <a:ea typeface="+mn-ea"/>
-                <a:cs typeface="+mn-cs"/>
-              </a:defRPr>
-            </a:lvl1pPr>
-            <a:lvl2pPr marL="742950" indent="-285750" algn="l" defTabSz="914400" rtl="0" eaLnBrk="1" latinLnBrk="0" hangingPunct="1">
-              <a:spcBef>
-                <a:spcPct val="20000"/>
-              </a:spcBef>
-              <a:buFont typeface="Arial" pitchFamily="34" charset="0"/>
-              <a:buChar char="–"/>
-              <a:defRPr sz="2400" kern="1200">
-                <a:solidFill>
-                  <a:schemeClr val="lt1"/>
-                </a:solidFill>
-                <a:latin typeface="+mn-lt"/>
-                <a:ea typeface="+mn-ea"/>
-                <a:cs typeface="+mn-cs"/>
-              </a:defRPr>
-            </a:lvl2pPr>
-            <a:lvl3pPr marL="1143000" indent="-228600" algn="l" defTabSz="914400" rtl="0" eaLnBrk="1" latinLnBrk="0" hangingPunct="1">
-              <a:spcBef>
-                <a:spcPct val="20000"/>
-              </a:spcBef>
-              <a:buFont typeface="Arial" pitchFamily="34" charset="0"/>
-              <a:buChar char="•"/>
-              <a:defRPr sz="2400" kern="1200">
-                <a:solidFill>
-                  <a:schemeClr val="lt1"/>
-                </a:solidFill>
-                <a:latin typeface="+mn-lt"/>
-                <a:ea typeface="+mn-ea"/>
-                <a:cs typeface="+mn-cs"/>
-              </a:defRPr>
-            </a:lvl3pPr>
-            <a:lvl4pPr marL="1600200" indent="-228600" algn="l" defTabSz="914400" rtl="0" eaLnBrk="1" latinLnBrk="0" hangingPunct="1">
-              <a:spcBef>
-                <a:spcPct val="20000"/>
-              </a:spcBef>
-              <a:buFont typeface="Arial" pitchFamily="34" charset="0"/>
-              <a:buChar char="–"/>
-              <a:defRPr sz="2000" kern="1200">
-                <a:solidFill>
-                  <a:schemeClr val="lt1"/>
-                </a:solidFill>
-                <a:latin typeface="+mn-lt"/>
-                <a:ea typeface="+mn-ea"/>
-                <a:cs typeface="+mn-cs"/>
-              </a:defRPr>
-            </a:lvl4pPr>
-            <a:lvl5pPr marL="2057400" indent="-228600" algn="l" defTabSz="914400" rtl="0" eaLnBrk="1" latinLnBrk="0" hangingPunct="1">
-              <a:spcBef>
-                <a:spcPct val="20000"/>
-              </a:spcBef>
-              <a:buFont typeface="Arial" pitchFamily="34" charset="0"/>
-              <a:buChar char="»"/>
-              <a:defRPr sz="2000" kern="1200">
-                <a:solidFill>
-                  <a:schemeClr val="lt1"/>
-                </a:solidFill>
-                <a:latin typeface="+mn-lt"/>
-                <a:ea typeface="+mn-ea"/>
-                <a:cs typeface="+mn-cs"/>
-              </a:defRPr>
-            </a:lvl5pPr>
-            <a:lvl6pPr marL="2514600" indent="-228600" algn="l" defTabSz="914400" rtl="0" eaLnBrk="1" latinLnBrk="0" hangingPunct="1">
-              <a:spcBef>
-                <a:spcPct val="20000"/>
-              </a:spcBef>
-              <a:buFont typeface="Arial" pitchFamily="34" charset="0"/>
-              <a:buChar char="•"/>
-              <a:defRPr sz="2000" kern="1200">
-                <a:solidFill>
-                  <a:schemeClr val="lt1"/>
-                </a:solidFill>
-                <a:latin typeface="+mn-lt"/>
-                <a:ea typeface="+mn-ea"/>
-                <a:cs typeface="+mn-cs"/>
-              </a:defRPr>
-            </a:lvl6pPr>
-            <a:lvl7pPr marL="2971800" indent="-228600" algn="l" defTabSz="914400" rtl="0" eaLnBrk="1" latinLnBrk="0" hangingPunct="1">
-              <a:spcBef>
-                <a:spcPct val="20000"/>
-              </a:spcBef>
-              <a:buFont typeface="Arial" pitchFamily="34" charset="0"/>
-              <a:buChar char="•"/>
-              <a:defRPr sz="2000" kern="1200">
-                <a:solidFill>
-                  <a:schemeClr val="lt1"/>
-                </a:solidFill>
-                <a:latin typeface="+mn-lt"/>
-                <a:ea typeface="+mn-ea"/>
-                <a:cs typeface="+mn-cs"/>
-              </a:defRPr>
-            </a:lvl7pPr>
-            <a:lvl8pPr marL="3429000" indent="-228600" algn="l" defTabSz="914400" rtl="0" eaLnBrk="1" latinLnBrk="0" hangingPunct="1">
-              <a:spcBef>
-                <a:spcPct val="20000"/>
-              </a:spcBef>
-              <a:buFont typeface="Arial" pitchFamily="34" charset="0"/>
-              <a:buChar char="•"/>
-              <a:defRPr sz="2000" kern="1200">
-                <a:solidFill>
-                  <a:schemeClr val="lt1"/>
-                </a:solidFill>
-                <a:latin typeface="+mn-lt"/>
-                <a:ea typeface="+mn-ea"/>
-                <a:cs typeface="+mn-cs"/>
-              </a:defRPr>
-            </a:lvl8pPr>
-            <a:lvl9pPr marL="3886200" indent="-228600" algn="l" defTabSz="914400" rtl="0" eaLnBrk="1" latinLnBrk="0" hangingPunct="1">
-              <a:spcBef>
-                <a:spcPct val="20000"/>
-              </a:spcBef>
-              <a:buFont typeface="Arial" pitchFamily="34" charset="0"/>
-              <a:buChar char="•"/>
-              <a:defRPr sz="2000" kern="1200">
-                <a:solidFill>
-                  <a:schemeClr val="lt1"/>
-                </a:solidFill>
-                <a:latin typeface="+mn-lt"/>
-                <a:ea typeface="+mn-ea"/>
-                <a:cs typeface="+mn-cs"/>
-              </a:defRPr>
-            </a:lvl9pPr>
-          </a:lstStyle>
-          <a:p>
-            <a:pPr marL="0" indent="0" algn="ctr">
-              <a:buNone/>
-            </a:pPr>
-            <a:r>
-              <a:rPr lang="en-AU" i="1" dirty="0" err="1"/>
-              <a:t>Y</a:t>
-            </a:r>
-            <a:r>
-              <a:rPr lang="en-AU" i="1" baseline="-25000" dirty="0" err="1"/>
-              <a:t>ij</a:t>
-            </a:r>
-            <a:r>
-              <a:rPr lang="en-AU" dirty="0"/>
-              <a:t> = </a:t>
-            </a:r>
-            <a:r>
-              <a:rPr lang="el-GR" dirty="0"/>
-              <a:t>γ</a:t>
-            </a:r>
-            <a:r>
-              <a:rPr lang="en-AU" baseline="-25000" dirty="0"/>
-              <a:t>00</a:t>
-            </a:r>
-            <a:r>
-              <a:rPr lang="en-AU" dirty="0"/>
-              <a:t> + </a:t>
-            </a:r>
-            <a:r>
-              <a:rPr lang="el-GR" dirty="0"/>
-              <a:t>γ</a:t>
-            </a:r>
-            <a:r>
-              <a:rPr lang="en-AU" baseline="-25000" dirty="0"/>
-              <a:t>10</a:t>
-            </a:r>
-            <a:r>
-              <a:rPr lang="en-AU" dirty="0"/>
-              <a:t>x</a:t>
-            </a:r>
-            <a:r>
-              <a:rPr lang="en-AU" i="1" baseline="-25000" dirty="0"/>
-              <a:t>ij</a:t>
-            </a:r>
-            <a:r>
-              <a:rPr lang="en-AU" dirty="0"/>
-              <a:t> + </a:t>
-            </a:r>
-            <a:r>
-              <a:rPr lang="en-AU" dirty="0">
-                <a:solidFill>
-                  <a:schemeClr val="accent6"/>
-                </a:solidFill>
-              </a:rPr>
-              <a:t>u</a:t>
-            </a:r>
-            <a:r>
-              <a:rPr lang="en-AU" baseline="-25000" dirty="0">
-                <a:solidFill>
-                  <a:schemeClr val="accent6"/>
-                </a:solidFill>
-              </a:rPr>
-              <a:t>1j</a:t>
-            </a:r>
-            <a:r>
-              <a:rPr lang="en-AU" dirty="0">
-                <a:solidFill>
-                  <a:schemeClr val="accent6"/>
-                </a:solidFill>
-              </a:rPr>
-              <a:t>x</a:t>
-            </a:r>
-            <a:r>
-              <a:rPr lang="en-AU" i="1" baseline="-25000" dirty="0">
-                <a:solidFill>
-                  <a:schemeClr val="accent6"/>
-                </a:solidFill>
-              </a:rPr>
-              <a:t>ij</a:t>
-            </a:r>
-            <a:r>
-              <a:rPr lang="en-AU" dirty="0"/>
-              <a:t> + u</a:t>
-            </a:r>
-            <a:r>
-              <a:rPr lang="en-AU" baseline="-25000" dirty="0"/>
-              <a:t>0j </a:t>
-            </a:r>
-            <a:r>
-              <a:rPr lang="en-AU" dirty="0"/>
-              <a:t>+ </a:t>
-            </a:r>
-            <a:r>
-              <a:rPr lang="en-AU" i="1" dirty="0" err="1"/>
-              <a:t>ε</a:t>
-            </a:r>
-            <a:r>
-              <a:rPr lang="en-AU" i="1" baseline="-25000" dirty="0" err="1"/>
-              <a:t>ij</a:t>
-            </a:r>
-            <a:endParaRPr lang="en-AU" dirty="0"/>
-          </a:p>
-        </p:txBody>
-      </p:sp>
-      <p:sp>
-        <p:nvSpPr>
-          <p:cNvPr id="4" name="Slide Number Placeholder 3"/>
-          <p:cNvSpPr>
-            <a:spLocks noGrp="1"/>
-          </p:cNvSpPr>
-          <p:nvPr>
-            <p:ph type="sldNum" sz="quarter" idx="12"/>
-          </p:nvPr>
-        </p:nvSpPr>
-        <p:spPr/>
-        <p:txBody>
-          <a:bodyPr/>
-          <a:lstStyle/>
-          <a:p>
-            <a:fld id="{B6F15528-21DE-4FAA-801E-634DDDAF4B2B}" type="slidenum">
-              <a:rPr lang="en-US" smtClean="0"/>
-              <a:pPr/>
-              <a:t>14</a:t>
-            </a:fld>
-            <a:endParaRPr lang="en-US"/>
-          </a:p>
-        </p:txBody>
-      </p:sp>
-      <p:pic>
-        <p:nvPicPr>
-          <p:cNvPr id="7" name="Picture 6">
-            <a:extLst>
-              <a:ext uri="{FF2B5EF4-FFF2-40B4-BE49-F238E27FC236}">
-                <a16:creationId xmlns:a16="http://schemas.microsoft.com/office/drawing/2014/main" id="{4BFF76B9-5C4C-473B-9504-8DF0FD0C4E48}"/>
-              </a:ext>
-            </a:extLst>
-          </p:cNvPr>
-          <p:cNvPicPr>
-            <a:picLocks noChangeAspect="1"/>
-          </p:cNvPicPr>
-          <p:nvPr/>
-        </p:nvPicPr>
-        <p:blipFill>
-          <a:blip r:embed="rId3"/>
-          <a:stretch>
-            <a:fillRect/>
-          </a:stretch>
-        </p:blipFill>
-        <p:spPr>
-          <a:xfrm>
-            <a:off x="1510095" y="1581619"/>
-            <a:ext cx="6123809" cy="3752381"/>
-          </a:xfrm>
-          <a:prstGeom prst="rect">
-            <a:avLst/>
-          </a:prstGeom>
-        </p:spPr>
-      </p:pic>
-    </p:spTree>
-    <p:extLst>
-      <p:ext uri="{BB962C8B-B14F-4D97-AF65-F5344CB8AC3E}">
-        <p14:creationId xmlns:p14="http://schemas.microsoft.com/office/powerpoint/2010/main" val="2147712972"/>
-      </p:ext>
-    </p:extLst>
-  </p:cSld>
-  <p:clrMapOvr>
-    <a:masterClrMapping/>
-  </p:clrMapOvr>
-</p:sld>
-</file>
-
-<file path=ppt/slides/slide15.xml><?xml version="1.0" encoding="utf-8"?>
-<p:sld xmlns:a="http://schemas.openxmlformats.org/drawingml/2006/main" xmlns:r="http://schemas.openxmlformats.org/officeDocument/2006/relationships" xmlns:p="http://schemas.openxmlformats.org/presentationml/2006/main">
-  <p:cSld>
-    <p:spTree>
-      <p:nvGrpSpPr>
-        <p:cNvPr id="1" name=""/>
-        <p:cNvGrpSpPr/>
-        <p:nvPr/>
-      </p:nvGrpSpPr>
-      <p:grpSpPr>
-        <a:xfrm>
-          <a:off x="0" y="0"/>
-          <a:ext cx="0" cy="0"/>
-          <a:chOff x="0" y="0"/>
-          <a:chExt cx="0" cy="0"/>
-        </a:xfrm>
-      </p:grpSpPr>
-      <p:sp>
-        <p:nvSpPr>
-          <p:cNvPr id="4" name="Title 3"/>
-          <p:cNvSpPr>
-            <a:spLocks noGrp="1"/>
-          </p:cNvSpPr>
-          <p:nvPr>
-            <p:ph type="title"/>
-          </p:nvPr>
-        </p:nvSpPr>
-        <p:spPr/>
-        <p:txBody>
-          <a:bodyPr/>
-          <a:lstStyle/>
-          <a:p>
-            <a:r>
-              <a:rPr lang="en-AU" dirty="0"/>
-              <a:t>One regression model</a:t>
-            </a:r>
-          </a:p>
-        </p:txBody>
-      </p:sp>
-      <p:sp>
-        <p:nvSpPr>
-          <p:cNvPr id="2" name="Slide Number Placeholder 1"/>
-          <p:cNvSpPr>
-            <a:spLocks noGrp="1"/>
-          </p:cNvSpPr>
-          <p:nvPr>
-            <p:ph type="sldNum" sz="quarter" idx="12"/>
-          </p:nvPr>
-        </p:nvSpPr>
-        <p:spPr/>
-        <p:txBody>
-          <a:bodyPr/>
-          <a:lstStyle/>
-          <a:p>
-            <a:fld id="{B6F15528-21DE-4FAA-801E-634DDDAF4B2B}" type="slidenum">
-              <a:rPr lang="en-US" smtClean="0"/>
-              <a:pPr/>
-              <a:t>15</a:t>
-            </a:fld>
-            <a:endParaRPr lang="en-US"/>
-          </a:p>
-        </p:txBody>
-      </p:sp>
-      <p:sp>
-        <p:nvSpPr>
-          <p:cNvPr id="7" name="Content Placeholder 2">
-            <a:extLst>
-              <a:ext uri="{FF2B5EF4-FFF2-40B4-BE49-F238E27FC236}">
-                <a16:creationId xmlns:a16="http://schemas.microsoft.com/office/drawing/2014/main" id="{BE796148-F576-4896-A5D5-2AD0863F5B82}"/>
-              </a:ext>
-            </a:extLst>
-          </p:cNvPr>
-          <p:cNvSpPr txBox="1">
-            <a:spLocks/>
-          </p:cNvSpPr>
-          <p:nvPr/>
-        </p:nvSpPr>
-        <p:spPr>
-          <a:xfrm>
-            <a:off x="457199" y="5341843"/>
-            <a:ext cx="8229600" cy="533399"/>
-          </a:xfrm>
-          <a:prstGeom prst="rect">
-            <a:avLst/>
-          </a:prstGeom>
-        </p:spPr>
-        <p:style>
-          <a:lnRef idx="2">
-            <a:schemeClr val="accent6"/>
-          </a:lnRef>
-          <a:fillRef idx="1">
-            <a:schemeClr val="lt1"/>
-          </a:fillRef>
-          <a:effectRef idx="0">
-            <a:schemeClr val="accent6"/>
-          </a:effectRef>
-          <a:fontRef idx="minor">
-            <a:schemeClr val="dk1"/>
-          </a:fontRef>
-        </p:style>
-        <p:txBody>
-          <a:bodyPr vert="horz" lIns="91440" tIns="45720" rIns="91440" bIns="45720" rtlCol="0">
-            <a:normAutofit/>
-          </a:bodyPr>
-          <a:lstStyle>
-            <a:lvl1pPr marL="342900" indent="-342900" algn="l" defTabSz="914400" rtl="0" eaLnBrk="1" latinLnBrk="0" hangingPunct="1">
-              <a:spcBef>
-                <a:spcPct val="20000"/>
-              </a:spcBef>
-              <a:buFont typeface="Arial" pitchFamily="34" charset="0"/>
-              <a:buChar char="•"/>
-              <a:defRPr sz="2800" kern="1200">
-                <a:solidFill>
-                  <a:schemeClr val="lt1"/>
-                </a:solidFill>
-                <a:latin typeface="+mn-lt"/>
-                <a:ea typeface="+mn-ea"/>
-                <a:cs typeface="+mn-cs"/>
-              </a:defRPr>
-            </a:lvl1pPr>
-            <a:lvl2pPr marL="742950" indent="-285750" algn="l" defTabSz="914400" rtl="0" eaLnBrk="1" latinLnBrk="0" hangingPunct="1">
-              <a:spcBef>
-                <a:spcPct val="20000"/>
-              </a:spcBef>
-              <a:buFont typeface="Arial" pitchFamily="34" charset="0"/>
-              <a:buChar char="–"/>
-              <a:defRPr sz="2400" kern="1200">
-                <a:solidFill>
-                  <a:schemeClr val="lt1"/>
-                </a:solidFill>
-                <a:latin typeface="+mn-lt"/>
-                <a:ea typeface="+mn-ea"/>
-                <a:cs typeface="+mn-cs"/>
-              </a:defRPr>
-            </a:lvl2pPr>
-            <a:lvl3pPr marL="1143000" indent="-228600" algn="l" defTabSz="914400" rtl="0" eaLnBrk="1" latinLnBrk="0" hangingPunct="1">
-              <a:spcBef>
-                <a:spcPct val="20000"/>
-              </a:spcBef>
-              <a:buFont typeface="Arial" pitchFamily="34" charset="0"/>
-              <a:buChar char="•"/>
-              <a:defRPr sz="2400" kern="1200">
-                <a:solidFill>
-                  <a:schemeClr val="lt1"/>
-                </a:solidFill>
-                <a:latin typeface="+mn-lt"/>
-                <a:ea typeface="+mn-ea"/>
-                <a:cs typeface="+mn-cs"/>
-              </a:defRPr>
-            </a:lvl3pPr>
-            <a:lvl4pPr marL="1600200" indent="-228600" algn="l" defTabSz="914400" rtl="0" eaLnBrk="1" latinLnBrk="0" hangingPunct="1">
-              <a:spcBef>
-                <a:spcPct val="20000"/>
-              </a:spcBef>
-              <a:buFont typeface="Arial" pitchFamily="34" charset="0"/>
-              <a:buChar char="–"/>
-              <a:defRPr sz="2000" kern="1200">
-                <a:solidFill>
-                  <a:schemeClr val="lt1"/>
-                </a:solidFill>
-                <a:latin typeface="+mn-lt"/>
-                <a:ea typeface="+mn-ea"/>
-                <a:cs typeface="+mn-cs"/>
-              </a:defRPr>
-            </a:lvl4pPr>
-            <a:lvl5pPr marL="2057400" indent="-228600" algn="l" defTabSz="914400" rtl="0" eaLnBrk="1" latinLnBrk="0" hangingPunct="1">
-              <a:spcBef>
-                <a:spcPct val="20000"/>
-              </a:spcBef>
-              <a:buFont typeface="Arial" pitchFamily="34" charset="0"/>
-              <a:buChar char="»"/>
-              <a:defRPr sz="2000" kern="1200">
-                <a:solidFill>
-                  <a:schemeClr val="lt1"/>
-                </a:solidFill>
-                <a:latin typeface="+mn-lt"/>
-                <a:ea typeface="+mn-ea"/>
-                <a:cs typeface="+mn-cs"/>
-              </a:defRPr>
-            </a:lvl5pPr>
-            <a:lvl6pPr marL="2514600" indent="-228600" algn="l" defTabSz="914400" rtl="0" eaLnBrk="1" latinLnBrk="0" hangingPunct="1">
-              <a:spcBef>
-                <a:spcPct val="20000"/>
-              </a:spcBef>
-              <a:buFont typeface="Arial" pitchFamily="34" charset="0"/>
-              <a:buChar char="•"/>
-              <a:defRPr sz="2000" kern="1200">
-                <a:solidFill>
-                  <a:schemeClr val="lt1"/>
-                </a:solidFill>
-                <a:latin typeface="+mn-lt"/>
-                <a:ea typeface="+mn-ea"/>
-                <a:cs typeface="+mn-cs"/>
-              </a:defRPr>
-            </a:lvl6pPr>
-            <a:lvl7pPr marL="2971800" indent="-228600" algn="l" defTabSz="914400" rtl="0" eaLnBrk="1" latinLnBrk="0" hangingPunct="1">
-              <a:spcBef>
-                <a:spcPct val="20000"/>
-              </a:spcBef>
-              <a:buFont typeface="Arial" pitchFamily="34" charset="0"/>
-              <a:buChar char="•"/>
-              <a:defRPr sz="2000" kern="1200">
-                <a:solidFill>
-                  <a:schemeClr val="lt1"/>
-                </a:solidFill>
-                <a:latin typeface="+mn-lt"/>
-                <a:ea typeface="+mn-ea"/>
-                <a:cs typeface="+mn-cs"/>
-              </a:defRPr>
-            </a:lvl7pPr>
-            <a:lvl8pPr marL="3429000" indent="-228600" algn="l" defTabSz="914400" rtl="0" eaLnBrk="1" latinLnBrk="0" hangingPunct="1">
-              <a:spcBef>
-                <a:spcPct val="20000"/>
-              </a:spcBef>
-              <a:buFont typeface="Arial" pitchFamily="34" charset="0"/>
-              <a:buChar char="•"/>
-              <a:defRPr sz="2000" kern="1200">
-                <a:solidFill>
-                  <a:schemeClr val="lt1"/>
-                </a:solidFill>
-                <a:latin typeface="+mn-lt"/>
-                <a:ea typeface="+mn-ea"/>
-                <a:cs typeface="+mn-cs"/>
-              </a:defRPr>
-            </a:lvl8pPr>
-            <a:lvl9pPr marL="3886200" indent="-228600" algn="l" defTabSz="914400" rtl="0" eaLnBrk="1" latinLnBrk="0" hangingPunct="1">
-              <a:spcBef>
-                <a:spcPct val="20000"/>
-              </a:spcBef>
-              <a:buFont typeface="Arial" pitchFamily="34" charset="0"/>
-              <a:buChar char="•"/>
-              <a:defRPr sz="2000" kern="1200">
-                <a:solidFill>
-                  <a:schemeClr val="lt1"/>
-                </a:solidFill>
-                <a:latin typeface="+mn-lt"/>
-                <a:ea typeface="+mn-ea"/>
-                <a:cs typeface="+mn-cs"/>
-              </a:defRPr>
-            </a:lvl9pPr>
-          </a:lstStyle>
-          <a:p>
-            <a:pPr marL="0" indent="0" algn="ctr">
-              <a:buNone/>
-            </a:pPr>
-            <a:r>
-              <a:rPr lang="en-AU" i="1" dirty="0" err="1">
-                <a:solidFill>
-                  <a:schemeClr val="tx1"/>
-                </a:solidFill>
-              </a:rPr>
-              <a:t>Y</a:t>
-            </a:r>
-            <a:r>
-              <a:rPr lang="en-AU" i="1" baseline="-25000" dirty="0" err="1">
-                <a:solidFill>
-                  <a:schemeClr val="tx1"/>
-                </a:solidFill>
-              </a:rPr>
-              <a:t>ij</a:t>
-            </a:r>
-            <a:r>
-              <a:rPr lang="en-AU" dirty="0">
-                <a:solidFill>
-                  <a:schemeClr val="tx1"/>
-                </a:solidFill>
-              </a:rPr>
-              <a:t> = </a:t>
-            </a:r>
-            <a:r>
-              <a:rPr lang="el-GR" dirty="0">
-                <a:solidFill>
-                  <a:schemeClr val="accent3"/>
-                </a:solidFill>
-              </a:rPr>
-              <a:t>γ</a:t>
-            </a:r>
-            <a:r>
-              <a:rPr lang="en-AU" baseline="-25000" dirty="0">
-                <a:solidFill>
-                  <a:schemeClr val="accent3"/>
-                </a:solidFill>
-              </a:rPr>
-              <a:t>00</a:t>
-            </a:r>
-            <a:r>
-              <a:rPr lang="en-AU" dirty="0">
-                <a:solidFill>
-                  <a:schemeClr val="tx1"/>
-                </a:solidFill>
-              </a:rPr>
-              <a:t> + </a:t>
-            </a:r>
-            <a:r>
-              <a:rPr lang="el-GR" dirty="0">
-                <a:solidFill>
-                  <a:schemeClr val="accent2"/>
-                </a:solidFill>
-              </a:rPr>
-              <a:t>γ</a:t>
-            </a:r>
-            <a:r>
-              <a:rPr lang="en-AU" baseline="-25000" dirty="0">
-                <a:solidFill>
-                  <a:schemeClr val="accent2"/>
-                </a:solidFill>
-              </a:rPr>
-              <a:t>10</a:t>
-            </a:r>
-            <a:r>
-              <a:rPr lang="en-AU" dirty="0">
-                <a:solidFill>
-                  <a:schemeClr val="accent2"/>
-                </a:solidFill>
-              </a:rPr>
-              <a:t>x</a:t>
-            </a:r>
-            <a:r>
-              <a:rPr lang="en-AU" i="1" baseline="-25000" dirty="0">
-                <a:solidFill>
-                  <a:schemeClr val="accent2"/>
-                </a:solidFill>
-              </a:rPr>
-              <a:t>ij</a:t>
-            </a:r>
-            <a:r>
-              <a:rPr lang="en-AU" dirty="0">
-                <a:solidFill>
-                  <a:schemeClr val="accent2"/>
-                </a:solidFill>
-              </a:rPr>
-              <a:t> </a:t>
-            </a:r>
-            <a:r>
-              <a:rPr lang="en-AU" dirty="0">
-                <a:solidFill>
-                  <a:schemeClr val="tx1"/>
-                </a:solidFill>
-              </a:rPr>
-              <a:t>+ </a:t>
-            </a:r>
-            <a:r>
-              <a:rPr lang="en-AU" dirty="0">
-                <a:solidFill>
-                  <a:schemeClr val="accent5"/>
-                </a:solidFill>
-              </a:rPr>
-              <a:t>u</a:t>
-            </a:r>
-            <a:r>
-              <a:rPr lang="en-AU" baseline="-25000" dirty="0">
-                <a:solidFill>
-                  <a:schemeClr val="accent5"/>
-                </a:solidFill>
-              </a:rPr>
-              <a:t>0j</a:t>
-            </a:r>
-            <a:r>
-              <a:rPr lang="en-AU" baseline="-25000" dirty="0">
-                <a:solidFill>
-                  <a:schemeClr val="tx1"/>
-                </a:solidFill>
-              </a:rPr>
-              <a:t> </a:t>
-            </a:r>
-            <a:r>
-              <a:rPr lang="en-AU" dirty="0">
-                <a:solidFill>
-                  <a:schemeClr val="tx1"/>
-                </a:solidFill>
-              </a:rPr>
-              <a:t>+ </a:t>
-            </a:r>
-            <a:r>
-              <a:rPr lang="en-AU" dirty="0">
-                <a:solidFill>
-                  <a:schemeClr val="accent6"/>
-                </a:solidFill>
-              </a:rPr>
-              <a:t>u</a:t>
-            </a:r>
-            <a:r>
-              <a:rPr lang="en-AU" baseline="-25000" dirty="0">
-                <a:solidFill>
-                  <a:schemeClr val="accent6"/>
-                </a:solidFill>
-              </a:rPr>
-              <a:t>1j</a:t>
-            </a:r>
-            <a:r>
-              <a:rPr lang="en-AU" dirty="0">
-                <a:solidFill>
-                  <a:schemeClr val="accent6"/>
-                </a:solidFill>
-              </a:rPr>
-              <a:t>x</a:t>
-            </a:r>
-            <a:r>
-              <a:rPr lang="en-AU" i="1" baseline="-25000" dirty="0">
-                <a:solidFill>
-                  <a:schemeClr val="accent6"/>
-                </a:solidFill>
-              </a:rPr>
-              <a:t>ij</a:t>
-            </a:r>
-            <a:r>
-              <a:rPr lang="en-AU" dirty="0">
-                <a:solidFill>
-                  <a:schemeClr val="tx1"/>
-                </a:solidFill>
-              </a:rPr>
-              <a:t> + </a:t>
-            </a:r>
-            <a:r>
-              <a:rPr lang="en-AU" i="1" dirty="0" err="1">
-                <a:solidFill>
-                  <a:schemeClr val="tx1"/>
-                </a:solidFill>
-              </a:rPr>
-              <a:t>ε</a:t>
-            </a:r>
-            <a:r>
-              <a:rPr lang="en-AU" i="1" baseline="-25000" dirty="0" err="1">
-                <a:solidFill>
-                  <a:schemeClr val="tx1"/>
-                </a:solidFill>
-              </a:rPr>
-              <a:t>ij</a:t>
-            </a:r>
-            <a:endParaRPr lang="en-AU" dirty="0">
-              <a:solidFill>
-                <a:schemeClr val="tx1"/>
-              </a:solidFill>
-            </a:endParaRPr>
-          </a:p>
-        </p:txBody>
-      </p:sp>
-      <p:sp>
-        <p:nvSpPr>
-          <p:cNvPr id="9" name="Content Placeholder 2">
-            <a:extLst>
-              <a:ext uri="{FF2B5EF4-FFF2-40B4-BE49-F238E27FC236}">
-                <a16:creationId xmlns:a16="http://schemas.microsoft.com/office/drawing/2014/main" id="{14D9EC0C-B3F1-4B98-B199-7ED6170ECB53}"/>
-              </a:ext>
-            </a:extLst>
-          </p:cNvPr>
-          <p:cNvSpPr txBox="1">
-            <a:spLocks/>
-          </p:cNvSpPr>
-          <p:nvPr/>
-        </p:nvSpPr>
-        <p:spPr>
-          <a:xfrm>
-            <a:off x="468774" y="6005513"/>
-            <a:ext cx="8229600" cy="533399"/>
-          </a:xfrm>
-          <a:prstGeom prst="rect">
-            <a:avLst/>
-          </a:prstGeom>
-        </p:spPr>
-        <p:style>
-          <a:lnRef idx="2">
-            <a:schemeClr val="accent1"/>
-          </a:lnRef>
-          <a:fillRef idx="1">
-            <a:schemeClr val="lt1"/>
-          </a:fillRef>
-          <a:effectRef idx="0">
-            <a:schemeClr val="accent1"/>
-          </a:effectRef>
-          <a:fontRef idx="minor">
-            <a:schemeClr val="dk1"/>
-          </a:fontRef>
-        </p:style>
-        <p:txBody>
-          <a:bodyPr vert="horz" lIns="91440" tIns="45720" rIns="91440" bIns="45720" rtlCol="0">
-            <a:normAutofit/>
-          </a:bodyPr>
-          <a:lstStyle>
-            <a:lvl1pPr marL="342900" indent="-342900" algn="l" defTabSz="914400" rtl="0" eaLnBrk="1" latinLnBrk="0" hangingPunct="1">
-              <a:spcBef>
-                <a:spcPct val="20000"/>
-              </a:spcBef>
-              <a:buFont typeface="Arial" pitchFamily="34" charset="0"/>
-              <a:buChar char="•"/>
-              <a:defRPr sz="2800" kern="1200">
-                <a:solidFill>
-                  <a:schemeClr val="lt1"/>
-                </a:solidFill>
-                <a:latin typeface="+mn-lt"/>
-                <a:ea typeface="+mn-ea"/>
-                <a:cs typeface="+mn-cs"/>
-              </a:defRPr>
-            </a:lvl1pPr>
-            <a:lvl2pPr marL="742950" indent="-285750" algn="l" defTabSz="914400" rtl="0" eaLnBrk="1" latinLnBrk="0" hangingPunct="1">
-              <a:spcBef>
-                <a:spcPct val="20000"/>
-              </a:spcBef>
-              <a:buFont typeface="Arial" pitchFamily="34" charset="0"/>
-              <a:buChar char="–"/>
-              <a:defRPr sz="2400" kern="1200">
-                <a:solidFill>
-                  <a:schemeClr val="lt1"/>
-                </a:solidFill>
-                <a:latin typeface="+mn-lt"/>
-                <a:ea typeface="+mn-ea"/>
-                <a:cs typeface="+mn-cs"/>
-              </a:defRPr>
-            </a:lvl2pPr>
-            <a:lvl3pPr marL="1143000" indent="-228600" algn="l" defTabSz="914400" rtl="0" eaLnBrk="1" latinLnBrk="0" hangingPunct="1">
-              <a:spcBef>
-                <a:spcPct val="20000"/>
-              </a:spcBef>
-              <a:buFont typeface="Arial" pitchFamily="34" charset="0"/>
-              <a:buChar char="•"/>
-              <a:defRPr sz="2400" kern="1200">
-                <a:solidFill>
-                  <a:schemeClr val="lt1"/>
-                </a:solidFill>
-                <a:latin typeface="+mn-lt"/>
-                <a:ea typeface="+mn-ea"/>
-                <a:cs typeface="+mn-cs"/>
-              </a:defRPr>
-            </a:lvl3pPr>
-            <a:lvl4pPr marL="1600200" indent="-228600" algn="l" defTabSz="914400" rtl="0" eaLnBrk="1" latinLnBrk="0" hangingPunct="1">
-              <a:spcBef>
-                <a:spcPct val="20000"/>
-              </a:spcBef>
-              <a:buFont typeface="Arial" pitchFamily="34" charset="0"/>
-              <a:buChar char="–"/>
-              <a:defRPr sz="2000" kern="1200">
-                <a:solidFill>
-                  <a:schemeClr val="lt1"/>
-                </a:solidFill>
-                <a:latin typeface="+mn-lt"/>
-                <a:ea typeface="+mn-ea"/>
-                <a:cs typeface="+mn-cs"/>
-              </a:defRPr>
-            </a:lvl4pPr>
-            <a:lvl5pPr marL="2057400" indent="-228600" algn="l" defTabSz="914400" rtl="0" eaLnBrk="1" latinLnBrk="0" hangingPunct="1">
-              <a:spcBef>
-                <a:spcPct val="20000"/>
-              </a:spcBef>
-              <a:buFont typeface="Arial" pitchFamily="34" charset="0"/>
-              <a:buChar char="»"/>
-              <a:defRPr sz="2000" kern="1200">
-                <a:solidFill>
-                  <a:schemeClr val="lt1"/>
-                </a:solidFill>
-                <a:latin typeface="+mn-lt"/>
-                <a:ea typeface="+mn-ea"/>
-                <a:cs typeface="+mn-cs"/>
-              </a:defRPr>
-            </a:lvl5pPr>
-            <a:lvl6pPr marL="2514600" indent="-228600" algn="l" defTabSz="914400" rtl="0" eaLnBrk="1" latinLnBrk="0" hangingPunct="1">
-              <a:spcBef>
-                <a:spcPct val="20000"/>
-              </a:spcBef>
-              <a:buFont typeface="Arial" pitchFamily="34" charset="0"/>
-              <a:buChar char="•"/>
-              <a:defRPr sz="2000" kern="1200">
-                <a:solidFill>
-                  <a:schemeClr val="lt1"/>
-                </a:solidFill>
-                <a:latin typeface="+mn-lt"/>
-                <a:ea typeface="+mn-ea"/>
-                <a:cs typeface="+mn-cs"/>
-              </a:defRPr>
-            </a:lvl6pPr>
-            <a:lvl7pPr marL="2971800" indent="-228600" algn="l" defTabSz="914400" rtl="0" eaLnBrk="1" latinLnBrk="0" hangingPunct="1">
-              <a:spcBef>
-                <a:spcPct val="20000"/>
-              </a:spcBef>
-              <a:buFont typeface="Arial" pitchFamily="34" charset="0"/>
-              <a:buChar char="•"/>
-              <a:defRPr sz="2000" kern="1200">
-                <a:solidFill>
-                  <a:schemeClr val="lt1"/>
-                </a:solidFill>
-                <a:latin typeface="+mn-lt"/>
-                <a:ea typeface="+mn-ea"/>
-                <a:cs typeface="+mn-cs"/>
-              </a:defRPr>
-            </a:lvl7pPr>
-            <a:lvl8pPr marL="3429000" indent="-228600" algn="l" defTabSz="914400" rtl="0" eaLnBrk="1" latinLnBrk="0" hangingPunct="1">
-              <a:spcBef>
-                <a:spcPct val="20000"/>
-              </a:spcBef>
-              <a:buFont typeface="Arial" pitchFamily="34" charset="0"/>
-              <a:buChar char="•"/>
-              <a:defRPr sz="2000" kern="1200">
-                <a:solidFill>
-                  <a:schemeClr val="lt1"/>
-                </a:solidFill>
-                <a:latin typeface="+mn-lt"/>
-                <a:ea typeface="+mn-ea"/>
-                <a:cs typeface="+mn-cs"/>
-              </a:defRPr>
-            </a:lvl8pPr>
-            <a:lvl9pPr marL="3886200" indent="-228600" algn="l" defTabSz="914400" rtl="0" eaLnBrk="1" latinLnBrk="0" hangingPunct="1">
-              <a:spcBef>
-                <a:spcPct val="20000"/>
-              </a:spcBef>
-              <a:buFont typeface="Arial" pitchFamily="34" charset="0"/>
-              <a:buChar char="•"/>
-              <a:defRPr sz="2000" kern="1200">
-                <a:solidFill>
-                  <a:schemeClr val="lt1"/>
-                </a:solidFill>
-                <a:latin typeface="+mn-lt"/>
-                <a:ea typeface="+mn-ea"/>
-                <a:cs typeface="+mn-cs"/>
-              </a:defRPr>
-            </a:lvl9pPr>
-          </a:lstStyle>
-          <a:p>
-            <a:pPr marL="0" indent="0" algn="ctr">
-              <a:buNone/>
-            </a:pPr>
-            <a:r>
-              <a:rPr lang="en-AU" dirty="0">
-                <a:solidFill>
-                  <a:schemeClr val="tx1"/>
-                </a:solidFill>
-              </a:rPr>
-              <a:t>y ~ </a:t>
-            </a:r>
-            <a:r>
-              <a:rPr lang="en-AU" dirty="0">
-                <a:solidFill>
-                  <a:schemeClr val="accent3"/>
-                </a:solidFill>
-              </a:rPr>
-              <a:t>1</a:t>
-            </a:r>
-            <a:r>
-              <a:rPr lang="en-AU" dirty="0">
-                <a:solidFill>
-                  <a:schemeClr val="tx1"/>
-                </a:solidFill>
-              </a:rPr>
-              <a:t> + </a:t>
-            </a:r>
-            <a:r>
-              <a:rPr lang="en-AU" dirty="0">
-                <a:solidFill>
-                  <a:schemeClr val="accent2"/>
-                </a:solidFill>
-              </a:rPr>
-              <a:t>x</a:t>
-            </a:r>
-            <a:r>
-              <a:rPr lang="en-AU" dirty="0">
-                <a:solidFill>
-                  <a:schemeClr val="tx1"/>
-                </a:solidFill>
-              </a:rPr>
-              <a:t> + (</a:t>
-            </a:r>
-            <a:r>
-              <a:rPr lang="en-AU" dirty="0">
-                <a:solidFill>
-                  <a:schemeClr val="accent5"/>
-                </a:solidFill>
-              </a:rPr>
-              <a:t>1</a:t>
-            </a:r>
-            <a:r>
-              <a:rPr lang="en-AU" dirty="0">
-                <a:solidFill>
-                  <a:schemeClr val="tx1"/>
-                </a:solidFill>
-              </a:rPr>
-              <a:t> + </a:t>
-            </a:r>
-            <a:r>
-              <a:rPr lang="en-AU" dirty="0">
-                <a:solidFill>
-                  <a:schemeClr val="accent6"/>
-                </a:solidFill>
-              </a:rPr>
-              <a:t>x</a:t>
-            </a:r>
-            <a:r>
-              <a:rPr lang="en-AU" dirty="0">
-                <a:solidFill>
-                  <a:schemeClr val="tx1"/>
-                </a:solidFill>
-              </a:rPr>
-              <a:t> | group)</a:t>
-            </a:r>
-          </a:p>
-        </p:txBody>
-      </p:sp>
-      <p:pic>
-        <p:nvPicPr>
-          <p:cNvPr id="10" name="Picture 9">
-            <a:extLst>
-              <a:ext uri="{FF2B5EF4-FFF2-40B4-BE49-F238E27FC236}">
-                <a16:creationId xmlns:a16="http://schemas.microsoft.com/office/drawing/2014/main" id="{11E37B1E-5386-4541-9CC0-2A4B7153A2E0}"/>
-              </a:ext>
-            </a:extLst>
-          </p:cNvPr>
-          <p:cNvPicPr>
-            <a:picLocks noChangeAspect="1"/>
-          </p:cNvPicPr>
-          <p:nvPr/>
-        </p:nvPicPr>
-        <p:blipFill>
-          <a:blip r:embed="rId3"/>
-          <a:stretch>
-            <a:fillRect/>
-          </a:stretch>
-        </p:blipFill>
-        <p:spPr>
-          <a:xfrm>
-            <a:off x="1521669" y="1406899"/>
-            <a:ext cx="6123809" cy="3752381"/>
-          </a:xfrm>
-          <a:prstGeom prst="rect">
-            <a:avLst/>
-          </a:prstGeom>
-        </p:spPr>
-      </p:pic>
-    </p:spTree>
-    <p:extLst>
-      <p:ext uri="{BB962C8B-B14F-4D97-AF65-F5344CB8AC3E}">
-        <p14:creationId xmlns:p14="http://schemas.microsoft.com/office/powerpoint/2010/main" val="437216007"/>
-      </p:ext>
-    </p:extLst>
-  </p:cSld>
-  <p:clrMapOvr>
-    <a:masterClrMapping/>
-  </p:clrMapOvr>
-</p:sld>
-</file>
-
 <file path=ppt/slides/slide2.xml><?xml version="1.0" encoding="utf-8"?>
 <p:sld xmlns:a="http://schemas.openxmlformats.org/drawingml/2006/main" xmlns:r="http://schemas.openxmlformats.org/officeDocument/2006/relationships" xmlns:p="http://schemas.openxmlformats.org/presentationml/2006/main">
   <p:cSld>
@@ -11995,282 +8230,6 @@
       </p:sp>
       <p:sp>
         <p:nvSpPr>
-          <p:cNvPr id="5" name="Content Placeholder 2"/>
-          <p:cNvSpPr txBox="1">
-            <a:spLocks/>
-          </p:cNvSpPr>
-          <p:nvPr/>
-        </p:nvSpPr>
-        <p:spPr>
-          <a:xfrm>
-            <a:off x="457200" y="5638800"/>
-            <a:ext cx="8229600" cy="533399"/>
-          </a:xfrm>
-          <a:prstGeom prst="rect">
-            <a:avLst/>
-          </a:prstGeom>
-        </p:spPr>
-        <p:style>
-          <a:lnRef idx="0">
-            <a:schemeClr val="accent4"/>
-          </a:lnRef>
-          <a:fillRef idx="3">
-            <a:schemeClr val="accent4"/>
-          </a:fillRef>
-          <a:effectRef idx="3">
-            <a:schemeClr val="accent4"/>
-          </a:effectRef>
-          <a:fontRef idx="minor">
-            <a:schemeClr val="lt1"/>
-          </a:fontRef>
-        </p:style>
-        <p:txBody>
-          <a:bodyPr vert="horz" lIns="91440" tIns="45720" rIns="91440" bIns="45720" rtlCol="0">
-            <a:normAutofit/>
-          </a:bodyPr>
-          <a:lstStyle>
-            <a:lvl1pPr marL="342900" indent="-342900" algn="l" defTabSz="914400" rtl="0" eaLnBrk="1" latinLnBrk="0" hangingPunct="1">
-              <a:spcBef>
-                <a:spcPct val="20000"/>
-              </a:spcBef>
-              <a:buFont typeface="Arial" pitchFamily="34" charset="0"/>
-              <a:buChar char="•"/>
-              <a:defRPr sz="2800" kern="1200">
-                <a:solidFill>
-                  <a:schemeClr val="lt1"/>
-                </a:solidFill>
-                <a:latin typeface="+mn-lt"/>
-                <a:ea typeface="+mn-ea"/>
-                <a:cs typeface="+mn-cs"/>
-              </a:defRPr>
-            </a:lvl1pPr>
-            <a:lvl2pPr marL="742950" indent="-285750" algn="l" defTabSz="914400" rtl="0" eaLnBrk="1" latinLnBrk="0" hangingPunct="1">
-              <a:spcBef>
-                <a:spcPct val="20000"/>
-              </a:spcBef>
-              <a:buFont typeface="Arial" pitchFamily="34" charset="0"/>
-              <a:buChar char="–"/>
-              <a:defRPr sz="2400" kern="1200">
-                <a:solidFill>
-                  <a:schemeClr val="lt1"/>
-                </a:solidFill>
-                <a:latin typeface="+mn-lt"/>
-                <a:ea typeface="+mn-ea"/>
-                <a:cs typeface="+mn-cs"/>
-              </a:defRPr>
-            </a:lvl2pPr>
-            <a:lvl3pPr marL="1143000" indent="-228600" algn="l" defTabSz="914400" rtl="0" eaLnBrk="1" latinLnBrk="0" hangingPunct="1">
-              <a:spcBef>
-                <a:spcPct val="20000"/>
-              </a:spcBef>
-              <a:buFont typeface="Arial" pitchFamily="34" charset="0"/>
-              <a:buChar char="•"/>
-              <a:defRPr sz="2400" kern="1200">
-                <a:solidFill>
-                  <a:schemeClr val="lt1"/>
-                </a:solidFill>
-                <a:latin typeface="+mn-lt"/>
-                <a:ea typeface="+mn-ea"/>
-                <a:cs typeface="+mn-cs"/>
-              </a:defRPr>
-            </a:lvl3pPr>
-            <a:lvl4pPr marL="1600200" indent="-228600" algn="l" defTabSz="914400" rtl="0" eaLnBrk="1" latinLnBrk="0" hangingPunct="1">
-              <a:spcBef>
-                <a:spcPct val="20000"/>
-              </a:spcBef>
-              <a:buFont typeface="Arial" pitchFamily="34" charset="0"/>
-              <a:buChar char="–"/>
-              <a:defRPr sz="2000" kern="1200">
-                <a:solidFill>
-                  <a:schemeClr val="lt1"/>
-                </a:solidFill>
-                <a:latin typeface="+mn-lt"/>
-                <a:ea typeface="+mn-ea"/>
-                <a:cs typeface="+mn-cs"/>
-              </a:defRPr>
-            </a:lvl4pPr>
-            <a:lvl5pPr marL="2057400" indent="-228600" algn="l" defTabSz="914400" rtl="0" eaLnBrk="1" latinLnBrk="0" hangingPunct="1">
-              <a:spcBef>
-                <a:spcPct val="20000"/>
-              </a:spcBef>
-              <a:buFont typeface="Arial" pitchFamily="34" charset="0"/>
-              <a:buChar char="»"/>
-              <a:defRPr sz="2000" kern="1200">
-                <a:solidFill>
-                  <a:schemeClr val="lt1"/>
-                </a:solidFill>
-                <a:latin typeface="+mn-lt"/>
-                <a:ea typeface="+mn-ea"/>
-                <a:cs typeface="+mn-cs"/>
-              </a:defRPr>
-            </a:lvl5pPr>
-            <a:lvl6pPr marL="2514600" indent="-228600" algn="l" defTabSz="914400" rtl="0" eaLnBrk="1" latinLnBrk="0" hangingPunct="1">
-              <a:spcBef>
-                <a:spcPct val="20000"/>
-              </a:spcBef>
-              <a:buFont typeface="Arial" pitchFamily="34" charset="0"/>
-              <a:buChar char="•"/>
-              <a:defRPr sz="2000" kern="1200">
-                <a:solidFill>
-                  <a:schemeClr val="lt1"/>
-                </a:solidFill>
-                <a:latin typeface="+mn-lt"/>
-                <a:ea typeface="+mn-ea"/>
-                <a:cs typeface="+mn-cs"/>
-              </a:defRPr>
-            </a:lvl6pPr>
-            <a:lvl7pPr marL="2971800" indent="-228600" algn="l" defTabSz="914400" rtl="0" eaLnBrk="1" latinLnBrk="0" hangingPunct="1">
-              <a:spcBef>
-                <a:spcPct val="20000"/>
-              </a:spcBef>
-              <a:buFont typeface="Arial" pitchFamily="34" charset="0"/>
-              <a:buChar char="•"/>
-              <a:defRPr sz="2000" kern="1200">
-                <a:solidFill>
-                  <a:schemeClr val="lt1"/>
-                </a:solidFill>
-                <a:latin typeface="+mn-lt"/>
-                <a:ea typeface="+mn-ea"/>
-                <a:cs typeface="+mn-cs"/>
-              </a:defRPr>
-            </a:lvl7pPr>
-            <a:lvl8pPr marL="3429000" indent="-228600" algn="l" defTabSz="914400" rtl="0" eaLnBrk="1" latinLnBrk="0" hangingPunct="1">
-              <a:spcBef>
-                <a:spcPct val="20000"/>
-              </a:spcBef>
-              <a:buFont typeface="Arial" pitchFamily="34" charset="0"/>
-              <a:buChar char="•"/>
-              <a:defRPr sz="2000" kern="1200">
-                <a:solidFill>
-                  <a:schemeClr val="lt1"/>
-                </a:solidFill>
-                <a:latin typeface="+mn-lt"/>
-                <a:ea typeface="+mn-ea"/>
-                <a:cs typeface="+mn-cs"/>
-              </a:defRPr>
-            </a:lvl8pPr>
-            <a:lvl9pPr marL="3886200" indent="-228600" algn="l" defTabSz="914400" rtl="0" eaLnBrk="1" latinLnBrk="0" hangingPunct="1">
-              <a:spcBef>
-                <a:spcPct val="20000"/>
-              </a:spcBef>
-              <a:buFont typeface="Arial" pitchFamily="34" charset="0"/>
-              <a:buChar char="•"/>
-              <a:defRPr sz="2000" kern="1200">
-                <a:solidFill>
-                  <a:schemeClr val="lt1"/>
-                </a:solidFill>
-                <a:latin typeface="+mn-lt"/>
-                <a:ea typeface="+mn-ea"/>
-                <a:cs typeface="+mn-cs"/>
-              </a:defRPr>
-            </a:lvl9pPr>
-          </a:lstStyle>
-          <a:p>
-            <a:pPr marL="0" indent="0" algn="ctr">
-              <a:buNone/>
-            </a:pPr>
-            <a:r>
-              <a:rPr lang="en-AU" i="1" dirty="0"/>
-              <a:t>   </a:t>
-            </a:r>
-            <a:r>
-              <a:rPr lang="en-AU" i="1" dirty="0" err="1"/>
-              <a:t>Y</a:t>
-            </a:r>
-            <a:r>
-              <a:rPr lang="en-AU" i="1" baseline="-25000" dirty="0" err="1"/>
-              <a:t>ij</a:t>
-            </a:r>
-            <a:r>
-              <a:rPr lang="en-AU" dirty="0"/>
-              <a:t> = </a:t>
-            </a:r>
-            <a:r>
-              <a:rPr lang="el-GR" dirty="0"/>
-              <a:t>γ</a:t>
-            </a:r>
-            <a:r>
-              <a:rPr lang="en-AU" baseline="-25000" dirty="0"/>
-              <a:t>00</a:t>
-            </a:r>
-            <a:r>
-              <a:rPr lang="en-AU" dirty="0"/>
-              <a:t> </a:t>
-            </a:r>
-            <a:r>
-              <a:rPr lang="en-AU" dirty="0">
-                <a:solidFill>
-                  <a:schemeClr val="accent6"/>
-                </a:solidFill>
-              </a:rPr>
-              <a:t>+ </a:t>
-            </a:r>
-            <a:r>
-              <a:rPr lang="el-GR" dirty="0">
-                <a:solidFill>
-                  <a:schemeClr val="accent6"/>
-                </a:solidFill>
-              </a:rPr>
-              <a:t>γ</a:t>
-            </a:r>
-            <a:r>
-              <a:rPr lang="en-AU" baseline="-25000" dirty="0">
-                <a:solidFill>
-                  <a:schemeClr val="accent6"/>
-                </a:solidFill>
-              </a:rPr>
-              <a:t>10</a:t>
-            </a:r>
-            <a:r>
-              <a:rPr lang="en-AU" dirty="0">
-                <a:solidFill>
-                  <a:schemeClr val="accent6"/>
-                </a:solidFill>
-              </a:rPr>
-              <a:t>x</a:t>
-            </a:r>
-            <a:r>
-              <a:rPr lang="en-AU" i="1" baseline="-25000" dirty="0">
-                <a:solidFill>
-                  <a:schemeClr val="accent6"/>
-                </a:solidFill>
-              </a:rPr>
-              <a:t>ij</a:t>
-            </a:r>
-            <a:r>
-              <a:rPr lang="en-AU" dirty="0">
-                <a:solidFill>
-                  <a:schemeClr val="accent6"/>
-                </a:solidFill>
-              </a:rPr>
-              <a:t> </a:t>
-            </a:r>
-            <a:r>
-              <a:rPr lang="en-AU" dirty="0"/>
-              <a:t>+ u</a:t>
-            </a:r>
-            <a:r>
-              <a:rPr lang="en-AU" baseline="-25000" dirty="0"/>
-              <a:t>0j </a:t>
-            </a:r>
-            <a:r>
-              <a:rPr lang="en-AU" dirty="0"/>
-              <a:t>+ </a:t>
-            </a:r>
-            <a:r>
-              <a:rPr lang="en-AU" i="1" dirty="0" err="1"/>
-              <a:t>ε</a:t>
-            </a:r>
-            <a:r>
-              <a:rPr lang="en-AU" i="1" baseline="-25000" dirty="0" err="1"/>
-              <a:t>ij</a:t>
-            </a:r>
-            <a:endParaRPr lang="en-AU" dirty="0"/>
-          </a:p>
-        </p:txBody>
-      </p:sp>
-      <p:sp>
-        <p:nvSpPr>
           <p:cNvPr id="4" name="Slide Number Placeholder 3"/>
           <p:cNvSpPr>
             <a:spLocks noGrp="1"/>
@@ -12323,6 +8282,581 @@
           </a:prstGeom>
         </p:spPr>
       </p:pic>
+      <p:sp>
+        <p:nvSpPr>
+          <p:cNvPr id="9" name="Content Placeholder 2">
+            <a:extLst>
+              <a:ext uri="{FF2B5EF4-FFF2-40B4-BE49-F238E27FC236}">
+                <a16:creationId xmlns:a16="http://schemas.microsoft.com/office/drawing/2014/main" id="{6012833D-CFE8-4E1F-BDFF-F80D69FC20D3}"/>
+              </a:ext>
+            </a:extLst>
+          </p:cNvPr>
+          <p:cNvSpPr txBox="1">
+            <a:spLocks/>
+          </p:cNvSpPr>
+          <p:nvPr/>
+        </p:nvSpPr>
+        <p:spPr>
+          <a:xfrm>
+            <a:off x="457199" y="5341843"/>
+            <a:ext cx="8229600" cy="533399"/>
+          </a:xfrm>
+          <a:prstGeom prst="rect">
+            <a:avLst/>
+          </a:prstGeom>
+        </p:spPr>
+        <p:style>
+          <a:lnRef idx="2">
+            <a:schemeClr val="accent6"/>
+          </a:lnRef>
+          <a:fillRef idx="1">
+            <a:schemeClr val="lt1"/>
+          </a:fillRef>
+          <a:effectRef idx="0">
+            <a:schemeClr val="accent6"/>
+          </a:effectRef>
+          <a:fontRef idx="minor">
+            <a:schemeClr val="dk1"/>
+          </a:fontRef>
+        </p:style>
+        <p:txBody>
+          <a:bodyPr vert="horz" lIns="91440" tIns="45720" rIns="91440" bIns="45720" rtlCol="0">
+            <a:normAutofit/>
+          </a:bodyPr>
+          <a:lstStyle>
+            <a:lvl1pPr marL="342900" indent="-342900" algn="l" defTabSz="914400" rtl="0" eaLnBrk="1" latinLnBrk="0" hangingPunct="1">
+              <a:spcBef>
+                <a:spcPct val="20000"/>
+              </a:spcBef>
+              <a:buFont typeface="Arial" pitchFamily="34" charset="0"/>
+              <a:buChar char="•"/>
+              <a:defRPr sz="2800" kern="1200">
+                <a:solidFill>
+                  <a:schemeClr val="lt1"/>
+                </a:solidFill>
+                <a:latin typeface="+mn-lt"/>
+                <a:ea typeface="+mn-ea"/>
+                <a:cs typeface="+mn-cs"/>
+              </a:defRPr>
+            </a:lvl1pPr>
+            <a:lvl2pPr marL="742950" indent="-285750" algn="l" defTabSz="914400" rtl="0" eaLnBrk="1" latinLnBrk="0" hangingPunct="1">
+              <a:spcBef>
+                <a:spcPct val="20000"/>
+              </a:spcBef>
+              <a:buFont typeface="Arial" pitchFamily="34" charset="0"/>
+              <a:buChar char="–"/>
+              <a:defRPr sz="2400" kern="1200">
+                <a:solidFill>
+                  <a:schemeClr val="lt1"/>
+                </a:solidFill>
+                <a:latin typeface="+mn-lt"/>
+                <a:ea typeface="+mn-ea"/>
+                <a:cs typeface="+mn-cs"/>
+              </a:defRPr>
+            </a:lvl2pPr>
+            <a:lvl3pPr marL="1143000" indent="-228600" algn="l" defTabSz="914400" rtl="0" eaLnBrk="1" latinLnBrk="0" hangingPunct="1">
+              <a:spcBef>
+                <a:spcPct val="20000"/>
+              </a:spcBef>
+              <a:buFont typeface="Arial" pitchFamily="34" charset="0"/>
+              <a:buChar char="•"/>
+              <a:defRPr sz="2400" kern="1200">
+                <a:solidFill>
+                  <a:schemeClr val="lt1"/>
+                </a:solidFill>
+                <a:latin typeface="+mn-lt"/>
+                <a:ea typeface="+mn-ea"/>
+                <a:cs typeface="+mn-cs"/>
+              </a:defRPr>
+            </a:lvl3pPr>
+            <a:lvl4pPr marL="1600200" indent="-228600" algn="l" defTabSz="914400" rtl="0" eaLnBrk="1" latinLnBrk="0" hangingPunct="1">
+              <a:spcBef>
+                <a:spcPct val="20000"/>
+              </a:spcBef>
+              <a:buFont typeface="Arial" pitchFamily="34" charset="0"/>
+              <a:buChar char="–"/>
+              <a:defRPr sz="2000" kern="1200">
+                <a:solidFill>
+                  <a:schemeClr val="lt1"/>
+                </a:solidFill>
+                <a:latin typeface="+mn-lt"/>
+                <a:ea typeface="+mn-ea"/>
+                <a:cs typeface="+mn-cs"/>
+              </a:defRPr>
+            </a:lvl4pPr>
+            <a:lvl5pPr marL="2057400" indent="-228600" algn="l" defTabSz="914400" rtl="0" eaLnBrk="1" latinLnBrk="0" hangingPunct="1">
+              <a:spcBef>
+                <a:spcPct val="20000"/>
+              </a:spcBef>
+              <a:buFont typeface="Arial" pitchFamily="34" charset="0"/>
+              <a:buChar char="»"/>
+              <a:defRPr sz="2000" kern="1200">
+                <a:solidFill>
+                  <a:schemeClr val="lt1"/>
+                </a:solidFill>
+                <a:latin typeface="+mn-lt"/>
+                <a:ea typeface="+mn-ea"/>
+                <a:cs typeface="+mn-cs"/>
+              </a:defRPr>
+            </a:lvl5pPr>
+            <a:lvl6pPr marL="2514600" indent="-228600" algn="l" defTabSz="914400" rtl="0" eaLnBrk="1" latinLnBrk="0" hangingPunct="1">
+              <a:spcBef>
+                <a:spcPct val="20000"/>
+              </a:spcBef>
+              <a:buFont typeface="Arial" pitchFamily="34" charset="0"/>
+              <a:buChar char="•"/>
+              <a:defRPr sz="2000" kern="1200">
+                <a:solidFill>
+                  <a:schemeClr val="lt1"/>
+                </a:solidFill>
+                <a:latin typeface="+mn-lt"/>
+                <a:ea typeface="+mn-ea"/>
+                <a:cs typeface="+mn-cs"/>
+              </a:defRPr>
+            </a:lvl6pPr>
+            <a:lvl7pPr marL="2971800" indent="-228600" algn="l" defTabSz="914400" rtl="0" eaLnBrk="1" latinLnBrk="0" hangingPunct="1">
+              <a:spcBef>
+                <a:spcPct val="20000"/>
+              </a:spcBef>
+              <a:buFont typeface="Arial" pitchFamily="34" charset="0"/>
+              <a:buChar char="•"/>
+              <a:defRPr sz="2000" kern="1200">
+                <a:solidFill>
+                  <a:schemeClr val="lt1"/>
+                </a:solidFill>
+                <a:latin typeface="+mn-lt"/>
+                <a:ea typeface="+mn-ea"/>
+                <a:cs typeface="+mn-cs"/>
+              </a:defRPr>
+            </a:lvl7pPr>
+            <a:lvl8pPr marL="3429000" indent="-228600" algn="l" defTabSz="914400" rtl="0" eaLnBrk="1" latinLnBrk="0" hangingPunct="1">
+              <a:spcBef>
+                <a:spcPct val="20000"/>
+              </a:spcBef>
+              <a:buFont typeface="Arial" pitchFamily="34" charset="0"/>
+              <a:buChar char="•"/>
+              <a:defRPr sz="2000" kern="1200">
+                <a:solidFill>
+                  <a:schemeClr val="lt1"/>
+                </a:solidFill>
+                <a:latin typeface="+mn-lt"/>
+                <a:ea typeface="+mn-ea"/>
+                <a:cs typeface="+mn-cs"/>
+              </a:defRPr>
+            </a:lvl8pPr>
+            <a:lvl9pPr marL="3886200" indent="-228600" algn="l" defTabSz="914400" rtl="0" eaLnBrk="1" latinLnBrk="0" hangingPunct="1">
+              <a:spcBef>
+                <a:spcPct val="20000"/>
+              </a:spcBef>
+              <a:buFont typeface="Arial" pitchFamily="34" charset="0"/>
+              <a:buChar char="•"/>
+              <a:defRPr sz="2000" kern="1200">
+                <a:solidFill>
+                  <a:schemeClr val="lt1"/>
+                </a:solidFill>
+                <a:latin typeface="+mn-lt"/>
+                <a:ea typeface="+mn-ea"/>
+                <a:cs typeface="+mn-cs"/>
+              </a:defRPr>
+            </a:lvl9pPr>
+          </a:lstStyle>
+          <a:p>
+            <a:pPr marL="0" indent="0" algn="ctr">
+              <a:buNone/>
+            </a:pPr>
+            <a:r>
+              <a:rPr lang="en-AU" i="1" dirty="0" err="1">
+                <a:solidFill>
+                  <a:schemeClr val="tx1"/>
+                </a:solidFill>
+              </a:rPr>
+              <a:t>Y</a:t>
+            </a:r>
+            <a:r>
+              <a:rPr lang="en-AU" i="1" baseline="-25000" dirty="0" err="1">
+                <a:solidFill>
+                  <a:schemeClr val="tx1"/>
+                </a:solidFill>
+              </a:rPr>
+              <a:t>ij</a:t>
+            </a:r>
+            <a:r>
+              <a:rPr lang="en-AU" dirty="0">
+                <a:solidFill>
+                  <a:schemeClr val="tx1"/>
+                </a:solidFill>
+              </a:rPr>
+              <a:t> = </a:t>
+            </a:r>
+            <a:r>
+              <a:rPr lang="el-GR" dirty="0">
+                <a:solidFill>
+                  <a:schemeClr val="accent3"/>
+                </a:solidFill>
+              </a:rPr>
+              <a:t>γ</a:t>
+            </a:r>
+            <a:r>
+              <a:rPr lang="en-AU" baseline="-25000" dirty="0">
+                <a:solidFill>
+                  <a:schemeClr val="accent3"/>
+                </a:solidFill>
+              </a:rPr>
+              <a:t>00</a:t>
+            </a:r>
+            <a:r>
+              <a:rPr lang="en-AU" dirty="0">
+                <a:solidFill>
+                  <a:schemeClr val="tx1"/>
+                </a:solidFill>
+              </a:rPr>
+              <a:t> + </a:t>
+            </a:r>
+            <a:r>
+              <a:rPr lang="el-GR" dirty="0">
+                <a:solidFill>
+                  <a:schemeClr val="accent2"/>
+                </a:solidFill>
+              </a:rPr>
+              <a:t>γ</a:t>
+            </a:r>
+            <a:r>
+              <a:rPr lang="en-AU" baseline="-25000" dirty="0">
+                <a:solidFill>
+                  <a:schemeClr val="accent2"/>
+                </a:solidFill>
+              </a:rPr>
+              <a:t>10</a:t>
+            </a:r>
+            <a:r>
+              <a:rPr lang="en-AU" dirty="0">
+                <a:solidFill>
+                  <a:schemeClr val="accent2"/>
+                </a:solidFill>
+              </a:rPr>
+              <a:t>x</a:t>
+            </a:r>
+            <a:r>
+              <a:rPr lang="en-AU" i="1" baseline="-25000" dirty="0">
+                <a:solidFill>
+                  <a:schemeClr val="accent2"/>
+                </a:solidFill>
+              </a:rPr>
+              <a:t>ij</a:t>
+            </a:r>
+            <a:r>
+              <a:rPr lang="en-AU" dirty="0">
+                <a:solidFill>
+                  <a:schemeClr val="accent2"/>
+                </a:solidFill>
+              </a:rPr>
+              <a:t> </a:t>
+            </a:r>
+            <a:r>
+              <a:rPr lang="en-AU" dirty="0">
+                <a:solidFill>
+                  <a:schemeClr val="tx1"/>
+                </a:solidFill>
+              </a:rPr>
+              <a:t>+ </a:t>
+            </a:r>
+            <a:r>
+              <a:rPr lang="en-AU" dirty="0">
+                <a:solidFill>
+                  <a:schemeClr val="accent5"/>
+                </a:solidFill>
+              </a:rPr>
+              <a:t>u</a:t>
+            </a:r>
+            <a:r>
+              <a:rPr lang="en-AU" baseline="-25000" dirty="0">
+                <a:solidFill>
+                  <a:schemeClr val="accent5"/>
+                </a:solidFill>
+              </a:rPr>
+              <a:t>0j</a:t>
+            </a:r>
+            <a:r>
+              <a:rPr lang="en-AU" baseline="-25000" dirty="0">
+                <a:solidFill>
+                  <a:schemeClr val="tx1"/>
+                </a:solidFill>
+              </a:rPr>
+              <a:t> </a:t>
+            </a:r>
+            <a:r>
+              <a:rPr lang="en-AU" dirty="0">
+                <a:solidFill>
+                  <a:schemeClr val="tx1"/>
+                </a:solidFill>
+              </a:rPr>
+              <a:t>+ </a:t>
+            </a:r>
+            <a:r>
+              <a:rPr lang="en-AU" i="1" dirty="0" err="1">
+                <a:solidFill>
+                  <a:schemeClr val="tx1"/>
+                </a:solidFill>
+              </a:rPr>
+              <a:t>ε</a:t>
+            </a:r>
+            <a:r>
+              <a:rPr lang="en-AU" i="1" baseline="-25000" dirty="0" err="1">
+                <a:solidFill>
+                  <a:schemeClr val="tx1"/>
+                </a:solidFill>
+              </a:rPr>
+              <a:t>ij</a:t>
+            </a:r>
+            <a:endParaRPr lang="en-AU" dirty="0">
+              <a:solidFill>
+                <a:schemeClr val="tx1"/>
+              </a:solidFill>
+            </a:endParaRPr>
+          </a:p>
+        </p:txBody>
+      </p:sp>
+      <p:sp>
+        <p:nvSpPr>
+          <p:cNvPr id="10" name="Content Placeholder 2">
+            <a:extLst>
+              <a:ext uri="{FF2B5EF4-FFF2-40B4-BE49-F238E27FC236}">
+                <a16:creationId xmlns:a16="http://schemas.microsoft.com/office/drawing/2014/main" id="{0ED99CE2-3D06-4A95-93FC-AA2CA2D6F499}"/>
+              </a:ext>
+            </a:extLst>
+          </p:cNvPr>
+          <p:cNvSpPr txBox="1">
+            <a:spLocks/>
+          </p:cNvSpPr>
+          <p:nvPr/>
+        </p:nvSpPr>
+        <p:spPr>
+          <a:xfrm>
+            <a:off x="468774" y="6005513"/>
+            <a:ext cx="8229600" cy="533399"/>
+          </a:xfrm>
+          <a:prstGeom prst="rect">
+            <a:avLst/>
+          </a:prstGeom>
+        </p:spPr>
+        <p:style>
+          <a:lnRef idx="2">
+            <a:schemeClr val="accent1"/>
+          </a:lnRef>
+          <a:fillRef idx="1">
+            <a:schemeClr val="lt1"/>
+          </a:fillRef>
+          <a:effectRef idx="0">
+            <a:schemeClr val="accent1"/>
+          </a:effectRef>
+          <a:fontRef idx="minor">
+            <a:schemeClr val="dk1"/>
+          </a:fontRef>
+        </p:style>
+        <p:txBody>
+          <a:bodyPr vert="horz" lIns="91440" tIns="45720" rIns="91440" bIns="45720" rtlCol="0">
+            <a:normAutofit/>
+          </a:bodyPr>
+          <a:lstStyle>
+            <a:lvl1pPr marL="342900" indent="-342900" algn="l" defTabSz="914400" rtl="0" eaLnBrk="1" latinLnBrk="0" hangingPunct="1">
+              <a:spcBef>
+                <a:spcPct val="20000"/>
+              </a:spcBef>
+              <a:buFont typeface="Arial" pitchFamily="34" charset="0"/>
+              <a:buChar char="•"/>
+              <a:defRPr sz="2800" kern="1200">
+                <a:solidFill>
+                  <a:schemeClr val="lt1"/>
+                </a:solidFill>
+                <a:latin typeface="+mn-lt"/>
+                <a:ea typeface="+mn-ea"/>
+                <a:cs typeface="+mn-cs"/>
+              </a:defRPr>
+            </a:lvl1pPr>
+            <a:lvl2pPr marL="742950" indent="-285750" algn="l" defTabSz="914400" rtl="0" eaLnBrk="1" latinLnBrk="0" hangingPunct="1">
+              <a:spcBef>
+                <a:spcPct val="20000"/>
+              </a:spcBef>
+              <a:buFont typeface="Arial" pitchFamily="34" charset="0"/>
+              <a:buChar char="–"/>
+              <a:defRPr sz="2400" kern="1200">
+                <a:solidFill>
+                  <a:schemeClr val="lt1"/>
+                </a:solidFill>
+                <a:latin typeface="+mn-lt"/>
+                <a:ea typeface="+mn-ea"/>
+                <a:cs typeface="+mn-cs"/>
+              </a:defRPr>
+            </a:lvl2pPr>
+            <a:lvl3pPr marL="1143000" indent="-228600" algn="l" defTabSz="914400" rtl="0" eaLnBrk="1" latinLnBrk="0" hangingPunct="1">
+              <a:spcBef>
+                <a:spcPct val="20000"/>
+              </a:spcBef>
+              <a:buFont typeface="Arial" pitchFamily="34" charset="0"/>
+              <a:buChar char="•"/>
+              <a:defRPr sz="2400" kern="1200">
+                <a:solidFill>
+                  <a:schemeClr val="lt1"/>
+                </a:solidFill>
+                <a:latin typeface="+mn-lt"/>
+                <a:ea typeface="+mn-ea"/>
+                <a:cs typeface="+mn-cs"/>
+              </a:defRPr>
+            </a:lvl3pPr>
+            <a:lvl4pPr marL="1600200" indent="-228600" algn="l" defTabSz="914400" rtl="0" eaLnBrk="1" latinLnBrk="0" hangingPunct="1">
+              <a:spcBef>
+                <a:spcPct val="20000"/>
+              </a:spcBef>
+              <a:buFont typeface="Arial" pitchFamily="34" charset="0"/>
+              <a:buChar char="–"/>
+              <a:defRPr sz="2000" kern="1200">
+                <a:solidFill>
+                  <a:schemeClr val="lt1"/>
+                </a:solidFill>
+                <a:latin typeface="+mn-lt"/>
+                <a:ea typeface="+mn-ea"/>
+                <a:cs typeface="+mn-cs"/>
+              </a:defRPr>
+            </a:lvl4pPr>
+            <a:lvl5pPr marL="2057400" indent="-228600" algn="l" defTabSz="914400" rtl="0" eaLnBrk="1" latinLnBrk="0" hangingPunct="1">
+              <a:spcBef>
+                <a:spcPct val="20000"/>
+              </a:spcBef>
+              <a:buFont typeface="Arial" pitchFamily="34" charset="0"/>
+              <a:buChar char="»"/>
+              <a:defRPr sz="2000" kern="1200">
+                <a:solidFill>
+                  <a:schemeClr val="lt1"/>
+                </a:solidFill>
+                <a:latin typeface="+mn-lt"/>
+                <a:ea typeface="+mn-ea"/>
+                <a:cs typeface="+mn-cs"/>
+              </a:defRPr>
+            </a:lvl5pPr>
+            <a:lvl6pPr marL="2514600" indent="-228600" algn="l" defTabSz="914400" rtl="0" eaLnBrk="1" latinLnBrk="0" hangingPunct="1">
+              <a:spcBef>
+                <a:spcPct val="20000"/>
+              </a:spcBef>
+              <a:buFont typeface="Arial" pitchFamily="34" charset="0"/>
+              <a:buChar char="•"/>
+              <a:defRPr sz="2000" kern="1200">
+                <a:solidFill>
+                  <a:schemeClr val="lt1"/>
+                </a:solidFill>
+                <a:latin typeface="+mn-lt"/>
+                <a:ea typeface="+mn-ea"/>
+                <a:cs typeface="+mn-cs"/>
+              </a:defRPr>
+            </a:lvl6pPr>
+            <a:lvl7pPr marL="2971800" indent="-228600" algn="l" defTabSz="914400" rtl="0" eaLnBrk="1" latinLnBrk="0" hangingPunct="1">
+              <a:spcBef>
+                <a:spcPct val="20000"/>
+              </a:spcBef>
+              <a:buFont typeface="Arial" pitchFamily="34" charset="0"/>
+              <a:buChar char="•"/>
+              <a:defRPr sz="2000" kern="1200">
+                <a:solidFill>
+                  <a:schemeClr val="lt1"/>
+                </a:solidFill>
+                <a:latin typeface="+mn-lt"/>
+                <a:ea typeface="+mn-ea"/>
+                <a:cs typeface="+mn-cs"/>
+              </a:defRPr>
+            </a:lvl7pPr>
+            <a:lvl8pPr marL="3429000" indent="-228600" algn="l" defTabSz="914400" rtl="0" eaLnBrk="1" latinLnBrk="0" hangingPunct="1">
+              <a:spcBef>
+                <a:spcPct val="20000"/>
+              </a:spcBef>
+              <a:buFont typeface="Arial" pitchFamily="34" charset="0"/>
+              <a:buChar char="•"/>
+              <a:defRPr sz="2000" kern="1200">
+                <a:solidFill>
+                  <a:schemeClr val="lt1"/>
+                </a:solidFill>
+                <a:latin typeface="+mn-lt"/>
+                <a:ea typeface="+mn-ea"/>
+                <a:cs typeface="+mn-cs"/>
+              </a:defRPr>
+            </a:lvl8pPr>
+            <a:lvl9pPr marL="3886200" indent="-228600" algn="l" defTabSz="914400" rtl="0" eaLnBrk="1" latinLnBrk="0" hangingPunct="1">
+              <a:spcBef>
+                <a:spcPct val="20000"/>
+              </a:spcBef>
+              <a:buFont typeface="Arial" pitchFamily="34" charset="0"/>
+              <a:buChar char="•"/>
+              <a:defRPr sz="2000" kern="1200">
+                <a:solidFill>
+                  <a:schemeClr val="lt1"/>
+                </a:solidFill>
+                <a:latin typeface="+mn-lt"/>
+                <a:ea typeface="+mn-ea"/>
+                <a:cs typeface="+mn-cs"/>
+              </a:defRPr>
+            </a:lvl9pPr>
+          </a:lstStyle>
+          <a:p>
+            <a:pPr marL="0" indent="0" algn="ctr">
+              <a:buNone/>
+            </a:pPr>
+            <a:r>
+              <a:rPr lang="en-AU" dirty="0">
+                <a:solidFill>
+                  <a:schemeClr val="tx1"/>
+                </a:solidFill>
+              </a:rPr>
+              <a:t>math ~ </a:t>
+            </a:r>
+            <a:r>
+              <a:rPr lang="en-AU" dirty="0">
+                <a:solidFill>
+                  <a:schemeClr val="accent3"/>
+                </a:solidFill>
+              </a:rPr>
+              <a:t>1</a:t>
+            </a:r>
+            <a:r>
+              <a:rPr lang="en-AU" dirty="0">
+                <a:solidFill>
+                  <a:schemeClr val="tx1"/>
+                </a:solidFill>
+              </a:rPr>
+              <a:t> + </a:t>
+            </a:r>
+            <a:r>
+              <a:rPr lang="en-AU" dirty="0" err="1">
+                <a:solidFill>
+                  <a:schemeClr val="accent2"/>
+                </a:solidFill>
+              </a:rPr>
+              <a:t>ses</a:t>
+            </a:r>
+            <a:r>
+              <a:rPr lang="en-AU" dirty="0">
+                <a:solidFill>
+                  <a:schemeClr val="tx1"/>
+                </a:solidFill>
+              </a:rPr>
+              <a:t> + (</a:t>
+            </a:r>
+            <a:r>
+              <a:rPr lang="en-AU" dirty="0">
+                <a:solidFill>
+                  <a:schemeClr val="accent5"/>
+                </a:solidFill>
+              </a:rPr>
+              <a:t>1</a:t>
+            </a:r>
+            <a:r>
+              <a:rPr lang="en-AU" dirty="0">
+                <a:solidFill>
+                  <a:schemeClr val="tx1"/>
+                </a:solidFill>
+              </a:rPr>
+              <a:t> | school)</a:t>
+            </a:r>
+          </a:p>
+        </p:txBody>
+      </p:sp>
     </p:spTree>
     <p:extLst>
       <p:ext uri="{BB962C8B-B14F-4D97-AF65-F5344CB8AC3E}">
@@ -12399,36 +8933,6 @@
           </a:p>
         </p:txBody>
       </p:sp>
-      <p:pic>
-        <p:nvPicPr>
-          <p:cNvPr id="8" name="Picture 7">
-            <a:extLst>
-              <a:ext uri="{FF2B5EF4-FFF2-40B4-BE49-F238E27FC236}">
-                <a16:creationId xmlns:a16="http://schemas.microsoft.com/office/drawing/2014/main" id="{601D10DE-F0AE-424A-89F2-36EF512F72CE}"/>
-              </a:ext>
-            </a:extLst>
-          </p:cNvPr>
-          <p:cNvPicPr>
-            <a:picLocks noChangeAspect="1"/>
-          </p:cNvPicPr>
-          <p:nvPr/>
-        </p:nvPicPr>
-        <p:blipFill>
-          <a:blip r:embed="rId3"/>
-          <a:stretch>
-            <a:fillRect/>
-          </a:stretch>
-        </p:blipFill>
-        <p:spPr>
-          <a:xfrm>
-            <a:off x="1510095" y="1552809"/>
-            <a:ext cx="6123809" cy="3752381"/>
-          </a:xfrm>
-          <a:prstGeom prst="rect">
-            <a:avLst/>
-          </a:prstGeom>
-        </p:spPr>
-      </p:pic>
       <p:sp>
         <p:nvSpPr>
           <p:cNvPr id="7" name="Content Placeholder 2">
@@ -13010,60 +9514,103 @@
               <a:t> + </a:t>
             </a:r>
             <a:r>
+              <a:rPr lang="en-AU" dirty="0" err="1">
+                <a:solidFill>
+                  <a:schemeClr val="accent2"/>
+                </a:solidFill>
+              </a:rPr>
+              <a:t>ses</a:t>
+            </a:r>
+            <a:r>
               <a:rPr lang="en-AU" dirty="0">
                 <a:solidFill>
-                  <a:schemeClr val="accent2"/>
-                </a:solidFill>
-              </a:rPr>
-              <a:t>x</a:t>
+                  <a:schemeClr val="tx1"/>
+                </a:solidFill>
+              </a:rPr>
+              <a:t> + (</a:t>
             </a:r>
             <a:r>
               <a:rPr lang="en-AU" dirty="0">
                 <a:solidFill>
+                  <a:schemeClr val="accent5"/>
+                </a:solidFill>
+              </a:rPr>
+              <a:t>1</a:t>
+            </a:r>
+            <a:r>
+              <a:rPr lang="en-AU" dirty="0">
+                <a:solidFill>
                   <a:schemeClr val="tx1"/>
                 </a:solidFill>
               </a:rPr>
-              <a:t> + (</a:t>
+              <a:t> + </a:t>
+            </a:r>
+            <a:r>
+              <a:rPr lang="en-AU" dirty="0" err="1">
+                <a:solidFill>
+                  <a:schemeClr val="accent6"/>
+                </a:solidFill>
+              </a:rPr>
+              <a:t>ses</a:t>
             </a:r>
             <a:r>
               <a:rPr lang="en-AU" dirty="0">
                 <a:solidFill>
-                  <a:schemeClr val="accent5"/>
-                </a:solidFill>
-              </a:rPr>
-              <a:t>1</a:t>
-            </a:r>
-            <a:r>
-              <a:rPr lang="en-AU" dirty="0">
-                <a:solidFill>
                   <a:schemeClr val="tx1"/>
                 </a:solidFill>
               </a:rPr>
-              <a:t> + </a:t>
-            </a:r>
-            <a:r>
-              <a:rPr lang="en-AU" dirty="0">
-                <a:solidFill>
-                  <a:schemeClr val="accent6"/>
-                </a:solidFill>
-              </a:rPr>
-              <a:t>x</a:t>
-            </a:r>
-            <a:r>
-              <a:rPr lang="en-AU" dirty="0">
+              <a:t> </a:t>
+            </a:r>
+            <a:r>
+              <a:rPr lang="en-AU">
                 <a:solidFill>
                   <a:schemeClr val="tx1"/>
                 </a:solidFill>
               </a:rPr>
-              <a:t> | group)</a:t>
-            </a:r>
-          </a:p>
-        </p:txBody>
-      </p:sp>
+              <a:t>| school)</a:t>
+            </a:r>
+            <a:endParaRPr lang="en-AU" dirty="0">
+              <a:solidFill>
+                <a:schemeClr val="tx1"/>
+              </a:solidFill>
+            </a:endParaRPr>
+          </a:p>
+        </p:txBody>
+      </p:sp>
+      <p:pic>
+        <p:nvPicPr>
+          <p:cNvPr id="10" name="Picture 9">
+            <a:extLst>
+              <a:ext uri="{FF2B5EF4-FFF2-40B4-BE49-F238E27FC236}">
+                <a16:creationId xmlns:a16="http://schemas.microsoft.com/office/drawing/2014/main" id="{11E37B1E-5386-4541-9CC0-2A4B7153A2E0}"/>
+              </a:ext>
+            </a:extLst>
+          </p:cNvPr>
+          <p:cNvPicPr>
+            <a:picLocks noChangeAspect="1"/>
+          </p:cNvPicPr>
+          <p:nvPr/>
+        </p:nvPicPr>
+        <p:blipFill>
+          <a:blip r:embed="rId3"/>
+          <a:stretch>
+            <a:fillRect/>
+          </a:stretch>
+        </p:blipFill>
+        <p:spPr>
+          <a:xfrm>
+            <a:off x="1521669" y="1406899"/>
+            <a:ext cx="6123809" cy="3752381"/>
+          </a:xfrm>
+          <a:prstGeom prst="rect">
+            <a:avLst/>
+          </a:prstGeom>
+        </p:spPr>
+      </p:pic>
     </p:spTree>
     <p:extLst>
       <p:ext uri="{BB962C8B-B14F-4D97-AF65-F5344CB8AC3E}">
-        <p14:creationId xmlns:p14="http://schemas.microsoft.com/office/powerpoint/2010/main" val="991074384"/>
+        <p14:creationId xmlns:p14="http://schemas.microsoft.com/office/powerpoint/2010/main" val="437216007"/>
       </p:ext>
     </p:extLst>
   </p:cSld>

</xml_diff>